<commit_message>
Generated Update from Main Repository
</commit_message>
<xml_diff>
--- a/reference_content/Slides/002_Trees_EDA.pptx
+++ b/reference_content/Slides/002_Trees_EDA.pptx
@@ -5,7 +5,7 @@
     <p:sldMasterId id="2147483660" r:id="rId1"/>
   </p:sldMasterIdLst>
   <p:notesMasterIdLst>
-    <p:notesMasterId r:id="rId38"/>
+    <p:notesMasterId r:id="rId44"/>
   </p:notesMasterIdLst>
   <p:sldIdLst>
     <p:sldId id="279" r:id="rId2"/>
@@ -32,18 +32,24 @@
     <p:sldId id="275" r:id="rId23"/>
     <p:sldId id="291" r:id="rId24"/>
     <p:sldId id="278" r:id="rId25"/>
-    <p:sldId id="282" r:id="rId26"/>
-    <p:sldId id="276" r:id="rId27"/>
-    <p:sldId id="292" r:id="rId28"/>
-    <p:sldId id="277" r:id="rId29"/>
-    <p:sldId id="293" r:id="rId30"/>
-    <p:sldId id="283" r:id="rId31"/>
-    <p:sldId id="284" r:id="rId32"/>
-    <p:sldId id="268" r:id="rId33"/>
-    <p:sldId id="269" r:id="rId34"/>
-    <p:sldId id="270" r:id="rId35"/>
-    <p:sldId id="272" r:id="rId36"/>
-    <p:sldId id="273" r:id="rId37"/>
+    <p:sldId id="295" r:id="rId26"/>
+    <p:sldId id="296" r:id="rId27"/>
+    <p:sldId id="282" r:id="rId28"/>
+    <p:sldId id="297" r:id="rId29"/>
+    <p:sldId id="276" r:id="rId30"/>
+    <p:sldId id="292" r:id="rId31"/>
+    <p:sldId id="298" r:id="rId32"/>
+    <p:sldId id="299" r:id="rId33"/>
+    <p:sldId id="277" r:id="rId34"/>
+    <p:sldId id="293" r:id="rId35"/>
+    <p:sldId id="283" r:id="rId36"/>
+    <p:sldId id="284" r:id="rId37"/>
+    <p:sldId id="294" r:id="rId38"/>
+    <p:sldId id="268" r:id="rId39"/>
+    <p:sldId id="269" r:id="rId40"/>
+    <p:sldId id="270" r:id="rId41"/>
+    <p:sldId id="272" r:id="rId42"/>
+    <p:sldId id="273" r:id="rId43"/>
   </p:sldIdLst>
   <p:sldSz cx="12192000" cy="6858000"/>
   <p:notesSz cx="6858000" cy="9144000"/>
@@ -175,13 +181,27 @@
             <p14:sldId id="275"/>
             <p14:sldId id="291"/>
             <p14:sldId id="278"/>
+          </p14:sldIdLst>
+        </p14:section>
+        <p14:section name="Interim" id="{54983777-824F-1F46-991A-0A9F3E5C3491}">
+          <p14:sldIdLst>
+            <p14:sldId id="295"/>
+            <p14:sldId id="296"/>
+          </p14:sldIdLst>
+        </p14:section>
+        <p14:section name="Regularization" id="{8F870671-C01B-5C40-8CEA-EB0D3844CADA}">
+          <p14:sldIdLst>
             <p14:sldId id="282"/>
+            <p14:sldId id="297"/>
             <p14:sldId id="276"/>
             <p14:sldId id="292"/>
+            <p14:sldId id="298"/>
+            <p14:sldId id="299"/>
             <p14:sldId id="277"/>
             <p14:sldId id="293"/>
             <p14:sldId id="283"/>
             <p14:sldId id="284"/>
+            <p14:sldId id="294"/>
             <p14:sldId id="268"/>
             <p14:sldId id="269"/>
             <p14:sldId id="270"/>
@@ -199,6 +219,52 @@
 </file>
 
 <file path=ppt/ink/ink1.xml><?xml version="1.0" encoding="utf-8"?>
+<inkml:ink xmlns:inkml="http://www.w3.org/2003/InkML">
+  <inkml:definitions>
+    <inkml:context xml:id="ctx0">
+      <inkml:inkSource xml:id="inkSrc0">
+        <inkml:traceFormat>
+          <inkml:channel name="X" type="integer" min="-2.14748E9" max="2.14748E9" units="cm"/>
+          <inkml:channel name="Y" type="integer" min="-2.14748E9" max="2.14748E9" units="cm"/>
+          <inkml:channel name="F" type="integer" max="32767" units="dev"/>
+        </inkml:traceFormat>
+        <inkml:channelProperties>
+          <inkml:channelProperty channel="X" name="resolution" value="1000" units="1/cm"/>
+          <inkml:channelProperty channel="Y" name="resolution" value="1000" units="1/cm"/>
+          <inkml:channelProperty channel="F" name="resolution" value="0" units="1/dev"/>
+        </inkml:channelProperties>
+      </inkml:inkSource>
+      <inkml:timestamp xml:id="ts0" timeString="2026-01-07T18:05:07.088"/>
+    </inkml:context>
+    <inkml:brush xml:id="br0">
+      <inkml:brushProperty name="width" value="0.05292" units="cm"/>
+      <inkml:brushProperty name="height" value="0.05292" units="cm"/>
+      <inkml:brushProperty name="color" value="#FF0000"/>
+    </inkml:brush>
+  </inkml:definitions>
+  <inkml:trace contextRef="#ctx0" brushRef="#br0">2412 1647 24575,'-4'6'0,"-3"26"0,1 5 0,3-15 0,-3 18 0,1-5-3569,5-28 3569,0 8 0,0 16 0,0-15-3185,0 16 1,0-1 3184,0-16 0,0 24-2219,3 6 2219,-3-30-1922,3 30 1922,-3-39-845,0 22 0,0 4 845,0-13 1166,0 9 1,0 4-1167,1 2 0,1-4 0,-1-10 0,0 11 0,0 5-460,0-1 1,-2-4 459,1-5 1517,0 5 0,0 4-1517,6 18-3034,-5-36 3034,5 33 3034,2-5-3034,-3 1 4537,4 6-4537,-4-15 0,-1-5-4522,-3-17 4522,4 24 0,7 11 0,-10-30 0,12 31 0,1 0-3039,-9-34 3039,8 31 840,-3-17-840,-5-21 3454,11 31-3454,-10-32 0,-1 9 0,-3-7 5166,-3 4-5166,0 7 4885,0-4-4885,0 7 0,0-17 0,-3 12 0,3-12 0,-6 12 0,6-12 0,-6 15 0,3-2 0,-1-3 0,-4 19 0,4-30 0,-5 29 0,5-29 0,-1 18 0,7-20-6784,46-2 6784,-30-5 0,38-3 0,-46 2-1513,24-3 1,16-3 0,-7 2 1512,-2-1-250,-5 1 0,8-2 0,3 0 250,-3 2 0,5-1 0,-3 1 0,-9 0-2786,17-5 2786,-16 5 0,10 0 0,2 0 0,-3-1 0,4-3 0,-3-1 0,-7 3 0,9 2 0,-2-4 0,9-3 0,-17 6 2786,-26 7-2786,36-12 0,5-1-2284,-21 8 2284,13-5 0,5-1 0,-8 5 0,-8 3 0,-9 1 0,11-2 0,3-1 0,-7 1 0,-4 1 0,-7 2-1015,11-2 1,-5 0 1014,-23 4 547,45-6-547,-31 5 0,28-5 0,0 1 0,-28 3 2300,31-3-2300,-12-1 0,-24 5 0,24-5 2216,-2 1-2216,-1 1 4537,7-3-4537,10 2-4537,-40 4 4537,18-2 0,9 1 0,-25 1 0,27-2 0,12 0-3034,-33 3 3034,32-3 0,1 3 0,-36 0 3034,35 0-3034,-8 0 0,-29 0 0,19 0 0,-2 0 0,-21 0 0,27 3 0,-30-3 4537,17 3-4537,-12-3 6784,2 0-6784,1-3 0,-3 2 0,-1-1 0,-1 2 0,-6 0 0,-3-3 0,9-12-3731,-10 6 3731,9-11-5548,6-31 5548,-10 31 0,3-8 0,1-4 0,-2-7 0,0 3-3710,3-6 3710,-4 5 0,2-4 0,3-4 0,0 5-1366,-5 11 1366,6-17 0,2-7 0,0 7 0,0 2 0,-6 15 0,0-2-677,6-14 1,2-8 0,-3 12 676,0 9 0,-2-6 0,-2 5 0,-7 21 0,6-19 0,0-4 0,-1 4 1014,-1 3 1,1-2-1015,1-6 0,-2 3 3034,-4 2-3034,5-21 0,1 0 0,-6 23 0,3-21 0,-5 43 0,4-38 0,-2 27 0,2-26-3034,6 10 3034,-10 22 0,9-19 0,-5 19 3034,-4 7-3034,-17-1 0,5 7 0,-35 4 0,34-1 0,-21-1 0,0 0 0,17 1 0,-30-2 0,-11 1 0,29-2 0,-10 0 0,-10 0 0,9-1 0,8 0 0,-4 0 0,-3 0 0,-5 0 0,5 0 0,13 0-1517,-18 0 0,6 0 1517,29 0-1015,-24 0 1,-5 0 1014,13 0 1014,-7 0 1,-5 0-1015,-2 5 0,4 0 0,8-3 0,-10 3 0,2 0 3034,21-2-3034,-31 2 0,-4 1 0,17 0 0,-11 0 0,-10 2 0,0 2 0,-4 2 0,8-2-761,18-3 1,-3 0 760,-8 2 0,-15 3 0,-8 3 0,-4 0 0,3 0 0,6-3 0,14-2 0,-1-2 0,1 0 0,-4 3 0,-13 4 0,-2 0 0,8-2 0,16-5-948,8-7 948,-2 4 0,-15 3 0,-8 2 0,-2 0 0,4-1 0,12-3 0,-3 0 0,0-1 0,-3 2 0,-9 2 0,-5 1 0,2-1 0,9-3 0,-1-2 0,6-2 0,8-1-1325,-10 1 1325,7 0 0,-6 1 0,7-1 0,0-2 0,24 0 760,-21 0-760,20 0 2845,8 0-2845,-8 0 0,-17-6 0,21 5 4443,-34-10-4443,26 9 6644,-1-3-6644,-1 5 0,15 0 0,-3 0 0,-6 0 0,8 0 423,-9 0-423,-12-3 0,17 2-6784,-23-4 6784,28 4 0,-9-2 0,9 3 0,-3 0 0,7 0 0,2 0 0</inkml:trace>
+  <inkml:trace contextRef="#ctx0" brushRef="#br0" timeOffset="1384">3827 3529 24575,'-12'8'0,"4"-6"0,-20 28 0,18-24 0,-13 18 0,-10 15-8503,20-23 8503,-18 25-1409,8-6 0,2-3 1409,5-8-1517,-7 11 0,1-3 1517,13-20-1015,-21 33 1,-3 6 1014,10-20 0,2 1 0,-3 7 0,5-12 0,7-18 0,-10 16 0,-9 11 0,5-6 0,-7 5 0,4-3 0,-9 9 0,0-1 0,10-10 0,3-4 1014,-5 3 1,0 3-1015,-3 10 0,20-27 0,-18 27 0,6-1 0,17-25 3034,-15 25-3034,-5 7-3034,22-32 3034,-21 32 0,12-20 0,2-3 0,0-8 1517,-1 8 0,-3 3-1517,-3 11 0,1-4-3034,8-10 3034,-8 10 0,-1 4 0,9 0 0,1-5 0,0-11 1517,-2 11 0,2 2-1517,5-8 0,4-16 0,-4 22 0,-4-18 0,4-3 0,-6-1 4537,10-7-4537,-18 10 0,12-9 0,-10 11 0,-2 2 0,12-8-2269,-8 13 1,-1 2 2268,7-13 0,-5 21 0,-8 7 0,14-25-1150,-9 17 0,1 0 1150,9-20 0,-9 20 0,15-29 0,-2 2 0</inkml:trace>
+  <inkml:trace contextRef="#ctx0" brushRef="#br0" timeOffset="4219">2629 5724 24575,'-16'4'0,"4"-2"0,-11-2 0,13 0-9831,-37 0 8341,34 0 1381,-21 0 109,28 0-1627,-44 0 1627,30 0 0,-34 0 0,3-2 0,2 0 0,7 1 0,-4 0 0,-10-2 0,13 1 0,-5-1 0,1 1 0,9 0-649,9 0 0,0 1 649,-22-1 0,-9-1 0,0-1 0,1-2 0,1 0 0,11 1 0,-2 1-677,-3-1 1,-11-2 0,21 3 676,29 4 0,-22-3 0,-3-1 0,12 2 1014,-8-1 1,-2-1-1015,0 2 3034,22 1-3034,-31 12 0,37-8 4537,-4 14-4537,-1 0 0,7-8 0,-14 25 0,15-24 6784,-6 7-6784,11-9-6784,8 21 6784,-5-14 0,11 16-4537,0 16 4537,-5-30 0,6 36 0,-7-19 0,-2-2-3034,-3-3 3034,2 4 0,1 3 0,-4 3 0,-1-4 0,-1-8 0,2 12 0,-1-4 0,-1-25-374,0 25 1,0 7 373,0 3 0,0-1 0,0 7 0,1-1 0,-1 5 0,2-8 0,0-16 0,1-1 0,-2 16 0,0 7 0,0-13 2132,3-20-2132,2 17 0,1 16 0,0 3 0,-1-12 0,-1-13 0,0 0 0,1 9 0,0 8 0,1 3 0,1-4 0,4 6 0,1-1 0,-3-9-1790,-2 1 1790,2 3 0,2 9 0,-3-18 2833,-6-25-2833,6 15 0,2 3 0,2-7 303,4 13 0,1-1-303,0-15 4537,-2 4-4537,-3-8 6784,-8-13-6784,18 1-982,-14-5 982,12 0-6459,13 0 6459,-21 0 0,21-2 0,-28 1 0,21-5 0,3-2-4319,-8 2 4319,5 1 0,4-1-1298,14-8 1,-2 1 1297,-12 5 0,7-4 0,13-5 0,1 0 0,-12 4 0,1-1-508,-3 1 1,12-3 0,-1-1 0,-13 5 507,-7 0 1014,9 0 1,3 0-1015,-2-1 0,-6 2 0,-5 6 0,6-6 0,4-1 0,-1 0 0,-6 2 0,-10 2 1517,11-3 0,2-1-1517,6-6 0,-26 11 0,16-7 0,-1 1 1302,-18 10-1302,12-11 1969,-6 8-1969,-11 1-1762,23-6 1762,-23 7 0,11-2-3534,8 0 3534,-15 3 0,17-1-888,21 2 888,-30 2 1615,32 0-1615,-1 0 0,-18 0-1736,24 0 1736,-34 0 0,32 0 0,-35 2 3034,32-1-3034,-10 2-3034,-25-3 3034,24 0 320,-7 0-320,-20 0 3192,45-6-3192,-12-4 0,-5 0 0,4 2 0,-4 1 0,-22 3 0,32-1-239,-19 2 0,-3 0 239,-8-1 0,8 1 0,5 0 0,1-2 0,-4 1-3034,-7 3 3034,7-3 0,3 0 0,6-3 0,-24 0 3034,36-2-3034,-45-16-656,8 13 656,-14-13 0,0-1 0,0 15 0,0-15 0,6-8 0,-5 21 0,5-21 0,-6 27 0,2-32-2378,-1 24 2378,2-24 0,-1-14 0,-1 2 0,-3 23 0,4-28 0,-2 10 0,-3 42-1706,0-16 1706,2 10 2189,-1-10-2189,-7-22 3273,7 26-3273,-2-18 0,0 1 0,4 20 4894,-3-29-4894,0 25 0,0-3 0,0 0 0,3 12 5705,-3-6-5705,2 7 0,-1-5 0,2-3 0,2-2 0,2-2 0,-1 7 0,3-6 0,3-4 0,-4 4 0,9-16 0,-10 24 0,11-24 0,-2 10 0,0 1 0,2-17 0,-11 29 0,4-12 0,-4 1 0,-1-5 0,0-1 0,0-17 0,-3 11 0,3 3 0,-3-14 0,0 31 0,0-29 0,0 29 0,-3-31 0,3 34-6784,-3-31 6784,3 31 0,-6-28 0,2 17-4537,-7-12 4537,7 15 0,-5-4 0,6 9 0,-6 0 0,2 6 4537,-2 8-4537,-22 0 0,16 0 0,-17 0 0,-20 0 0,32 0 0,-30 0 0,-1 0 0,27 0 0,-32 0 0,20-1 0,4-1-4537,9-1 4537,-9 1 0,-2 0-3034,-19-3 3034,36 1 777,-33 1-777,43 0-2286,-32-3 2286,25 5 0,-18-4 0,0-1 0,20 5 2286,-19-5-2286,11 6 0,10 0 0,-23 0 0,23 0 0,-29-3 0,28 3 2257,-15-3-2257,-10-3 4,22 5-4,-22-5 845,-12-2-845,29 3-1658,-25-1 1,-1 0 1657,26 3 0,-29 0 0,4 6 3311,28-3-3311,-21 6 0,2-1 3692,22-3-3692,-38 12 6784,41-13-6784,-13 5 0,17-6 0,0 3 0,3 0 0,-3 1 0,5 4 0,13-4 0,-3 5 0,9-6 0,5 3 0,-16-5 0,9 1 0</inkml:trace>
+  <inkml:trace contextRef="#ctx0" brushRef="#br0" timeOffset="5270">4511 3531 24575,'-7'17'0,"4"-10"-9831,6 32 8341,-2-28-665,21 42 2155,-15-40 2155,11 20-2155,12 6-3034,-20-24 3034,21 24 0,-10-14 0,-2-3 0,-7-2 1517,7 2 0,3 4-1517,9 16 0,-2-4-3034,-6-14 3034,7 13 0,2 6 0,-6-2 0,-5-5 2835,-4-7-2835,0 6 0,4 13 0,0 1 0,-6-12 0,-5-3 0,5 14 0,2 12 0,-8-14 0,0 5 0,-2 0 0,0-8-996,0-4 0,2 4 996,-2-4 0,2 12 0,2 8 0,1 6 0,1 1 0,-1 0 0,-1-5 0,-1-6 0,-1-11 0,0 3 0,-1-9 0,1 6 0,0 3 0,2 5 0,1 6 0,0 1 0,0 2 0,0-2 0,0-5 0,-1 3 0,2 2 0,-2-1 0,1-4 0,-2-4 0,0-8-1103,2 13 1,1 0 1102,-4-12 0,1 8 0,0 5 0,1 2 0,1 1 0,1-2 0,1-6 0,4 4 0,3-1 0,0-3 0,-1-4 0,-4-7 0,0 5 0,0-1 181,0-1 1,2 9 0,3 2 0,0-2-1,-1-11-181,13 7 0,-4-12 0,-8-2 0,8 5 0,3 1 0,5-1 0,-26-25 2810,26 23-2810,-20-15 678,-5-12-678,7 13 0,-11-22 0,-7-2 4537,1-22-4537,-2 10 0,0-5 0,0 12 0</inkml:trace>
+  <inkml:trace contextRef="#ctx0" brushRef="#br0" timeOffset="8602">6082 7566 24575,'0'-6'0,"-3"2"0,-12-1 0,6 1-9831,-24-5 8341,22 5 1490,-11-1-2155,-23-4 2155,29 7 2155,-28-6-2155,7 2 0,3-1-3034,12 2 3034,-11-2 0,-7 0 0,-12 4 0,5 1 0,15 1 0,-16-1 0,-4 1 0,16 5 0,6 1 0,1-3-1015,-18 5 1,3-1 1014,26-4 2029,-24 6-2029,25-4 0,-19-1 0,18 0 3034,-24-3-3034,25 0 0,-7 5 0,16-1 0,8 8 0,0-5 0,-1 31 0,-1 5 646,2-16-646,-2 17 0,1-3 0,1-28 0,-5 27 0,-2 5 0,1-13 0,1 6 0,-2 4-1624,-6 3 0,0-6 1624,4-9 1169,-3 9 1,0 2-1170,5-10 0,2-5-2947,0-9 2947,-5 37 0,1-17 0,3-2 0,2-8 1473,-3 8 1,-1 4-1474,4 3 0,0-4-2771,-1-12 2771,1 11 0,-1 5 0,1-4 0,0-5 0,2-8 0,-4 14 0,1-5 0,4-27-1250,-1 43 1250,2-33 2414,0 36-2414,0-46 3611,8 2-3611,22-6 0,-9-3 5399,11-3-5399,22-3-2603,-33 2 2603,31-2 0,-40 6-2269,39-7 1,8-2 2268,-22 5-1012,1-1 1,8-1 0,-11 1 1011,-14 1-339,10 1 1,16 0 0,10 0 0,2 0 0,-3 0 0,-11 0 338,8-1 0,1 0 0,-10 1 0,10-1 0,3 1 0,-1 0 0,-6 0 0,-12 2 0,16 1 0,-16 1 0,12 2 0,8 1 0,5 0 0,-1 0 0,-4 0 0,-9-2 0,8 1 0,-8-2 0,12 1 0,-20 0 0,7 1 0,6 0 0,5 1 0,2 0 0,2 0 0,0 0 0,-3 0 0,-2 0 0,-6-1 0,-6 0 0,-8-1 0,11 0 0,-10-1 0,4 0 238,8 2 0,8 1 0,2 0 0,-1-1 0,-5 0-238,-5-2 0,-2 0 0,-4-1 0,-7 1 0,-7-1 0,-1 0 0,24 2 0,10 0 0,-8-3 0,-14-5 0,-8 0 2618,-5 3-2618,22-9 0,-3 0 3916,-32 9-3916,25-13 1876,-31 14-1876,13-6 6784,-8 4-6784,5-2 0,-6 3 0,1-9 0,-6 10 0,20-14 0,2 2 0,-2 3 0,23-8-6784,-19 11 6784,4-4 0,-4 3 0,-25 0 0,2-4 0,-6-6 0,-3 0 0,0 3 0,0-21 0,0 24-2269,0-21 1,0-2 2268,0 20 0,0-29 240,0 0-240,0 26-1557,-3-23 1,0-1 1556,2 25 0,-4-28 0,-1 4 0,5 27 0,-5-28-161,6 1 161,0 27 3034,0-28-3034,0 1-3034,0 26 3034,0-26 0,0 36 0,-5-39 0,3 29 3034,-3-29-3034,-3 11-3034,3 6 3034,-4-9 0,3 19 2539,3 7-2539,0 6 4291,-3-6-4291,3 4 0,-9-4 0,-4-8 0,5 4 6417,-3 1-6417,5-9-5676,-6-4 5676,1 2 0,-11-17 0,16 32 0,-9-11 0,12 15 0,-5 6 0,3 0 0,-15 3 0,14-2-4537,-27 2 4537,25-3 0,-39 5 0,37-3 0,-17 3-3034,-7-2 3034,23-3 0,-22 3 0,-14 5 0,33-5 0,-33 5 0,19-5 0,3-1 0,6 0 1517,-8 1 0,-4 2-1517,3-1 0,3 1-3034,5 0 3034,-31 3 0,45-8 0,-46 3 0,34-3 275,-33 6-275,45-6-1706,-47 3 1706,32-3 0,-29 1 0,0 1 0,29-1 119,-32 1-119,47-2-206,-48-2 206,38 1 1673,-38-2-1673,13-5 3111,28 3-3111,-22-5 0,1 0-141,23 4 141,-22-8 0,30 14 1665,-33-20-1665,21 13-1808,-19-9 0,-1-2 1808,20 8-1209,-15-4 0,2 0 1209,19 8 2347,-16-5-2347,0 0 1931,16 8-1931,-35-14 4537,36 16-4537,-42-4 0,40 5 0,-25 0 0,-1 0 0,21 0 0,-32 0 0,0 0-4537,33 0 4537,-33-3-3034,16 2 3034,21-2 3034,-32 0-3034,23 3-3034,-18-3 3034,15 3 0,-31 0 0,43 0 3034,-24 0-3034,-2 0-3034,-3 0 3034,-4 0 2889,2 0-2889,35 3 4465,-14 0-4465,10 6 0,-3 1 0,7-3 0,3-2 0</inkml:trace>
+  <inkml:trace contextRef="#ctx0" brushRef="#br0" timeOffset="12602">6401 1904 24575,'13'0'0,"41"-3"-9831,-38 3 8341,32-3-665,6 0 2155,-36 2 2155,38-1-2155,-5-1-3034,-31 2 3034,34-2 0,-47 1 0,23 0 0,3 0 0,-14-1 1517,9 1 0,4 1-1517,4 1 0,-3 0 0,-9-3 0,14 2 0,11 0 0,-11 0 0,-13-3 0,5 3 0,3-1 0,20-6 0,-35 6-1517,20-4 0,-1 1 1517,-24 4-2029,32-4 2029,-35 4 2029,16-5-2029,-19 6 0,11-3 0,-11 3 758,5 0 1,-8 0-1,-2 0 1</inkml:trace>
+  <inkml:trace contextRef="#ctx0" brushRef="#br0" timeOffset="17269">6443 1886 24575,'6'-6'0,"31"-31"-9831,-23 23 8341,22-22 412,-12 9 1,-2 3 1077,-6 6 1077,6-5 1,1-4-1078,5-13 0,-19 26 0,13-18 0,-2 2 4537,-13 18-4537,24-33 0,-22 37 0,6-14 0,-1 10 0,-3 1 0,5-2 0,-1 2 0,-8 10 0,-1-5 0,-3 6 0</inkml:trace>
+  <inkml:trace contextRef="#ctx0" brushRef="#br0" timeOffset="18302">6368 1917 24575,'18'28'0,"7"-3"0,-7-12 0,28 6 0,-34-16-4252,18 11 1,-1 2 4251,-16-11 0,19 17-2818,4 3 2818,-25-13 0,26 16 0,-6 3-3034,-18-19 3034,18 16 0,-5 5 0,-15-25 0,12 25 609,-12-19-609,-9-5 0,9 6 0,-10-10 0,2-4 0,-3 2 0</inkml:trace>
+  <inkml:trace contextRef="#ctx0" brushRef="#br0" timeOffset="24538">7954 1180 24575,'6'21'0,"1"7"-7616,-4-11 7616,3 1 0,0 15 0,-2-23 0,2 23 0,2 9 0,-6-21-2040,3 26 0,-1 3 2040,-4-23 1035,0 2 0,0 3-1035,-2 0 0,1-3-3595,0-7 3595,0 8 0,-1-1 0,2-18-567,-3 18 0,-2 1 567,3-8 1517,-2 6 0,0 3-1517,-2 13-3034,5-28 3034,-5 29 0,1-20 0,4-14 3034,-8 31-3034,9-23 0,-3 5 0,3 2 4537,0-17-4537,3 16 6784,-3-11-6784,3 2 0,-3-5 0,-3-7 0,3 4 0,-6-7 0,6 8 0,-11 2 0,9-2 0,-20 24 0,18-22 0,-18 28 0,17-26-6784,-15 35 6784,12-32-3115,-4 17 3115,10-27 0,-7 17 0,7-13 0,-6 16 0,3-36 0,3 9-3505,-6-33 3505,7 24 0,-4-10 0,4 17 0,-2 3 0</inkml:trace>
+  <inkml:trace contextRef="#ctx0" brushRef="#br0" timeOffset="26172">7914 1310 24575,'10'-6'0,"1"2"0,-7 1 0,24-5 0,-13 6-8503,39-12 8503,-38 13-1043,15-5 1043,-25 6-951,20-3 951,-15 2 0,32-1 0,-33 2 0,27 0 0,-27 0 0,24 2 0,-16 5 0,4-3 0,1 9 0,-17-8 0,16 15 0,-17-14 0,21 24 0,-20-23 0,22 35 0,-24-31 0,18 31 0,-20-31 0,12 19 0,-13-21 4945,5 8-4945,-6-7 0,3 5 0,0-8 3771,3 23-3771,-2-2 1781,-1 2-1781,-3 9 0,0-21 0,0 4 0,-3-5 0,2-10 0,-4-1 0,1 5 0,1-6 0,-11 15 0,11-12 0,-21 18 0,20-17 0,-29 19 0,26-22 0,-27 19 0,25-23 0,-14 15 0,10-13 0,0 5 0,-7-3 0,4-2 0,-6 1 0,6-4 0,-4 1 0,12-2 0,-6 0-6784,2 0 6784,4 0 0,-6 0 0,4 0 0,-5-5 0,5 4 0,-13-13 0,6 6 0,-5-5 0,4 7 0,9 3 6784,-3 3-6784,2 3 0,1-2 0,-11 7 0,11-7-6784,-11 10 6784,13-9 0,-2 3 0,6-5 0,0 0 0</inkml:trace>
+  <inkml:trace contextRef="#ctx0" brushRef="#br0" timeOffset="27121">8259 1931 24575,'13'11'0,"-3"-8"0,-4 10-9831,2 7 8341,-6-9 2111,11 39-621,-10-34-956,5 13 0,0 1 956,-6-15-952,8 16 0,0 2 952,-7-16 0,11 23 0,-3 4 0,-2-26 0,3 21 0,-1 0 0,-6-21 979,6 24-979,-2-14 3439,-7-16-3439,12 27 3314,-7-24-3314,2 0 6784,0-1-6784,-2-13 0,-1 8 0,0-9 0,-2 3 0,-1-3 0</inkml:trace>
+  <inkml:trace contextRef="#ctx0" brushRef="#br0" timeOffset="33921">2029 4862 24575,'-20'-3'0,"3"0"-9831,-28-3 8341,29 5 4308,-28-5-2818,-9 4-2818,35 1 2818,-35-2 0,47 3-3034,-42 0 3034,32 0 3034,-31 0-3034,-6 6 0,32-2-1517,-30 2 0,-1 0 1517,28-2 3034,-32 4-3034,19-4 0,4 1 4537,9 0-4537,-12 1 0,-11 1 0,11-1-4537,14-3 4537,-7 2 0,-1 1 0,-6-1 0,22-4 0,-39 8 0,46-6 0,-15 1 0,18-2 0,-2-2 0,-3 0 0,2 0 4537,-4 3-4537,6 0 6784,-3 1-6784,5-1 0,-17-3 0,8 2-6784,-31 2 6784,31 2 0,-15-3 0,18 0 0,1 0 0,-6-2 0,7 1 0,-5 1 0,5-2 6784,-2 4-6784,3-4 0,-8 15 0,6-12-1568,-4 12 1568,6-15 0,-8 10 0,8-6 0,-11 4 0,8-1 0,-1-4 0,-5 2 0,5 0 0,1-5 0,3 1 0,3 9 0,-3-5 0,6 16 0,-3-13 1568,3 5-1568,0-5 0,0-2 0,0 16 0,0-14-6784,3 39 6784,-3-35 0,6 26-4537,3 12 4537,-4-25-2448,3 25 2448,-8-43-1112,5 23 1,0 3 1111,-3-10 0,3 10 0,0-2 0,-5-21 0,1 19 0,1 3 0,-2-4 0,0 9 0,-1 10 0,0-9 0,-1-6-131,-1 5 1,-1 8-1,0-9 131,3-12 1014,-3 3 1,0 5-1015,0 4 0,1-3 0,-1-4 0,1 14 0,0 11 0,1-12 0,1-14 0,0 9 0,0 3 0,1-5 0,0-4 0,0-5 1517,0 6 0,0 3-1517,0 2 0,0-6-3034,0-10 3034,1 11 0,0 4 0,2-5 0,1-4 0,3-6 1517,-4 7 0,0 5-1517,4 7 0,0-4-3034,-4-6 3034,2 6 0,1 3 0,1 0 0,0-4 0,-1-8 0,3 14 0,2 10 0,-3-11 0,-1-14-1015,2 8 1,-2-3 1014,-6-23 227,16 44-227,-11-29 0,7 14 0,0-1 0,-8-22 2142,9 21-2142,-7-17 3202,-3-2-3202,12 25-67,-10-29 67,6 18 0,16 16 0,-22-31 0,22 32 0,-3 2-3180,-13-33 3180,2 7 0,1 2-295,11 22 295,-18-32 0,11 23 0,-2 0 0,-13-26 0,9 24-2029,-7-6 2029,-5-19 529,11 38-529,-11-39 0,10 39 0,-10-37 0,5 18 140,0 22-140,-5-33 0,3 34 0,0 1 0,-3-33 772,1 9 1,-1 2-773,-7 18 0,5-31 0,-5 30-185,-2-8 185,6-27 3034,-6 27-3034,5-14-2239,2-16 2239,-1 16 1414,2 0-1414,0-16 4128,0 32-4128,0-17 0,0 0 0,-6 23-1431,5-34 1431,-7 16-1872,1 20 1872,3-38 0,-1 39 0,-1-8-3034,2-26 3034,-2 26 794,3-17-794,3-17 3428,0 23-3428,0-26 0,0 6 0,3-7 0,14 21 0,-7-17-3428,27 23 3428,-27-29 0,13 9 1037,14-5-1037,-17-2-457,26 3 1,3-1 456,-21-1-1167,6-3 1,-4 0 1166,-19-2 0,38 2 0,5-1 0,-18-2 468,15 3 0,10-1-468,-17-2 0,4 0 0,-1 0 0,-8-1 0,-5 0 0,-1-1 0,5 2 0,8 0 0,3-1 0,2 1 0,-2-2 0,5 0 0,2 0 0,-1 0 0,-5 0 0,-6 0 0,11 0 0,0 0 0,-12 0 0,4-1 0,6 1 0,2 0 0,1 0 0,1 1 0,-4 0 0,4 0 0,2 0 0,1 1 0,-1 0 0,-3 0 0,-5 0 0,-5 0 0,11 1 0,-9 0 0,14 0-104,-23-1 1,7-1 0,7 0-1,6 1 1,3-1 0,3 1 0,3-1-1,-1 1 1,0-1 0,-1 0-1,-4 1 1,-3-1 0,-6 0 0,-6 1-1,-8-1 104,25 2 0,-16 0 0,10-1 0,-8-1 0,10 0 0,6 0 0,3 0 0,-3 0 0,-6 0 0,-10-1 0,-15 0 0,10 0 0,-10 1 0,13-1 0,9 1 0,4 0 0,0-1 0,-5 1 0,-10-1 0,5 1 0,-8-1 0,10 0 0,-10 1 0,9-1 0,7 1 0,4-1 0,2 1 0,0-1 0,-4 1 0,-4-1 0,-8 0 0,-10 0 0,15 1 0,-5-2 0,5 1 0,10 0 0,-4 0 0,-19 0 0,-15 0 0,17 1 0,13 0 0,-9 0 0,5 3 574,-8-4 0,7 1 0,-1 1-574,-6 3 0,-2 2 0,-7-2 0,4-2 0,-3 2 0,7 0 0,-1 1 0,16 2 0,-8 0 0,-14 1 0,14 0 0,7-3 0,-4-5 0,-7-2 0,-12 1 136,13-1 0,5-1-136,-6-6 0,-6 1 0,-10 3 0,9-3 0,5-1 0,-4 0 0,-6 0 0,-9 2 1508,9-2 0,4 0-1508,-6 0 0,-5 2-2981,-9 3 2981,9-3 0,3-2 0,18-3 0,-32 5 3034,32-5-3034,0 0-3034,0 0 3034,-19 3 0,0 0 0,25-7 0,-41 11 1088,27-7-1088,-29 9-2389,37-12 2389,-36 12 2389,19-6-2389,9-3 0,-23 8 0,24-7 0,0 1 0,-21 6 1946,28-5-1946,2 3 4537,-29 3-4537,25-5 0,1 0 0,-25 5 0,18-9 0,5-3 0,9-4 0,-3-2-2269,-11 6 1,-7 3 2268,-19 5-1517,15-3 0,-2-2 1517,-15 3-2029,24-3 2029,-27 7 2029,6-1-2029,-7 1 3034,-3 1-3034,9-6 0,-6 8 4537,6-7-4537,-7 7 6784,8-5-6784,1-3 0,-2 4 0,9-9 0,-15 13 0,10-10 0,-11 10 0,2-8 0,-3 6 0,3-4 0,-5 1 0,4 3 0,-4-8 0,-1 6 0,3-7 0,-2-8-3560,2 10 3560,-3-10 0,0 14-1352,-3-20 1352,0 15-2579,1-18 1,1-1 2578,-1 15 0,1-25 0,-2 31 0,0-42 0,0 28-992,2-28 0,-1-2 992,0 25-1151,5-26 0,2 1 1151,-6 26 0,10-27 0,-10 45 0,7-21 0,1-2 0,-3 11 0,3-8 0,1-5 0,-1 2 0,-1 4 0,-2 9 0,4-13 0,-1 4 0,-10 19 608,9-40-608,-8 27 0,2-26 0,0 0 0,-3 27 0,0-32 0,-11 5 3335,8 31-3335,-8-25 0,0 0 0,8 24-455,-6-24 1,-1-1 454,5 24 4537,-4-29-4537,1-6-4537,7 36 4537,-5-35-1517,4 18 0,0 4 1517,1 10 1517,-1-11 0,0-4-1517,2-1 0,0 5-3034,0 7 3034,0-8 0,0-5 0,2 4 0,0 5 0,2 3 1517,-1-4 0,-1-4-1517,-1 2 0,1 3 0,-2 6 0,0-25 0,0-8 0,-3 23 0,0 2 0,2-1 0,1 2 4537,-6-21-4537,3 3 0,3 32 0,-3-25 0,0 0-4435,3 27 4435,-3-26 0,0 6 0,2 21 0,-4-21-3068,-1-3 3068,2 23 0,-5-23 0,3 6 558,2 19-558,-1-20 0,5 26 0,-3-23 0,2 18 0,-7-46 0,6 44 0,-3-21 0,-3-6-626,6 26 626,-7-26 0,7 34 0,-7-36 0,1 26 3034,-1-26-3034,-7-3 0,12 29-1517,-8-23 0,0 2 1517,9 23 0,-12-22 0,0-1 0,10 19 1517,-12-18 0,-2-5-1517,4-4 0,-4-1 0,5 12-3034,2 2 3034,7 20 3034,-9-17-3034,-9-1 0,12 20-1517,-13-17 0,-2 0 1517,14 16 0,-19-15 460,3-2-460,13 19 0,-9-15 0,0 0 0,11 13-1091,-9-9 1,2 0 1090,9 10 0,-33-18 0,32 22 1721,-13-8-1721,-11 8 3,25-1-3,-25 1 0,-9-2 0,26 6 3036,-26-3-3036,10 2 0,2 0-3036,12-1 3036,-10 1 0,-5 0-2,-3-2 1,4 1 1,6 3 1517,-5-2 0,-6 0-1517,-6 0 0,5 1-3034,13 0 3034,-12 0 0,-8-1 0,0 0 0,-4 1 0,10 0 0,-3 0 0,2-1 0,-10-1 0,-1 0 0,9 2 0,-3 0 0,2 1 0,7-1 0,6-1 0,0 0-140,-6 0 0,-6 1 0,-3 0 0,2-1 140,-15-1 0,1 0 0,10 1 0,0-3 0,1 3 0,-12-1 0,1 0 0,4 0 0,0 1 0,10 0 0,-9 0 0,6 0 0,-10-1 0,4 0 0,-3 1 0,8 1 0,7 0 280,-7 0 0,-4-1-280,16 1 0,6 1 0,10 0 0,-11 0 0,-4-1 0,-17-3 0,34 4 3034,-33-5-3034,19 6 0,3 0-3034,7 0 3034,-6 0 0,-6 0 0,-4 0 0,4 0 0,11 0 0,-17 0 0,4 0 0,25 0-1015,-24 0 1,-3 0 1014,15 0 1014,-9-1 1,-5 2-1015,2 6 0,3 1 0,3-4 0,-11 6 0,-12 6 0,11-4 0,15-3 0,-8 2 0,-4 1 0,7-1 0,4-2 0,7-5 1517,-7 5 0,-4 1-1517,-2-6 0,3-2 0,5 2 0,-10-1 0,-9-1 0,10-1 0,12-4 0,-32 2 0,12-4 0,22 4-1517,-21-3 0,-1 0 1517,17 2-1015,-27-3 1,0-1 1014,28 2 0,-10 1 0,4 0 0,22 0 0,-36 1 0,-6 1 0,18 1 935,-12-2 0,-7 1-935,13-1 0,-1 0 0,6 0 0,-3 1 0,-15-1 0,-7-2 0,5-3 0,8 0 0,15 4 0,-22-4 0,6 0 2955,38 4-2955,-30-5 0,-4-1-2796,19 2 2796,-14-1 0,-7-1 0,-1 0 0,4 1 0,11 3 0,-12-5 0,-2 0 0,13 8 0,6 0 0,8-1-1723,-38 0 1723,51 3 1025,-30 3-1025,22-3 1344,-17 6 1,-5 2-1345,1 0 4020,-7 5-4020,-11-10 0,38-4-422,-16-6 0,0 0 422,12 4 2404,-18-11-2404,11 5-3031,16 4 3031,-13-6-1291,6 5 1291,11-1 0,-27-2 0,25 5 4643,-34 2-4643,18 2 0,-5 0 0,-2 2 0,14 2 3983,-8-1-3983,-2 0 2480,13 0-2480,-20-3 0,24 3 0,-24 0 0,25-2-6784,-19 4 6784,19-4-2077,-27 7 2077,25-4 0,-39 8 0,15-3-3849,2 1 3849,5-4 370,11 0-370,7-6-477,-23 6 477,23-5 0,-10 1 0,14-2 949,-6 0 0,8 0 0,-5 0 0</inkml:trace>
+  <inkml:trace contextRef="#ctx0" brushRef="#br0" timeOffset="35921">9919 6914 24575,'10'0'0,"27"0"0,-24 0 0,20 1 0,-1 1-7967,-18-2 7967,26 3-3048,-3-6 3048,-17 0 0,17-1 0,6-1-3135,-29 4 3135,29-2 0,-37 3-205,31 0 205,-21 0 3034,19 0-3034,5 0-3034,-24 0 3034,22 0 0,7 6 0,-30-5 0,28 5 0,-15-3 0,-16-3 0,17 3 0,-4-3 3034,-13 0-3034,30-3 926,-32 2-926,13-1 2779,0 2-2779,-12 0 0,20 0 0,-20 0 0,5 0 0,-5 0 0,-4 0 4606,14 0-4606,-1 2 3010,3 2-3010,-5-1 0,-12 0 0,-3-3 0</inkml:trace>
+  <inkml:trace contextRef="#ctx0" brushRef="#br0" timeOffset="36904">9934 6946 24575,'-10'0'0,"-1"0"0,7-3 0,-5-6 0,9 2 0,-3-11 0,6 8 0,-3-3 0,11 4 0,-8 3 0,16-8 0,-13 8-6784,19-19 6784,-16 19 0,9-9-4537,5-2 4537,-13 11-1776,35-22 1776,-33 21-2445,31-15 2445,-34 17 0,12-4 239,-10 4-239,-3 4 641,4-5 0,-9 6 0,0-3 0</inkml:trace>
+  <inkml:trace contextRef="#ctx0" brushRef="#br0" timeOffset="37770">9858 6943 24575,'14'30'0,"0"-4"0,-2-1 0,-4-14 0,7 15 0,5 2 0,4-3 0,-1 7 0,6-4 0,-18-17 0,4 1 0,-8-4 0,1-4 0,-1 5 0,8 0 0,-4 1 0,0 7 0,-4-9 0,-4 7 0,6 8 0,-5-13 0,2 13 0,5 5 0,-9-17 0,15 31 0,-12-32 0,9 15 0,-9-17 0,6 9 0,-10-9 0,10 9 0,-9-10 0,6 8 0,-7-11 0,1 1 0</inkml:trace>
+  <inkml:trace contextRef="#ctx0" brushRef="#br0" timeOffset="38821">11388 6134 24575,'9'0'0,"0"0"0,1 0 0,8 8-3380,-13-3 3380,9 4-5137,1 15 5137,-9-15 0,11 16-3131,-5 17 3131,-7-24-1463,5 26 1,0 1 1462,-8-24 855,6 32-855,-8 2 0,0-36 0,0 36-319,-3-22 1,0-3 318,2-10 1517,-1 9 0,-1 4-1517,-6 20-3034,7-35 3034,-6 35 0,0-6 0,6-30 3034,-6 30-3034,-1-2-3034,4-30 3034,-3 30 0,-6 0 0,11-30 3034,-8 30-3034,3-6 0,3-24 0,-1 18 0,0 0 4537,3-20-4537,0 32 0,3-36 6784,6 11-6784,-5-13 0,5-1 0,-6-3 0</inkml:trace>
+  <inkml:trace contextRef="#ctx0" brushRef="#br0" timeOffset="39989">11447 6259 24575,'6'0'0,"0"-3"-9831,34-9 8341,-26 7 4308,26-6-2818,5-1-774,-29 10 774,29-12-3711,0 2 3711,-29 6 485,19-4 1,0 1-486,-19 7-2803,27-9 2803,-31 10 317,13-2-317,-16 3 2960,25 0-2960,2 0-1026,-4 0 1026,-1 0 0,1 8 0,-20-5 1248,19 5-1248,-2 0 0,-20-3 0,19 4 0,-14 2 0,4 5 0,1-5 4537,-7 6-4537,2 14 867,-11-18-867,8 20 0,-8-27-3731,6 49 3731,-4-35-436,0 21 1,-2 1 435,-3-13-3169,0 8 3169,0-17-404,-11 17 404,8-24-323,-11 18 1,-2-1 322,9-17-783,-13 14 0,0-1 783,10-17 1948,-10 18-1948,4-15 1675,12-4-1675,-12 4 3863,1-4-3863,-13-7 0,6 5 0,-25-12 0,35 5-3863,-44-10 3863,43 6 0,-16 0 0,0-1 0,17 1-84,-33 0 84,35 5 0,-18 0 0,3-6 0,-10-3 0,9 1 3822,-14-9-3822,25 12 2158,-15-4-2158,3 7 0,-1 2 0,4 0 0,-7 0 0,22 0 0,-2-9 0,9 7 0,4-6 0</inkml:trace>
+  <inkml:trace contextRef="#ctx0" brushRef="#br0" timeOffset="41037">11900 6700 24575,'5'20'0,"-4"-10"0,16 21 0,-11-22-9831,17 13 8341,-15-17-665,18 12 2155,-17-13-879,25 27 879,-24-17 0,13 9 0,-3 16 0,-10-25 0,8 23 0,-2 2 0,-12-26 3034,10 24-3034,-6-1-2903,-3-25 2903,4 28 0,-6-35 0,8 35 0,-8-25 3098,8 25-3098,-3-8-2581,-3-18 2581,4 20 0,-6-29-141,11 27 141,-11-19 0,14 13 3285,-5 0-3285,2-1-3285,4 22 3285,-5-22 2527,-7-2-2527,3-7 0,-8-6 4537,7 5-4537,-1 3 0,2-6 0,-2 8 0,4-2 0,-9-9 0,6 17 0,-7-15 6784,4 10-6784,5 5 0,-6-14 0,16 36 0,-15-35 0,16 33 0,-14-35 0,2 10 0,-6-17 0</inkml:trace>
+  <inkml:trace contextRef="#ctx0" brushRef="#br0" timeOffset="42406">12673 5650 24575,'-16'0'0,"4"3"0,7-3-9831,-12 9 8341,7-8 1490,-10 5 1129,0 2-1129,10-3 0,-7 6 0,-2 6 0,12-8 1933,-13 9-1933,-5 10-3473,17-17 3473,-17 18 0,21-23 4333,-18 16-4333,-2 2-3277,0 3 3277,5-10-769,10-6 769,2-7 896,-5 8 1,9-8 0,0-2 0</inkml:trace>
+</inkml:ink>
+</file>
+
+<file path=ppt/ink/ink2.xml><?xml version="1.0" encoding="utf-8"?>
 <inkml:ink xmlns:inkml="http://www.w3.org/2003/InkML">
   <inkml:definitions>
     <inkml:context xml:id="ctx0">
@@ -347,7 +413,7 @@
           <a:p>
             <a:fld id="{20133884-94CD-0F4E-BA84-5C402B1D76E4}" type="datetimeFigureOut">
               <a:rPr lang="en-US" smtClean="0"/>
-              <a:t>1/7/26</a:t>
+              <a:t>1/8/26</a:t>
             </a:fld>
             <a:endParaRPr lang="en-US"/>
           </a:p>
@@ -679,7 +745,7 @@
           <a:p>
             <a:fld id="{9CB1A861-F0D7-D84E-A25F-3A724E46AE05}" type="slidenum">
               <a:rPr lang="en-US" smtClean="0"/>
-              <a:t>26</a:t>
+              <a:t>29</a:t>
             </a:fld>
             <a:endParaRPr lang="en-US"/>
           </a:p>
@@ -837,7 +903,7 @@
           <a:p>
             <a:fld id="{A08AC5D4-C579-7A4E-B275-F588D71CC3B5}" type="datetimeFigureOut">
               <a:rPr lang="en-US" smtClean="0"/>
-              <a:t>1/7/26</a:t>
+              <a:t>1/8/26</a:t>
             </a:fld>
             <a:endParaRPr lang="en-US"/>
           </a:p>
@@ -1048,7 +1114,7 @@
           <a:p>
             <a:fld id="{A08AC5D4-C579-7A4E-B275-F588D71CC3B5}" type="datetimeFigureOut">
               <a:rPr lang="en-US" smtClean="0"/>
-              <a:t>1/7/26</a:t>
+              <a:t>1/8/26</a:t>
             </a:fld>
             <a:endParaRPr lang="en-US"/>
           </a:p>
@@ -1263,7 +1329,7 @@
           <a:p>
             <a:fld id="{A08AC5D4-C579-7A4E-B275-F588D71CC3B5}" type="datetimeFigureOut">
               <a:rPr lang="en-US" smtClean="0"/>
-              <a:t>1/7/26</a:t>
+              <a:t>1/8/26</a:t>
             </a:fld>
             <a:endParaRPr lang="en-US"/>
           </a:p>
@@ -1464,7 +1530,7 @@
           <a:p>
             <a:fld id="{A08AC5D4-C579-7A4E-B275-F588D71CC3B5}" type="datetimeFigureOut">
               <a:rPr lang="en-US" smtClean="0"/>
-              <a:t>1/7/26</a:t>
+              <a:t>1/8/26</a:t>
             </a:fld>
             <a:endParaRPr lang="en-US"/>
           </a:p>
@@ -1743,7 +1809,7 @@
           <a:p>
             <a:fld id="{A08AC5D4-C579-7A4E-B275-F588D71CC3B5}" type="datetimeFigureOut">
               <a:rPr lang="en-US" smtClean="0"/>
-              <a:t>1/7/26</a:t>
+              <a:t>1/8/26</a:t>
             </a:fld>
             <a:endParaRPr lang="en-US"/>
           </a:p>
@@ -2011,7 +2077,7 @@
           <a:p>
             <a:fld id="{A08AC5D4-C579-7A4E-B275-F588D71CC3B5}" type="datetimeFigureOut">
               <a:rPr lang="en-US" smtClean="0"/>
-              <a:t>1/7/26</a:t>
+              <a:t>1/8/26</a:t>
             </a:fld>
             <a:endParaRPr lang="en-US"/>
           </a:p>
@@ -2427,7 +2493,7 @@
           <a:p>
             <a:fld id="{A08AC5D4-C579-7A4E-B275-F588D71CC3B5}" type="datetimeFigureOut">
               <a:rPr lang="en-US" smtClean="0"/>
-              <a:t>1/7/26</a:t>
+              <a:t>1/8/26</a:t>
             </a:fld>
             <a:endParaRPr lang="en-US"/>
           </a:p>
@@ -2576,7 +2642,7 @@
           <a:p>
             <a:fld id="{A08AC5D4-C579-7A4E-B275-F588D71CC3B5}" type="datetimeFigureOut">
               <a:rPr lang="en-US" smtClean="0"/>
-              <a:t>1/7/26</a:t>
+              <a:t>1/8/26</a:t>
             </a:fld>
             <a:endParaRPr lang="en-US"/>
           </a:p>
@@ -2702,7 +2768,7 @@
           <a:p>
             <a:fld id="{A08AC5D4-C579-7A4E-B275-F588D71CC3B5}" type="datetimeFigureOut">
               <a:rPr lang="en-US" smtClean="0"/>
-              <a:t>1/7/26</a:t>
+              <a:t>1/8/26</a:t>
             </a:fld>
             <a:endParaRPr lang="en-US"/>
           </a:p>
@@ -2953,7 +3019,7 @@
           <a:p>
             <a:fld id="{A08AC5D4-C579-7A4E-B275-F588D71CC3B5}" type="datetimeFigureOut">
               <a:rPr lang="en-US" smtClean="0"/>
-              <a:t>1/7/26</a:t>
+              <a:t>1/8/26</a:t>
             </a:fld>
             <a:endParaRPr lang="en-US"/>
           </a:p>
@@ -3398,7 +3464,7 @@
           <a:p>
             <a:fld id="{A08AC5D4-C579-7A4E-B275-F588D71CC3B5}" type="datetimeFigureOut">
               <a:rPr lang="en-US" smtClean="0"/>
-              <a:t>1/7/26</a:t>
+              <a:t>1/8/26</a:t>
             </a:fld>
             <a:endParaRPr lang="en-US"/>
           </a:p>
@@ -3732,7 +3798,7 @@
           <a:p>
             <a:fld id="{A08AC5D4-C579-7A4E-B275-F588D71CC3B5}" type="datetimeFigureOut">
               <a:rPr lang="en-US" smtClean="0"/>
-              <a:t>1/7/26</a:t>
+              <a:t>1/8/26</a:t>
             </a:fld>
             <a:endParaRPr lang="en-US"/>
           </a:p>
@@ -4239,7 +4305,10 @@
           <a:bodyPr/>
           <a:lstStyle/>
           <a:p>
-            <a:endParaRPr lang="en-US"/>
+            <a:r>
+              <a:rPr lang="en-US" dirty="0"/>
+              <a:t>We Get to Machine Learn again!!!!</a:t>
+            </a:r>
           </a:p>
         </p:txBody>
       </p:sp>
@@ -4259,12 +4328,119 @@
             <p:ph idx="1"/>
           </p:nvPr>
         </p:nvSpPr>
-        <p:spPr/>
-        <p:txBody>
-          <a:bodyPr/>
-          <a:lstStyle/>
-          <a:p>
-            <a:endParaRPr lang="en-US"/>
+        <p:spPr>
+          <a:xfrm>
+            <a:off x="1451579" y="1853754"/>
+            <a:ext cx="9603275" cy="4199727"/>
+          </a:xfrm>
+        </p:spPr>
+        <p:txBody>
+          <a:bodyPr>
+            <a:normAutofit lnSpcReduction="10000"/>
+          </a:bodyPr>
+          <a:lstStyle/>
+          <a:p>
+            <a:r>
+              <a:rPr lang="en-US" dirty="0"/>
+              <a:t>Intro – logistics, overview, </a:t>
+            </a:r>
+            <a:r>
+              <a:rPr lang="en-US" dirty="0" err="1"/>
+              <a:t>etc</a:t>
+            </a:r>
+            <a:r>
+              <a:rPr lang="en-US" dirty="0"/>
+              <a:t>…</a:t>
+            </a:r>
+          </a:p>
+          <a:p>
+            <a:r>
+              <a:rPr lang="en-US" dirty="0"/>
+              <a:t>Assignment 1, Part 1 – easy EDA warm up project. </a:t>
+            </a:r>
+          </a:p>
+          <a:p>
+            <a:r>
+              <a:rPr lang="en-US" dirty="0"/>
+              <a:t>Trees</a:t>
+            </a:r>
+          </a:p>
+          <a:p>
+            <a:pPr lvl="1"/>
+            <a:r>
+              <a:rPr lang="en-US" dirty="0"/>
+              <a:t>Classification trees and tree theory. </a:t>
+            </a:r>
+          </a:p>
+          <a:p>
+            <a:pPr lvl="1"/>
+            <a:r>
+              <a:rPr lang="en-US" dirty="0"/>
+              <a:t>Tree loss – entropy, </a:t>
+            </a:r>
+            <a:r>
+              <a:rPr lang="en-US" dirty="0" err="1"/>
+              <a:t>gini</a:t>
+            </a:r>
+            <a:r>
+              <a:rPr lang="en-US" dirty="0"/>
+              <a:t>, purity, and discrimination. </a:t>
+            </a:r>
+          </a:p>
+          <a:p>
+            <a:pPr lvl="1"/>
+            <a:r>
+              <a:rPr lang="en-US" dirty="0"/>
+              <a:t>Hyperparameters and impact on tree models. </a:t>
+            </a:r>
+          </a:p>
+          <a:p>
+            <a:pPr lvl="1"/>
+            <a:r>
+              <a:rPr lang="en-US" dirty="0"/>
+              <a:t>Basics of over/underfitting. </a:t>
+            </a:r>
+          </a:p>
+          <a:p>
+            <a:pPr lvl="1"/>
+            <a:r>
+              <a:rPr lang="en-US" dirty="0"/>
+              <a:t>Regularization with </a:t>
+            </a:r>
+            <a:r>
+              <a:rPr lang="en-US" dirty="0" err="1"/>
+              <a:t>ccp</a:t>
+            </a:r>
+            <a:r>
+              <a:rPr lang="en-US" dirty="0"/>
+              <a:t>-alpha. </a:t>
+            </a:r>
+          </a:p>
+          <a:p>
+            <a:r>
+              <a:rPr lang="en-US" dirty="0"/>
+              <a:t>Next week: </a:t>
+            </a:r>
+          </a:p>
+          <a:p>
+            <a:pPr lvl="1"/>
+            <a:r>
+              <a:rPr lang="en-US" dirty="0"/>
+              <a:t>Column transformers</a:t>
+            </a:r>
+            <a:r>
+              <a:rPr lang="en-US"/>
+              <a:t>, imputation, </a:t>
+            </a:r>
+            <a:r>
+              <a:rPr lang="en-US" dirty="0"/>
+              <a:t>and custom transformers </a:t>
+            </a:r>
+            <a:r>
+              <a:rPr lang="en-US"/>
+              <a:t>(project). </a:t>
+            </a:r>
+            <a:endParaRPr lang="en-US" dirty="0"/>
           </a:p>
         </p:txBody>
       </p:sp>
@@ -6889,6 +7065,340 @@
           <p:cNvPr id="2" name="Title 1">
             <a:extLst>
               <a:ext uri="{FF2B5EF4-FFF2-40B4-BE49-F238E27FC236}">
+                <a16:creationId xmlns:a16="http://schemas.microsoft.com/office/drawing/2014/main" id="{37B548ED-9CED-301E-7FE1-7CEE01271E5D}"/>
+              </a:ext>
+            </a:extLst>
+          </p:cNvPr>
+          <p:cNvSpPr>
+            <a:spLocks noGrp="1"/>
+          </p:cNvSpPr>
+          <p:nvPr>
+            <p:ph type="title"/>
+          </p:nvPr>
+        </p:nvSpPr>
+        <p:spPr/>
+        <p:txBody>
+          <a:bodyPr/>
+          <a:lstStyle/>
+          <a:p>
+            <a:r>
+              <a:rPr lang="en-US" dirty="0"/>
+              <a:t>Getting lost in the Trees</a:t>
+            </a:r>
+          </a:p>
+        </p:txBody>
+      </p:sp>
+      <p:sp>
+        <p:nvSpPr>
+          <p:cNvPr id="3" name="Content Placeholder 2">
+            <a:extLst>
+              <a:ext uri="{FF2B5EF4-FFF2-40B4-BE49-F238E27FC236}">
+                <a16:creationId xmlns:a16="http://schemas.microsoft.com/office/drawing/2014/main" id="{62F15B79-B82C-2A30-DE7B-6A0AB6F3DA9D}"/>
+              </a:ext>
+            </a:extLst>
+          </p:cNvPr>
+          <p:cNvSpPr>
+            <a:spLocks noGrp="1"/>
+          </p:cNvSpPr>
+          <p:nvPr>
+            <p:ph idx="1"/>
+          </p:nvPr>
+        </p:nvSpPr>
+        <p:spPr>
+          <a:xfrm>
+            <a:off x="1076771" y="1965534"/>
+            <a:ext cx="9978084" cy="4087948"/>
+          </a:xfrm>
+        </p:spPr>
+        <p:txBody>
+          <a:bodyPr>
+            <a:normAutofit/>
+          </a:bodyPr>
+          <a:lstStyle/>
+          <a:p>
+            <a:r>
+              <a:rPr lang="en-US" dirty="0"/>
+              <a:t>Trees will always overfit – try to get to 100% on training data, even if it is “too much”. </a:t>
+            </a:r>
+          </a:p>
+          <a:p>
+            <a:pPr lvl="1"/>
+            <a:r>
+              <a:rPr lang="en-US" dirty="0"/>
+              <a:t>Trees start with the most impactful decisions near the top (by definition). </a:t>
+            </a:r>
+          </a:p>
+          <a:p>
+            <a:pPr lvl="1"/>
+            <a:r>
+              <a:rPr lang="en-US" dirty="0"/>
+              <a:t>If we have a node farther down that still has impurity, tree will still try to split…</a:t>
+            </a:r>
+          </a:p>
+          <a:p>
+            <a:pPr lvl="1"/>
+            <a:r>
+              <a:rPr lang="en-US" dirty="0"/>
+              <a:t>The tree has already used all of the ‘useful’ splits to get to this point. </a:t>
+            </a:r>
+          </a:p>
+          <a:p>
+            <a:pPr lvl="1"/>
+            <a:r>
+              <a:rPr lang="en-US" dirty="0"/>
+              <a:t>Tree will resort to any value that can differentiate, even if silly. </a:t>
+            </a:r>
+          </a:p>
+          <a:p>
+            <a:r>
+              <a:rPr lang="en-US" dirty="0" err="1"/>
+              <a:t>E.g</a:t>
+            </a:r>
+            <a:r>
+              <a:rPr lang="en-US" dirty="0"/>
+              <a:t> two people have the same job, income, net worth, and age – one paid loan, one didn’t. </a:t>
+            </a:r>
+          </a:p>
+          <a:p>
+            <a:pPr lvl="1"/>
+            <a:r>
+              <a:rPr lang="en-US" dirty="0"/>
+              <a:t>Model will likely sort those two to same node, as they “look the same”. </a:t>
+            </a:r>
+          </a:p>
+          <a:p>
+            <a:pPr lvl="1"/>
+            <a:r>
+              <a:rPr lang="en-US" dirty="0"/>
+              <a:t>If tree still tries to split them, it’ll find something that is different, no matter relevance. </a:t>
+            </a:r>
+          </a:p>
+          <a:p>
+            <a:pPr lvl="2"/>
+            <a:r>
+              <a:rPr lang="en-US" dirty="0"/>
+              <a:t>Tiny difference in income, age, or credit score, some tangential feature, </a:t>
+            </a:r>
+            <a:r>
+              <a:rPr lang="en-US" dirty="0" err="1"/>
+              <a:t>etc</a:t>
+            </a:r>
+            <a:r>
+              <a:rPr lang="en-US" dirty="0"/>
+              <a:t>…</a:t>
+            </a:r>
+          </a:p>
+          <a:p>
+            <a:pPr lvl="1"/>
+            <a:r>
+              <a:rPr lang="en-US" dirty="0"/>
+              <a:t>We don’t want these forced splits – we only want to divide things in a way that applies to others. </a:t>
+            </a:r>
+          </a:p>
+        </p:txBody>
+      </p:sp>
+    </p:spTree>
+    <p:extLst>
+      <p:ext uri="{BB962C8B-B14F-4D97-AF65-F5344CB8AC3E}">
+        <p14:creationId xmlns:p14="http://schemas.microsoft.com/office/powerpoint/2010/main" val="3924691053"/>
+      </p:ext>
+    </p:extLst>
+  </p:cSld>
+  <p:clrMapOvr>
+    <a:masterClrMapping/>
+  </p:clrMapOvr>
+</p:sld>
+</file>
+
+<file path=ppt/slides/slide26.xml><?xml version="1.0" encoding="utf-8"?>
+<p:sld xmlns:a="http://schemas.openxmlformats.org/drawingml/2006/main" xmlns:r="http://schemas.openxmlformats.org/officeDocument/2006/relationships" xmlns:p="http://schemas.openxmlformats.org/presentationml/2006/main">
+  <p:cSld>
+    <p:spTree>
+      <p:nvGrpSpPr>
+        <p:cNvPr id="1" name=""/>
+        <p:cNvGrpSpPr/>
+        <p:nvPr/>
+      </p:nvGrpSpPr>
+      <p:grpSpPr>
+        <a:xfrm>
+          <a:off x="0" y="0"/>
+          <a:ext cx="0" cy="0"/>
+          <a:chOff x="0" y="0"/>
+          <a:chExt cx="0" cy="0"/>
+        </a:xfrm>
+      </p:grpSpPr>
+      <p:sp>
+        <p:nvSpPr>
+          <p:cNvPr id="2" name="Title 1">
+            <a:extLst>
+              <a:ext uri="{FF2B5EF4-FFF2-40B4-BE49-F238E27FC236}">
+                <a16:creationId xmlns:a16="http://schemas.microsoft.com/office/drawing/2014/main" id="{38CCFA42-951A-C83F-030B-32D16EBAEA26}"/>
+              </a:ext>
+            </a:extLst>
+          </p:cNvPr>
+          <p:cNvSpPr>
+            <a:spLocks noGrp="1"/>
+          </p:cNvSpPr>
+          <p:nvPr>
+            <p:ph type="title"/>
+          </p:nvPr>
+        </p:nvSpPr>
+        <p:spPr/>
+        <p:txBody>
+          <a:bodyPr/>
+          <a:lstStyle/>
+          <a:p>
+            <a:r>
+              <a:rPr lang="en-US" dirty="0"/>
+              <a:t>Fighting the Overfit</a:t>
+            </a:r>
+          </a:p>
+        </p:txBody>
+      </p:sp>
+      <p:sp>
+        <p:nvSpPr>
+          <p:cNvPr id="3" name="Content Placeholder 2">
+            <a:extLst>
+              <a:ext uri="{FF2B5EF4-FFF2-40B4-BE49-F238E27FC236}">
+                <a16:creationId xmlns:a16="http://schemas.microsoft.com/office/drawing/2014/main" id="{ECDDB118-821F-8D21-0BB6-A0A998D574DC}"/>
+              </a:ext>
+            </a:extLst>
+          </p:cNvPr>
+          <p:cNvSpPr>
+            <a:spLocks noGrp="1"/>
+          </p:cNvSpPr>
+          <p:nvPr>
+            <p:ph idx="1"/>
+          </p:nvPr>
+        </p:nvSpPr>
+        <p:spPr>
+          <a:xfrm>
+            <a:off x="1451579" y="1853754"/>
+            <a:ext cx="9603275" cy="4199728"/>
+          </a:xfrm>
+        </p:spPr>
+        <p:txBody>
+          <a:bodyPr/>
+          <a:lstStyle/>
+          <a:p>
+            <a:r>
+              <a:rPr lang="en-US" dirty="0"/>
+              <a:t>We can use hyperparameters to combat this tendency. </a:t>
+            </a:r>
+          </a:p>
+          <a:p>
+            <a:r>
+              <a:rPr lang="en-US" dirty="0"/>
+              <a:t>HPs are effectively the configuration/settings for the algorithm. </a:t>
+            </a:r>
+          </a:p>
+          <a:p>
+            <a:pPr lvl="1"/>
+            <a:r>
+              <a:rPr lang="en-US" dirty="0"/>
+              <a:t>Provide HPs as arguments when creating the model object. </a:t>
+            </a:r>
+          </a:p>
+          <a:p>
+            <a:r>
+              <a:rPr lang="en-US" dirty="0"/>
+              <a:t>For trees, most hyperparameters are limits on growth. </a:t>
+            </a:r>
+          </a:p>
+          <a:p>
+            <a:pPr lvl="1"/>
+            <a:r>
+              <a:rPr lang="en-US" dirty="0"/>
+              <a:t>Max depth, min number in a node, </a:t>
+            </a:r>
+            <a:r>
+              <a:rPr lang="en-US" dirty="0" err="1"/>
+              <a:t>etc</a:t>
+            </a:r>
+            <a:r>
+              <a:rPr lang="en-US" dirty="0"/>
+              <a:t>…</a:t>
+            </a:r>
+          </a:p>
+          <a:p>
+            <a:r>
+              <a:rPr lang="en-US" dirty="0"/>
+              <a:t>By limiting the ability of the tree to grow, we force it to make broader decisions. </a:t>
+            </a:r>
+          </a:p>
+          <a:p>
+            <a:pPr lvl="1"/>
+            <a:r>
+              <a:rPr lang="en-US" dirty="0"/>
+              <a:t>i.e. it still minimizes loss (</a:t>
+            </a:r>
+            <a:r>
+              <a:rPr lang="en-US" dirty="0" err="1"/>
+              <a:t>gini</a:t>
+            </a:r>
+            <a:r>
+              <a:rPr lang="en-US" dirty="0"/>
+              <a:t>/</a:t>
+            </a:r>
+            <a:r>
+              <a:rPr lang="en-US" dirty="0" err="1"/>
+              <a:t>ent</a:t>
+            </a:r>
+            <a:r>
+              <a:rPr lang="en-US" dirty="0"/>
+              <a:t>.), but must do it with fewer decisions. </a:t>
+            </a:r>
+          </a:p>
+          <a:p>
+            <a:pPr lvl="1"/>
+            <a:r>
+              <a:rPr lang="en-US" dirty="0"/>
+              <a:t>The model must use broadly applicable splits to lower the loss. </a:t>
+            </a:r>
+          </a:p>
+          <a:p>
+            <a:r>
+              <a:rPr lang="en-US" dirty="0"/>
+              <a:t>Different HPs yield different models, sometimes impacts are massive. </a:t>
+            </a:r>
+          </a:p>
+        </p:txBody>
+      </p:sp>
+    </p:spTree>
+    <p:extLst>
+      <p:ext uri="{BB962C8B-B14F-4D97-AF65-F5344CB8AC3E}">
+        <p14:creationId xmlns:p14="http://schemas.microsoft.com/office/powerpoint/2010/main" val="538534622"/>
+      </p:ext>
+    </p:extLst>
+  </p:cSld>
+  <p:clrMapOvr>
+    <a:masterClrMapping/>
+  </p:clrMapOvr>
+</p:sld>
+</file>
+
+<file path=ppt/slides/slide27.xml><?xml version="1.0" encoding="utf-8"?>
+<p:sld xmlns:a="http://schemas.openxmlformats.org/drawingml/2006/main" xmlns:r="http://schemas.openxmlformats.org/officeDocument/2006/relationships" xmlns:p="http://schemas.openxmlformats.org/presentationml/2006/main">
+  <p:cSld>
+    <p:spTree>
+      <p:nvGrpSpPr>
+        <p:cNvPr id="1" name=""/>
+        <p:cNvGrpSpPr/>
+        <p:nvPr/>
+      </p:nvGrpSpPr>
+      <p:grpSpPr>
+        <a:xfrm>
+          <a:off x="0" y="0"/>
+          <a:ext cx="0" cy="0"/>
+          <a:chOff x="0" y="0"/>
+          <a:chExt cx="0" cy="0"/>
+        </a:xfrm>
+      </p:grpSpPr>
+      <p:sp>
+        <p:nvSpPr>
+          <p:cNvPr id="2" name="Title 1">
+            <a:extLst>
+              <a:ext uri="{FF2B5EF4-FFF2-40B4-BE49-F238E27FC236}">
                 <a16:creationId xmlns:a16="http://schemas.microsoft.com/office/drawing/2014/main" id="{CBC75BAC-F066-22A5-C78B-839F878A3A66}"/>
               </a:ext>
             </a:extLst>
@@ -7021,7 +7531,184 @@
 </p:sld>
 </file>
 
-<file path=ppt/slides/slide26.xml><?xml version="1.0" encoding="utf-8"?>
+<file path=ppt/slides/slide28.xml><?xml version="1.0" encoding="utf-8"?>
+<p:sld xmlns:a="http://schemas.openxmlformats.org/drawingml/2006/main" xmlns:r="http://schemas.openxmlformats.org/officeDocument/2006/relationships" xmlns:p="http://schemas.openxmlformats.org/presentationml/2006/main">
+  <p:cSld>
+    <p:spTree>
+      <p:nvGrpSpPr>
+        <p:cNvPr id="1" name=""/>
+        <p:cNvGrpSpPr/>
+        <p:nvPr/>
+      </p:nvGrpSpPr>
+      <p:grpSpPr>
+        <a:xfrm>
+          <a:off x="0" y="0"/>
+          <a:ext cx="0" cy="0"/>
+          <a:chOff x="0" y="0"/>
+          <a:chExt cx="0" cy="0"/>
+        </a:xfrm>
+      </p:grpSpPr>
+      <p:sp>
+        <p:nvSpPr>
+          <p:cNvPr id="2" name="Title 1">
+            <a:extLst>
+              <a:ext uri="{FF2B5EF4-FFF2-40B4-BE49-F238E27FC236}">
+                <a16:creationId xmlns:a16="http://schemas.microsoft.com/office/drawing/2014/main" id="{C664A7C5-2A9A-264F-185B-3D21BC87AB3A}"/>
+              </a:ext>
+            </a:extLst>
+          </p:cNvPr>
+          <p:cNvSpPr>
+            <a:spLocks noGrp="1"/>
+          </p:cNvSpPr>
+          <p:nvPr>
+            <p:ph type="title"/>
+          </p:nvPr>
+        </p:nvSpPr>
+        <p:spPr/>
+        <p:txBody>
+          <a:bodyPr/>
+          <a:lstStyle/>
+          <a:p>
+            <a:r>
+              <a:rPr lang="en-US" dirty="0"/>
+              <a:t>Regularized</a:t>
+            </a:r>
+          </a:p>
+        </p:txBody>
+      </p:sp>
+      <p:sp>
+        <p:nvSpPr>
+          <p:cNvPr id="3" name="Content Placeholder 2">
+            <a:extLst>
+              <a:ext uri="{FF2B5EF4-FFF2-40B4-BE49-F238E27FC236}">
+                <a16:creationId xmlns:a16="http://schemas.microsoft.com/office/drawing/2014/main" id="{69DAC757-4C43-4753-763F-4E33938491E0}"/>
+              </a:ext>
+            </a:extLst>
+          </p:cNvPr>
+          <p:cNvSpPr>
+            <a:spLocks noGrp="1"/>
+          </p:cNvSpPr>
+          <p:nvPr>
+            <p:ph idx="1"/>
+          </p:nvPr>
+        </p:nvSpPr>
+        <p:spPr>
+          <a:xfrm>
+            <a:off x="1451579" y="1853754"/>
+            <a:ext cx="9603275" cy="4199727"/>
+          </a:xfrm>
+        </p:spPr>
+        <p:txBody>
+          <a:bodyPr/>
+          <a:lstStyle/>
+          <a:p>
+            <a:r>
+              <a:rPr lang="en-US" dirty="0"/>
+              <a:t>No regularization. </a:t>
+            </a:r>
+          </a:p>
+          <a:p>
+            <a:pPr lvl="1"/>
+            <a:r>
+              <a:rPr lang="en-US" dirty="0"/>
+              <a:t>There is a loss metric that tracks error (cross </a:t>
+            </a:r>
+            <a:r>
+              <a:rPr lang="en-US" dirty="0" err="1"/>
+              <a:t>ent</a:t>
+            </a:r>
+            <a:r>
+              <a:rPr lang="en-US" dirty="0"/>
+              <a:t>, </a:t>
+            </a:r>
+            <a:r>
+              <a:rPr lang="en-US" dirty="0" err="1"/>
+              <a:t>gini</a:t>
+            </a:r>
+            <a:r>
+              <a:rPr lang="en-US" dirty="0"/>
+              <a:t>, </a:t>
+            </a:r>
+            <a:r>
+              <a:rPr lang="en-US" dirty="0" err="1"/>
+              <a:t>mse,etc</a:t>
+            </a:r>
+            <a:r>
+              <a:rPr lang="en-US" dirty="0"/>
+              <a:t>..). </a:t>
+            </a:r>
+          </a:p>
+          <a:p>
+            <a:pPr lvl="1"/>
+            <a:r>
+              <a:rPr lang="en-US" dirty="0"/>
+              <a:t>The algorithm changes the models parameters (weights, decision points) to minimize loss. </a:t>
+            </a:r>
+          </a:p>
+          <a:p>
+            <a:r>
+              <a:rPr lang="en-US" dirty="0"/>
+              <a:t>Regularization. </a:t>
+            </a:r>
+          </a:p>
+          <a:p>
+            <a:pPr lvl="1"/>
+            <a:r>
+              <a:rPr lang="en-US" dirty="0"/>
+              <a:t>There is a loss metric that is a combination of error and size of model. </a:t>
+            </a:r>
+          </a:p>
+          <a:p>
+            <a:pPr lvl="1"/>
+            <a:r>
+              <a:rPr lang="en-US" dirty="0"/>
+              <a:t>The algorithm changes the models parameters (weights, decision points) to minimize loss. </a:t>
+            </a:r>
+          </a:p>
+          <a:p>
+            <a:r>
+              <a:rPr lang="en-US" dirty="0"/>
+              <a:t>Regularization changes the target that the algorithm optimizes for. </a:t>
+            </a:r>
+          </a:p>
+          <a:p>
+            <a:pPr lvl="1"/>
+            <a:r>
+              <a:rPr lang="en-US" dirty="0"/>
+              <a:t>Instead of only wanting low error, it wants low [error + size] instead. </a:t>
+            </a:r>
+          </a:p>
+          <a:p>
+            <a:pPr lvl="1"/>
+            <a:r>
+              <a:rPr lang="en-US" dirty="0"/>
+              <a:t>Process doesn’t change, still do </a:t>
+            </a:r>
+            <a:r>
+              <a:rPr lang="en-US" dirty="0" err="1"/>
+              <a:t>gd</a:t>
+            </a:r>
+            <a:r>
+              <a:rPr lang="en-US" dirty="0"/>
+              <a:t> or the tree algorithm (cart). </a:t>
+            </a:r>
+          </a:p>
+        </p:txBody>
+      </p:sp>
+    </p:spTree>
+    <p:extLst>
+      <p:ext uri="{BB962C8B-B14F-4D97-AF65-F5344CB8AC3E}">
+        <p14:creationId xmlns:p14="http://schemas.microsoft.com/office/powerpoint/2010/main" val="261719085"/>
+      </p:ext>
+    </p:extLst>
+  </p:cSld>
+  <p:clrMapOvr>
+    <a:masterClrMapping/>
+  </p:clrMapOvr>
+</p:sld>
+</file>
+
+<file path=ppt/slides/slide29.xml><?xml version="1.0" encoding="utf-8"?>
 <p:sld xmlns:a="http://schemas.openxmlformats.org/drawingml/2006/main" xmlns:r="http://schemas.openxmlformats.org/officeDocument/2006/relationships" xmlns:p="http://schemas.openxmlformats.org/presentationml/2006/main">
   <p:cSld>
     <p:bg>
@@ -7121,7 +7808,7 @@
         </p:spPr>
         <p:txBody>
           <a:bodyPr>
-            <a:normAutofit/>
+            <a:normAutofit lnSpcReduction="10000"/>
           </a:bodyPr>
           <a:lstStyle/>
           <a:p>
@@ -7170,7 +7857,7 @@
             </a:r>
             <a:r>
               <a:rPr lang="en-US" dirty="0"/>
-              <a:t>T|</a:t>
+              <a:t>T| </a:t>
             </a:r>
           </a:p>
           <a:p>
@@ -7185,6 +7872,21 @@
             <a:r>
               <a:rPr lang="en-US" dirty="0"/>
               <a:t>R(T) is traditionally defined as the total misclassification rate of the terminal nodes.</a:t>
+            </a:r>
+          </a:p>
+          <a:p>
+            <a:pPr lvl="2"/>
+            <a:r>
+              <a:rPr lang="en-US" dirty="0"/>
+              <a:t>This can be </a:t>
+            </a:r>
+            <a:r>
+              <a:rPr lang="en-US" dirty="0" err="1"/>
+              <a:t>gini</a:t>
+            </a:r>
+            <a:r>
+              <a:rPr lang="en-US" dirty="0"/>
+              <a:t> or entropy, it’s the same either way. </a:t>
             </a:r>
           </a:p>
           <a:p>
@@ -7205,780 +7907,6 @@
     <p:extLst>
       <p:ext uri="{BB962C8B-B14F-4D97-AF65-F5344CB8AC3E}">
         <p14:creationId xmlns:p14="http://schemas.microsoft.com/office/powerpoint/2010/main" val="3354885323"/>
-      </p:ext>
-    </p:extLst>
-  </p:cSld>
-  <p:clrMapOvr>
-    <a:masterClrMapping/>
-  </p:clrMapOvr>
-</p:sld>
-</file>
-
-<file path=ppt/slides/slide27.xml><?xml version="1.0" encoding="utf-8"?>
-<p:sld xmlns:a="http://schemas.openxmlformats.org/drawingml/2006/main" xmlns:r="http://schemas.openxmlformats.org/officeDocument/2006/relationships" xmlns:p="http://schemas.openxmlformats.org/presentationml/2006/main">
-  <p:cSld>
-    <p:spTree>
-      <p:nvGrpSpPr>
-        <p:cNvPr id="1" name=""/>
-        <p:cNvGrpSpPr/>
-        <p:nvPr/>
-      </p:nvGrpSpPr>
-      <p:grpSpPr>
-        <a:xfrm>
-          <a:off x="0" y="0"/>
-          <a:ext cx="0" cy="0"/>
-          <a:chOff x="0" y="0"/>
-          <a:chExt cx="0" cy="0"/>
-        </a:xfrm>
-      </p:grpSpPr>
-      <mc:AlternateContent xmlns:mc="http://schemas.openxmlformats.org/markup-compatibility/2006">
-        <mc:Choice xmlns:p14="http://schemas.microsoft.com/office/powerpoint/2010/main" Requires="p14">
-          <p:contentPart p14:bwMode="auto" r:id="rId2">
-            <p14:nvContentPartPr>
-              <p14:cNvPr id="4" name="Ink 3">
-                <a:extLst>
-                  <a:ext uri="{FF2B5EF4-FFF2-40B4-BE49-F238E27FC236}">
-                    <a16:creationId xmlns:a16="http://schemas.microsoft.com/office/drawing/2014/main" id="{815FA5C0-EE16-1990-AFF7-040D4C4D7849}"/>
-                  </a:ext>
-                </a:extLst>
-              </p14:cNvPr>
-              <p14:cNvContentPartPr/>
-              <p14:nvPr/>
-            </p14:nvContentPartPr>
-            <p14:xfrm>
-              <a:off x="207360" y="267120"/>
-              <a:ext cx="9317880" cy="3260520"/>
-            </p14:xfrm>
-          </p:contentPart>
-        </mc:Choice>
-        <mc:Fallback>
-          <p:pic>
-            <p:nvPicPr>
-              <p:cNvPr id="4" name="Ink 3">
-                <a:extLst>
-                  <a:ext uri="{FF2B5EF4-FFF2-40B4-BE49-F238E27FC236}">
-                    <a16:creationId xmlns:a16="http://schemas.microsoft.com/office/drawing/2014/main" id="{815FA5C0-EE16-1990-AFF7-040D4C4D7849}"/>
-                  </a:ext>
-                </a:extLst>
-              </p:cNvPr>
-              <p:cNvPicPr/>
-              <p:nvPr/>
-            </p:nvPicPr>
-            <p:blipFill>
-              <a:blip r:embed="rId3"/>
-              <a:stretch>
-                <a:fillRect/>
-              </a:stretch>
-            </p:blipFill>
-            <p:spPr>
-              <a:xfrm>
-                <a:off x="198000" y="257760"/>
-                <a:ext cx="9336600" cy="3279240"/>
-              </a:xfrm>
-              <a:prstGeom prst="rect">
-                <a:avLst/>
-              </a:prstGeom>
-            </p:spPr>
-          </p:pic>
-        </mc:Fallback>
-      </mc:AlternateContent>
-      <p:sp>
-        <p:nvSpPr>
-          <p:cNvPr id="5" name="TextBox 4">
-            <a:extLst>
-              <a:ext uri="{FF2B5EF4-FFF2-40B4-BE49-F238E27FC236}">
-                <a16:creationId xmlns:a16="http://schemas.microsoft.com/office/drawing/2014/main" id="{FFAB5FD9-C6AC-E842-B7A7-2DF888E263A5}"/>
-              </a:ext>
-            </a:extLst>
-          </p:cNvPr>
-          <p:cNvSpPr txBox="1"/>
-          <p:nvPr/>
-        </p:nvSpPr>
-        <p:spPr>
-          <a:xfrm>
-            <a:off x="207361" y="3675017"/>
-            <a:ext cx="4234010" cy="1754326"/>
-          </a:xfrm>
-          <a:prstGeom prst="rect">
-            <a:avLst/>
-          </a:prstGeom>
-          <a:noFill/>
-        </p:spPr>
-        <p:txBody>
-          <a:bodyPr wrap="square" rtlCol="0">
-            <a:spAutoFit/>
-          </a:bodyPr>
-          <a:lstStyle/>
-          <a:p>
-            <a:pPr marL="285750" indent="-285750">
-              <a:buFont typeface="Arial" panose="020B0604020202020204" pitchFamily="34" charset="0"/>
-              <a:buChar char="•"/>
-            </a:pPr>
-            <a:r>
-              <a:rPr lang="en-US" dirty="0"/>
-              <a:t>Normal:</a:t>
-            </a:r>
-          </a:p>
-          <a:p>
-            <a:pPr marL="285750" indent="-285750">
-              <a:buFont typeface="Arial" panose="020B0604020202020204" pitchFamily="34" charset="0"/>
-              <a:buChar char="•"/>
-            </a:pPr>
-            <a:r>
-              <a:rPr lang="en-US" dirty="0"/>
-              <a:t>R is the loss, what the algo minimizes.</a:t>
-            </a:r>
-          </a:p>
-          <a:p>
-            <a:pPr marL="742950" lvl="1" indent="-285750">
-              <a:buFont typeface="Arial" panose="020B0604020202020204" pitchFamily="34" charset="0"/>
-              <a:buChar char="•"/>
-            </a:pPr>
-            <a:r>
-              <a:rPr lang="en-US" dirty="0"/>
-              <a:t>R is misclassification pre split.</a:t>
-            </a:r>
-          </a:p>
-          <a:p>
-            <a:pPr marL="742950" lvl="1" indent="-285750">
-              <a:buFont typeface="Arial" panose="020B0604020202020204" pitchFamily="34" charset="0"/>
-              <a:buChar char="•"/>
-            </a:pPr>
-            <a:r>
-              <a:rPr lang="en-US" dirty="0"/>
-              <a:t>R’ is misclassification post split.</a:t>
-            </a:r>
-          </a:p>
-          <a:p>
-            <a:pPr marL="285750" indent="-285750">
-              <a:buFont typeface="Arial" panose="020B0604020202020204" pitchFamily="34" charset="0"/>
-              <a:buChar char="•"/>
-            </a:pPr>
-            <a:r>
-              <a:rPr lang="en-US" dirty="0"/>
-              <a:t>If R’ &lt; R then tree splits. </a:t>
-            </a:r>
-          </a:p>
-          <a:p>
-            <a:pPr marL="742950" lvl="1" indent="-285750">
-              <a:buFont typeface="Arial" panose="020B0604020202020204" pitchFamily="34" charset="0"/>
-              <a:buChar char="•"/>
-            </a:pPr>
-            <a:r>
-              <a:rPr lang="en-US" dirty="0"/>
-              <a:t>Loss metric is improved. </a:t>
-            </a:r>
-          </a:p>
-        </p:txBody>
-      </p:sp>
-      <p:sp>
-        <p:nvSpPr>
-          <p:cNvPr id="7" name="TextBox 6">
-            <a:extLst>
-              <a:ext uri="{FF2B5EF4-FFF2-40B4-BE49-F238E27FC236}">
-                <a16:creationId xmlns:a16="http://schemas.microsoft.com/office/drawing/2014/main" id="{1DA489E7-D069-C81F-2531-808FD2792F86}"/>
-              </a:ext>
-            </a:extLst>
-          </p:cNvPr>
-          <p:cNvSpPr txBox="1"/>
-          <p:nvPr/>
-        </p:nvSpPr>
-        <p:spPr>
-          <a:xfrm>
-            <a:off x="6096000" y="2917371"/>
-            <a:ext cx="5888639" cy="3139321"/>
-          </a:xfrm>
-          <a:prstGeom prst="rect">
-            <a:avLst/>
-          </a:prstGeom>
-          <a:noFill/>
-        </p:spPr>
-        <p:txBody>
-          <a:bodyPr wrap="square" rtlCol="0">
-            <a:spAutoFit/>
-          </a:bodyPr>
-          <a:lstStyle/>
-          <a:p>
-            <a:pPr marL="285750" indent="-285750">
-              <a:buFont typeface="Arial" panose="020B0604020202020204" pitchFamily="34" charset="0"/>
-              <a:buChar char="•"/>
-            </a:pPr>
-            <a:r>
-              <a:rPr lang="en-US" dirty="0"/>
-              <a:t>Pruned:</a:t>
-            </a:r>
-          </a:p>
-          <a:p>
-            <a:pPr marL="285750" indent="-285750">
-              <a:buFont typeface="Arial" panose="020B0604020202020204" pitchFamily="34" charset="0"/>
-              <a:buChar char="•"/>
-            </a:pPr>
-            <a:r>
-              <a:rPr lang="en-US" dirty="0" err="1"/>
-              <a:t>R+a</a:t>
-            </a:r>
-            <a:r>
-              <a:rPr lang="en-US" dirty="0"/>
-              <a:t>*T is the new loss. </a:t>
-            </a:r>
-          </a:p>
-          <a:p>
-            <a:pPr marL="742950" lvl="1" indent="-285750">
-              <a:buFont typeface="Arial" panose="020B0604020202020204" pitchFamily="34" charset="0"/>
-              <a:buChar char="•"/>
-            </a:pPr>
-            <a:r>
-              <a:rPr lang="en-US" dirty="0"/>
-              <a:t>R is still misclassification. </a:t>
-            </a:r>
-          </a:p>
-          <a:p>
-            <a:pPr marL="742950" lvl="1" indent="-285750">
-              <a:buFont typeface="Arial" panose="020B0604020202020204" pitchFamily="34" charset="0"/>
-              <a:buChar char="•"/>
-            </a:pPr>
-            <a:r>
-              <a:rPr lang="en-US" dirty="0"/>
-              <a:t>Alpha is a HP we set. </a:t>
-            </a:r>
-          </a:p>
-          <a:p>
-            <a:pPr marL="742950" lvl="1" indent="-285750">
-              <a:buFont typeface="Arial" panose="020B0604020202020204" pitchFamily="34" charset="0"/>
-              <a:buChar char="•"/>
-            </a:pPr>
-            <a:r>
-              <a:rPr lang="en-US" dirty="0"/>
-              <a:t>T is the number of term. nodes (size of tree). </a:t>
-            </a:r>
-          </a:p>
-          <a:p>
-            <a:pPr marL="285750" indent="-285750">
-              <a:buFont typeface="Arial" panose="020B0604020202020204" pitchFamily="34" charset="0"/>
-              <a:buChar char="•"/>
-            </a:pPr>
-            <a:r>
-              <a:rPr lang="en-US" dirty="0"/>
-              <a:t>If </a:t>
-            </a:r>
-            <a:r>
-              <a:rPr lang="en-US" dirty="0" err="1"/>
-              <a:t>R’+a</a:t>
-            </a:r>
-            <a:r>
-              <a:rPr lang="en-US" dirty="0"/>
-              <a:t>*T &lt; </a:t>
-            </a:r>
-            <a:r>
-              <a:rPr lang="en-US" dirty="0" err="1"/>
-              <a:t>R+a</a:t>
-            </a:r>
-            <a:r>
-              <a:rPr lang="en-US" dirty="0"/>
-              <a:t>*T then tree splits. </a:t>
-            </a:r>
-          </a:p>
-          <a:p>
-            <a:pPr marL="742950" lvl="1" indent="-285750">
-              <a:buFont typeface="Arial" panose="020B0604020202020204" pitchFamily="34" charset="0"/>
-              <a:buChar char="•"/>
-            </a:pPr>
-            <a:r>
-              <a:rPr lang="en-US" dirty="0"/>
-              <a:t>Loss still needs to be improved, however…</a:t>
-            </a:r>
-          </a:p>
-          <a:p>
-            <a:pPr marL="742950" lvl="1" indent="-285750">
-              <a:buFont typeface="Arial" panose="020B0604020202020204" pitchFamily="34" charset="0"/>
-              <a:buChar char="•"/>
-            </a:pPr>
-            <a:r>
-              <a:rPr lang="en-US" dirty="0"/>
-              <a:t>Loss will improve if we reduce misclassifications. </a:t>
-            </a:r>
-          </a:p>
-          <a:p>
-            <a:pPr marL="742950" lvl="1" indent="-285750">
-              <a:buFont typeface="Arial" panose="020B0604020202020204" pitchFamily="34" charset="0"/>
-              <a:buChar char="•"/>
-            </a:pPr>
-            <a:r>
-              <a:rPr lang="en-US" dirty="0"/>
-              <a:t>Loss will get worse if we make tree bigger. </a:t>
-            </a:r>
-          </a:p>
-          <a:p>
-            <a:pPr marL="285750" indent="-285750">
-              <a:buFont typeface="Arial" panose="020B0604020202020204" pitchFamily="34" charset="0"/>
-              <a:buChar char="•"/>
-            </a:pPr>
-            <a:r>
-              <a:rPr lang="en-US" dirty="0"/>
-              <a:t>For a split to improve loss, the gain from acc must outweigh the penalty from growth. </a:t>
-            </a:r>
-          </a:p>
-        </p:txBody>
-      </p:sp>
-      <p:sp>
-        <p:nvSpPr>
-          <p:cNvPr id="8" name="TextBox 7">
-            <a:extLst>
-              <a:ext uri="{FF2B5EF4-FFF2-40B4-BE49-F238E27FC236}">
-                <a16:creationId xmlns:a16="http://schemas.microsoft.com/office/drawing/2014/main" id="{A8068986-3270-3D2E-C34C-5B97A4BA0648}"/>
-              </a:ext>
-            </a:extLst>
-          </p:cNvPr>
-          <p:cNvSpPr txBox="1"/>
-          <p:nvPr/>
-        </p:nvSpPr>
-        <p:spPr>
-          <a:xfrm>
-            <a:off x="9525240" y="2228671"/>
-            <a:ext cx="3457303" cy="1200329"/>
-          </a:xfrm>
-          <a:prstGeom prst="rect">
-            <a:avLst/>
-          </a:prstGeom>
-          <a:noFill/>
-        </p:spPr>
-        <p:txBody>
-          <a:bodyPr wrap="square" rtlCol="0">
-            <a:spAutoFit/>
-          </a:bodyPr>
-          <a:lstStyle/>
-          <a:p>
-            <a:pPr marL="285750" indent="-285750">
-              <a:buFont typeface="Arial" panose="020B0604020202020204" pitchFamily="34" charset="0"/>
-              <a:buChar char="•"/>
-            </a:pPr>
-            <a:r>
-              <a:rPr lang="en-US" dirty="0"/>
-              <a:t>Loss has two sources:</a:t>
-            </a:r>
-          </a:p>
-          <a:p>
-            <a:pPr marL="742950" lvl="1" indent="-285750">
-              <a:buFont typeface="Arial" panose="020B0604020202020204" pitchFamily="34" charset="0"/>
-              <a:buChar char="•"/>
-            </a:pPr>
-            <a:r>
-              <a:rPr lang="en-US" dirty="0"/>
-              <a:t>Errors (unchanged). </a:t>
-            </a:r>
-          </a:p>
-          <a:p>
-            <a:pPr marL="742950" lvl="1" indent="-285750">
-              <a:buFont typeface="Arial" panose="020B0604020202020204" pitchFamily="34" charset="0"/>
-              <a:buChar char="•"/>
-            </a:pPr>
-            <a:r>
-              <a:rPr lang="en-US" dirty="0"/>
-              <a:t>Size of model (new). </a:t>
-            </a:r>
-          </a:p>
-          <a:p>
-            <a:pPr marL="285750" indent="-285750">
-              <a:buFont typeface="Arial" panose="020B0604020202020204" pitchFamily="34" charset="0"/>
-              <a:buChar char="•"/>
-            </a:pPr>
-            <a:r>
-              <a:rPr lang="en-US" dirty="0"/>
-              <a:t>Total loss is minimized. 	</a:t>
-            </a:r>
-          </a:p>
-        </p:txBody>
-      </p:sp>
-    </p:spTree>
-    <p:extLst>
-      <p:ext uri="{BB962C8B-B14F-4D97-AF65-F5344CB8AC3E}">
-        <p14:creationId xmlns:p14="http://schemas.microsoft.com/office/powerpoint/2010/main" val="3343556452"/>
-      </p:ext>
-    </p:extLst>
-  </p:cSld>
-  <p:clrMapOvr>
-    <a:masterClrMapping/>
-  </p:clrMapOvr>
-</p:sld>
-</file>
-
-<file path=ppt/slides/slide28.xml><?xml version="1.0" encoding="utf-8"?>
-<p:sld xmlns:a="http://schemas.openxmlformats.org/drawingml/2006/main" xmlns:r="http://schemas.openxmlformats.org/officeDocument/2006/relationships" xmlns:p="http://schemas.openxmlformats.org/presentationml/2006/main">
-  <p:cSld>
-    <p:bg>
-      <p:bgPr>
-        <a:gradFill rotWithShape="1">
-          <a:gsLst>
-            <a:gs pos="0">
-              <a:schemeClr val="bg2">
-                <a:tint val="94000"/>
-                <a:satMod val="80000"/>
-                <a:lumMod val="106000"/>
-              </a:schemeClr>
-            </a:gs>
-            <a:gs pos="100000">
-              <a:schemeClr val="bg2">
-                <a:shade val="80000"/>
-              </a:schemeClr>
-            </a:gs>
-          </a:gsLst>
-          <a:path path="circle">
-            <a:fillToRect l="43000" r="43000" b="100000"/>
-          </a:path>
-        </a:gradFill>
-        <a:effectLst/>
-      </p:bgPr>
-    </p:bg>
-    <p:spTree>
-      <p:nvGrpSpPr>
-        <p:cNvPr id="1" name=""/>
-        <p:cNvGrpSpPr/>
-        <p:nvPr/>
-      </p:nvGrpSpPr>
-      <p:grpSpPr>
-        <a:xfrm>
-          <a:off x="0" y="0"/>
-          <a:ext cx="0" cy="0"/>
-          <a:chOff x="0" y="0"/>
-          <a:chExt cx="0" cy="0"/>
-        </a:xfrm>
-      </p:grpSpPr>
-      <p:sp>
-        <p:nvSpPr>
-          <p:cNvPr id="2" name="Title 1">
-            <a:extLst>
-              <a:ext uri="{FF2B5EF4-FFF2-40B4-BE49-F238E27FC236}">
-                <a16:creationId xmlns:a16="http://schemas.microsoft.com/office/drawing/2014/main" id="{F83272B1-1C72-7FE0-9237-0E15D46E288C}"/>
-              </a:ext>
-            </a:extLst>
-          </p:cNvPr>
-          <p:cNvSpPr>
-            <a:spLocks noGrp="1"/>
-          </p:cNvSpPr>
-          <p:nvPr>
-            <p:ph type="title"/>
-          </p:nvPr>
-        </p:nvSpPr>
-        <p:spPr>
-          <a:xfrm>
-            <a:off x="1451579" y="804519"/>
-            <a:ext cx="9603275" cy="1049235"/>
-          </a:xfrm>
-        </p:spPr>
-        <p:txBody>
-          <a:bodyPr>
-            <a:normAutofit/>
-          </a:bodyPr>
-          <a:lstStyle/>
-          <a:p>
-            <a:r>
-              <a:rPr lang="en-US" dirty="0"/>
-              <a:t>Be More Alpha</a:t>
-            </a:r>
-          </a:p>
-        </p:txBody>
-      </p:sp>
-      <p:sp>
-        <p:nvSpPr>
-          <p:cNvPr id="3" name="Content Placeholder 2">
-            <a:extLst>
-              <a:ext uri="{FF2B5EF4-FFF2-40B4-BE49-F238E27FC236}">
-                <a16:creationId xmlns:a16="http://schemas.microsoft.com/office/drawing/2014/main" id="{DE80268F-9F8B-ADFA-92C1-6DE2CFA88B0E}"/>
-              </a:ext>
-            </a:extLst>
-          </p:cNvPr>
-          <p:cNvSpPr>
-            <a:spLocks noGrp="1"/>
-          </p:cNvSpPr>
-          <p:nvPr>
-            <p:ph idx="1"/>
-          </p:nvPr>
-        </p:nvSpPr>
-        <p:spPr>
-          <a:xfrm>
-            <a:off x="357352" y="1853753"/>
-            <a:ext cx="7693572" cy="4199727"/>
-          </a:xfrm>
-        </p:spPr>
-        <p:txBody>
-          <a:bodyPr>
-            <a:normAutofit/>
-          </a:bodyPr>
-          <a:lstStyle/>
-          <a:p>
-            <a:r>
-              <a:rPr lang="en-US" dirty="0"/>
-              <a:t>In the CCP equation R</a:t>
-            </a:r>
-            <a:r>
-              <a:rPr lang="el-GR" dirty="0"/>
-              <a:t>α(</a:t>
-            </a:r>
-            <a:r>
-              <a:rPr lang="en-US" dirty="0"/>
-              <a:t>T)=R(T)+</a:t>
-            </a:r>
-            <a:r>
-              <a:rPr lang="el-GR" dirty="0"/>
-              <a:t>α|</a:t>
-            </a:r>
-            <a:r>
-              <a:rPr lang="en-US" dirty="0"/>
-              <a:t>T| the alpha-t is a penalty. </a:t>
-            </a:r>
-          </a:p>
-          <a:p>
-            <a:pPr lvl="1"/>
-            <a:r>
-              <a:rPr lang="en-US" dirty="0"/>
-              <a:t>The larger the number of terminal nodes gets, the larger the penalty. </a:t>
-            </a:r>
-          </a:p>
-          <a:p>
-            <a:pPr lvl="1"/>
-            <a:r>
-              <a:rPr lang="en-US" dirty="0"/>
-              <a:t>The larger alpha gets, the larger the penalty. </a:t>
-            </a:r>
-          </a:p>
-          <a:p>
-            <a:r>
-              <a:rPr lang="en-US" dirty="0"/>
-              <a:t>Effectively removes things that have many terminal leaves. </a:t>
-            </a:r>
-          </a:p>
-          <a:p>
-            <a:pPr lvl="1"/>
-            <a:r>
-              <a:rPr lang="en-US" dirty="0"/>
-              <a:t>Larger trees will generate larger penalties in branches. </a:t>
-            </a:r>
-          </a:p>
-          <a:p>
-            <a:pPr lvl="1"/>
-            <a:r>
-              <a:rPr lang="en-US" dirty="0"/>
-              <a:t>Tends to limit overfitting, as it stops large branches from being developed. </a:t>
-            </a:r>
-          </a:p>
-          <a:p>
-            <a:r>
-              <a:rPr lang="en-US" dirty="0"/>
-              <a:t>Adding a penalty to “size” is a common strategy. </a:t>
-            </a:r>
-          </a:p>
-          <a:p>
-            <a:pPr lvl="1"/>
-            <a:r>
-              <a:rPr lang="en-US" dirty="0"/>
-              <a:t>If a split is going to happen, it needs to “overcome” the penalty incurred by increasing the number of terminal nodes ( |T| increases ). </a:t>
-            </a:r>
-          </a:p>
-          <a:p>
-            <a:pPr lvl="1"/>
-            <a:r>
-              <a:rPr lang="en-US" dirty="0"/>
-              <a:t>R(T) needs to decrease, or more accuracy, to overcome alpha-T increase.</a:t>
-            </a:r>
-          </a:p>
-        </p:txBody>
-      </p:sp>
-      <p:pic>
-        <p:nvPicPr>
-          <p:cNvPr id="2050" name="Picture 2" descr="Stream Chad music | Listen to songs, albums, playlists for free on  SoundCloud">
-            <a:extLst>
-              <a:ext uri="{FF2B5EF4-FFF2-40B4-BE49-F238E27FC236}">
-                <a16:creationId xmlns:a16="http://schemas.microsoft.com/office/drawing/2014/main" id="{53F075D9-6980-3E8E-1C91-D244837A2860}"/>
-              </a:ext>
-            </a:extLst>
-          </p:cNvPr>
-          <p:cNvPicPr>
-            <a:picLocks noChangeAspect="1" noChangeArrowheads="1"/>
-          </p:cNvPicPr>
-          <p:nvPr/>
-        </p:nvPicPr>
-        <p:blipFill>
-          <a:blip r:embed="rId2">
-            <a:extLst>
-              <a:ext uri="{28A0092B-C50C-407E-A947-70E740481C1C}">
-                <a14:useLocalDpi xmlns:a14="http://schemas.microsoft.com/office/drawing/2010/main" val="0"/>
-              </a:ext>
-            </a:extLst>
-          </a:blip>
-          <a:stretch>
-            <a:fillRect/>
-          </a:stretch>
-        </p:blipFill>
-        <p:spPr bwMode="auto">
-          <a:xfrm>
-            <a:off x="8050924" y="1952672"/>
-            <a:ext cx="3966851" cy="3966851"/>
-          </a:xfrm>
-          <a:prstGeom prst="rect">
-            <a:avLst/>
-          </a:prstGeom>
-          <a:noFill/>
-          <a:extLst>
-            <a:ext uri="{909E8E84-426E-40DD-AFC4-6F175D3DCCD1}">
-              <a14:hiddenFill xmlns:a14="http://schemas.microsoft.com/office/drawing/2010/main">
-                <a:solidFill>
-                  <a:srgbClr val="FFFFFF"/>
-                </a:solidFill>
-              </a14:hiddenFill>
-            </a:ext>
-          </a:extLst>
-        </p:spPr>
-      </p:pic>
-    </p:spTree>
-    <p:extLst>
-      <p:ext uri="{BB962C8B-B14F-4D97-AF65-F5344CB8AC3E}">
-        <p14:creationId xmlns:p14="http://schemas.microsoft.com/office/powerpoint/2010/main" val="1058985009"/>
-      </p:ext>
-    </p:extLst>
-  </p:cSld>
-  <p:clrMapOvr>
-    <a:masterClrMapping/>
-  </p:clrMapOvr>
-</p:sld>
-</file>
-
-<file path=ppt/slides/slide29.xml><?xml version="1.0" encoding="utf-8"?>
-<p:sld xmlns:a="http://schemas.openxmlformats.org/drawingml/2006/main" xmlns:r="http://schemas.openxmlformats.org/officeDocument/2006/relationships" xmlns:p="http://schemas.openxmlformats.org/presentationml/2006/main">
-  <p:cSld>
-    <p:spTree>
-      <p:nvGrpSpPr>
-        <p:cNvPr id="1" name=""/>
-        <p:cNvGrpSpPr/>
-        <p:nvPr/>
-      </p:nvGrpSpPr>
-      <p:grpSpPr>
-        <a:xfrm>
-          <a:off x="0" y="0"/>
-          <a:ext cx="0" cy="0"/>
-          <a:chOff x="0" y="0"/>
-          <a:chExt cx="0" cy="0"/>
-        </a:xfrm>
-      </p:grpSpPr>
-      <p:sp>
-        <p:nvSpPr>
-          <p:cNvPr id="2" name="Title 1">
-            <a:extLst>
-              <a:ext uri="{FF2B5EF4-FFF2-40B4-BE49-F238E27FC236}">
-                <a16:creationId xmlns:a16="http://schemas.microsoft.com/office/drawing/2014/main" id="{0253FB35-2231-F2D8-4B0B-09701A661304}"/>
-              </a:ext>
-            </a:extLst>
-          </p:cNvPr>
-          <p:cNvSpPr>
-            <a:spLocks noGrp="1"/>
-          </p:cNvSpPr>
-          <p:nvPr>
-            <p:ph type="title"/>
-          </p:nvPr>
-        </p:nvSpPr>
-        <p:spPr/>
-        <p:txBody>
-          <a:bodyPr/>
-          <a:lstStyle/>
-          <a:p>
-            <a:r>
-              <a:rPr lang="en-US" dirty="0"/>
-              <a:t>Keep it Regular(</a:t>
-            </a:r>
-            <a:r>
-              <a:rPr lang="en-US" dirty="0" err="1"/>
-              <a:t>ized</a:t>
-            </a:r>
-            <a:r>
-              <a:rPr lang="en-US" dirty="0"/>
-              <a:t>)</a:t>
-            </a:r>
-          </a:p>
-        </p:txBody>
-      </p:sp>
-      <p:sp>
-        <p:nvSpPr>
-          <p:cNvPr id="3" name="Content Placeholder 2">
-            <a:extLst>
-              <a:ext uri="{FF2B5EF4-FFF2-40B4-BE49-F238E27FC236}">
-                <a16:creationId xmlns:a16="http://schemas.microsoft.com/office/drawing/2014/main" id="{6FF46A87-B2D2-1378-2D6B-EC9B384DF06E}"/>
-              </a:ext>
-            </a:extLst>
-          </p:cNvPr>
-          <p:cNvSpPr>
-            <a:spLocks noGrp="1"/>
-          </p:cNvSpPr>
-          <p:nvPr>
-            <p:ph idx="1"/>
-          </p:nvPr>
-        </p:nvSpPr>
-        <p:spPr>
-          <a:xfrm>
-            <a:off x="1451579" y="2015732"/>
-            <a:ext cx="9603275" cy="3958348"/>
-          </a:xfrm>
-        </p:spPr>
-        <p:txBody>
-          <a:bodyPr/>
-          <a:lstStyle/>
-          <a:p>
-            <a:r>
-              <a:rPr lang="en-US" dirty="0"/>
-              <a:t>This type of constraint on growth, regularization, is quite common. </a:t>
-            </a:r>
-          </a:p>
-          <a:p>
-            <a:pPr lvl="1"/>
-            <a:r>
-              <a:rPr lang="en-US" dirty="0"/>
-              <a:t>Easy to implement – just change the loss function. </a:t>
-            </a:r>
-          </a:p>
-          <a:p>
-            <a:pPr lvl="1"/>
-            <a:r>
-              <a:rPr lang="en-US" dirty="0"/>
-              <a:t>Can work anywhere with loss (and a size metric). </a:t>
-            </a:r>
-          </a:p>
-          <a:p>
-            <a:pPr lvl="1"/>
-            <a:r>
-              <a:rPr lang="en-US" dirty="0"/>
-              <a:t>‘Automatic’ – growth can be limited throughout training*.</a:t>
-            </a:r>
-          </a:p>
-          <a:p>
-            <a:r>
-              <a:rPr lang="en-US" dirty="0"/>
-              <a:t>On the downside, we need to provide alpha as a hyperparameter. </a:t>
-            </a:r>
-          </a:p>
-          <a:p>
-            <a:r>
-              <a:rPr lang="en-US" dirty="0"/>
-              <a:t>Instead of targeting “most accurate model” we target “most accurate considering size”. </a:t>
-            </a:r>
-          </a:p>
-          <a:p>
-            <a:pPr lvl="1"/>
-            <a:r>
-              <a:rPr lang="en-US" dirty="0"/>
-              <a:t>Big trees have great accuracy, but the size will cause their loss to be large.</a:t>
-            </a:r>
-          </a:p>
-          <a:p>
-            <a:pPr lvl="1"/>
-            <a:r>
-              <a:rPr lang="en-US" dirty="0"/>
-              <a:t>If the tree can’t get big, it can’t overfit much. </a:t>
-            </a:r>
-          </a:p>
-        </p:txBody>
-      </p:sp>
-    </p:spTree>
-    <p:extLst>
-      <p:ext uri="{BB962C8B-B14F-4D97-AF65-F5344CB8AC3E}">
-        <p14:creationId xmlns:p14="http://schemas.microsoft.com/office/powerpoint/2010/main" val="1318359576"/>
       </p:ext>
     </p:extLst>
   </p:cSld>
@@ -8213,129 +8141,160 @@
           <a:chExt cx="0" cy="0"/>
         </a:xfrm>
       </p:grpSpPr>
-      <p:sp>
-        <p:nvSpPr>
-          <p:cNvPr id="2" name="Title 1">
+      <mc:AlternateContent xmlns:mc="http://schemas.openxmlformats.org/markup-compatibility/2006" xmlns:p14="http://schemas.microsoft.com/office/powerpoint/2010/main">
+        <mc:Choice Requires="p14">
+          <p:contentPart p14:bwMode="auto" r:id="rId2">
+            <p14:nvContentPartPr>
+              <p14:cNvPr id="4" name="Ink 3">
+                <a:extLst>
+                  <a:ext uri="{FF2B5EF4-FFF2-40B4-BE49-F238E27FC236}">
+                    <a16:creationId xmlns:a16="http://schemas.microsoft.com/office/drawing/2014/main" id="{815FA5C0-EE16-1990-AFF7-040D4C4D7849}"/>
+                  </a:ext>
+                </a:extLst>
+              </p14:cNvPr>
+              <p14:cNvContentPartPr/>
+              <p14:nvPr/>
+            </p14:nvContentPartPr>
+            <p14:xfrm>
+              <a:off x="207360" y="424800"/>
+              <a:ext cx="4355280" cy="3102840"/>
+            </p14:xfrm>
+          </p:contentPart>
+        </mc:Choice>
+        <mc:Fallback xmlns="">
+          <p:pic>
+            <p:nvPicPr>
+              <p:cNvPr id="4" name="Ink 3">
+                <a:extLst>
+                  <a:ext uri="{FF2B5EF4-FFF2-40B4-BE49-F238E27FC236}">
+                    <a16:creationId xmlns:a16="http://schemas.microsoft.com/office/drawing/2014/main" id="{815FA5C0-EE16-1990-AFF7-040D4C4D7849}"/>
+                  </a:ext>
+                </a:extLst>
+              </p:cNvPr>
+              <p:cNvPicPr/>
+              <p:nvPr/>
+            </p:nvPicPr>
+            <p:blipFill>
+              <a:blip r:embed="rId3"/>
+              <a:stretch>
+                <a:fillRect/>
+              </a:stretch>
+            </p:blipFill>
+            <p:spPr>
+              <a:xfrm>
+                <a:off x="198000" y="257760"/>
+                <a:ext cx="9336600" cy="3279240"/>
+              </a:xfrm>
+              <a:prstGeom prst="rect">
+                <a:avLst/>
+              </a:prstGeom>
+            </p:spPr>
+          </p:pic>
+        </mc:Fallback>
+      </mc:AlternateContent>
+      <p:sp>
+        <p:nvSpPr>
+          <p:cNvPr id="5" name="TextBox 4">
             <a:extLst>
               <a:ext uri="{FF2B5EF4-FFF2-40B4-BE49-F238E27FC236}">
-                <a16:creationId xmlns:a16="http://schemas.microsoft.com/office/drawing/2014/main" id="{8FC6E27A-7A16-2BB7-84CA-2A46F279A2B1}"/>
+                <a16:creationId xmlns:a16="http://schemas.microsoft.com/office/drawing/2014/main" id="{FFAB5FD9-C6AC-E842-B7A7-2DF888E263A5}"/>
               </a:ext>
             </a:extLst>
           </p:cNvPr>
-          <p:cNvSpPr>
-            <a:spLocks noGrp="1"/>
-          </p:cNvSpPr>
-          <p:nvPr>
-            <p:ph type="title"/>
-          </p:nvPr>
-        </p:nvSpPr>
-        <p:spPr/>
-        <p:txBody>
-          <a:bodyPr/>
-          <a:lstStyle/>
-          <a:p>
-            <a:r>
-              <a:rPr lang="en-US" dirty="0"/>
-              <a:t>Use some Trees</a:t>
-            </a:r>
-          </a:p>
-        </p:txBody>
-      </p:sp>
-      <p:sp>
-        <p:nvSpPr>
-          <p:cNvPr id="3" name="Content Placeholder 2">
-            <a:extLst>
-              <a:ext uri="{FF2B5EF4-FFF2-40B4-BE49-F238E27FC236}">
-                <a16:creationId xmlns:a16="http://schemas.microsoft.com/office/drawing/2014/main" id="{440B18D2-4522-6750-133C-560FB6822F19}"/>
-              </a:ext>
-            </a:extLst>
-          </p:cNvPr>
-          <p:cNvSpPr>
-            <a:spLocks noGrp="1"/>
-          </p:cNvSpPr>
-          <p:nvPr>
-            <p:ph idx="1"/>
-          </p:nvPr>
+          <p:cNvSpPr txBox="1"/>
+          <p:nvPr/>
         </p:nvSpPr>
         <p:spPr>
           <a:xfrm>
-            <a:off x="1451579" y="1853754"/>
-            <a:ext cx="9603275" cy="4199727"/>
+            <a:off x="207360" y="3675017"/>
+            <a:ext cx="7953873" cy="2031325"/>
           </a:xfrm>
+          <a:prstGeom prst="rect">
+            <a:avLst/>
+          </a:prstGeom>
+          <a:noFill/>
         </p:spPr>
         <p:txBody>
-          <a:bodyPr/>
-          <a:lstStyle/>
-          <a:p>
-            <a:r>
-              <a:rPr lang="en-US" dirty="0"/>
-              <a:t>Trees are one of the most approachable model types to understand:</a:t>
-            </a:r>
-          </a:p>
-          <a:p>
-            <a:pPr lvl="1"/>
-            <a:r>
-              <a:rPr lang="en-US" dirty="0"/>
-              <a:t>We can visualize the entire process and walk through decisions in English. </a:t>
-            </a:r>
-          </a:p>
-          <a:p>
-            <a:r>
-              <a:rPr lang="en-US" dirty="0"/>
-              <a:t>Trees tend to be greedy, so we need ways to limit the overfitting. </a:t>
-            </a:r>
-          </a:p>
-          <a:p>
-            <a:pPr lvl="1"/>
-            <a:r>
-              <a:rPr lang="en-US" dirty="0"/>
-              <a:t>Tuning the settings of hyperparameters and regularization. </a:t>
-            </a:r>
-          </a:p>
-          <a:p>
-            <a:pPr lvl="1"/>
-            <a:r>
-              <a:rPr lang="en-US" dirty="0"/>
-              <a:t>Tree creation algorithms seek purity – each node is uniform. </a:t>
-            </a:r>
-          </a:p>
-          <a:p>
-            <a:r>
-              <a:rPr lang="en-US" dirty="0"/>
-              <a:t>Trees do the same thing as regression, but in a totally different mathematical way. </a:t>
-            </a:r>
-          </a:p>
-          <a:p>
-            <a:pPr lvl="1"/>
-            <a:r>
-              <a:rPr lang="en-US" dirty="0"/>
-              <a:t>Linear models assume a linear relationship, trees are non-parametric. </a:t>
-            </a:r>
-          </a:p>
-          <a:p>
-            <a:pPr lvl="1"/>
-            <a:r>
-              <a:rPr lang="en-US" dirty="0"/>
-              <a:t>Different data may work better with one or the other (or some other type). </a:t>
-            </a:r>
-          </a:p>
-          <a:p>
-            <a:r>
-              <a:rPr lang="en-US" dirty="0"/>
-              <a:t>Many of the best non neural network models use some trees in </a:t>
-            </a:r>
-            <a:r>
-              <a:rPr lang="en-US"/>
-              <a:t>different ways… </a:t>
-            </a:r>
-            <a:endParaRPr lang="en-US" dirty="0"/>
+          <a:bodyPr wrap="square" rtlCol="0">
+            <a:spAutoFit/>
+          </a:bodyPr>
+          <a:lstStyle/>
+          <a:p>
+            <a:pPr marL="285750" indent="-285750">
+              <a:buFont typeface="Arial" panose="020B0604020202020204" pitchFamily="34" charset="0"/>
+              <a:buChar char="•"/>
+            </a:pPr>
+            <a:r>
+              <a:rPr lang="en-US" dirty="0"/>
+              <a:t>Normal:</a:t>
+            </a:r>
+          </a:p>
+          <a:p>
+            <a:pPr marL="285750" indent="-285750">
+              <a:buFont typeface="Arial" panose="020B0604020202020204" pitchFamily="34" charset="0"/>
+              <a:buChar char="•"/>
+            </a:pPr>
+            <a:r>
+              <a:rPr lang="en-US" dirty="0"/>
+              <a:t>R is the loss, what the algo minimizes.</a:t>
+            </a:r>
+          </a:p>
+          <a:p>
+            <a:pPr marL="742950" lvl="1" indent="-285750">
+              <a:buFont typeface="Arial" panose="020B0604020202020204" pitchFamily="34" charset="0"/>
+              <a:buChar char="•"/>
+            </a:pPr>
+            <a:r>
+              <a:rPr lang="en-US" dirty="0"/>
+              <a:t>R is misclassification pre split.</a:t>
+            </a:r>
+          </a:p>
+          <a:p>
+            <a:pPr marL="742950" lvl="1" indent="-285750">
+              <a:buFont typeface="Arial" panose="020B0604020202020204" pitchFamily="34" charset="0"/>
+              <a:buChar char="•"/>
+            </a:pPr>
+            <a:r>
+              <a:rPr lang="en-US" dirty="0"/>
+              <a:t>R’ is misclassification post split.</a:t>
+            </a:r>
+          </a:p>
+          <a:p>
+            <a:pPr marL="285750" indent="-285750">
+              <a:buFont typeface="Arial" panose="020B0604020202020204" pitchFamily="34" charset="0"/>
+              <a:buChar char="•"/>
+            </a:pPr>
+            <a:r>
+              <a:rPr lang="en-US" dirty="0"/>
+              <a:t>If R’ &lt; R then tree splits. </a:t>
+            </a:r>
+          </a:p>
+          <a:p>
+            <a:pPr marL="742950" lvl="1" indent="-285750">
+              <a:buFont typeface="Arial" panose="020B0604020202020204" pitchFamily="34" charset="0"/>
+              <a:buChar char="•"/>
+            </a:pPr>
+            <a:r>
+              <a:rPr lang="en-US" dirty="0"/>
+              <a:t>Loss metric is improved. </a:t>
+            </a:r>
+          </a:p>
+          <a:p>
+            <a:pPr marL="742950" lvl="1" indent="-285750">
+              <a:buFont typeface="Arial" panose="020B0604020202020204" pitchFamily="34" charset="0"/>
+              <a:buChar char="•"/>
+            </a:pPr>
+            <a:r>
+              <a:rPr lang="en-US" dirty="0"/>
+              <a:t>The specific decision is whichever causes this improvement to be largest. </a:t>
+            </a:r>
           </a:p>
         </p:txBody>
       </p:sp>
     </p:spTree>
     <p:extLst>
       <p:ext uri="{BB962C8B-B14F-4D97-AF65-F5344CB8AC3E}">
-        <p14:creationId xmlns:p14="http://schemas.microsoft.com/office/powerpoint/2010/main" val="1193789722"/>
+        <p14:creationId xmlns:p14="http://schemas.microsoft.com/office/powerpoint/2010/main" val="3343556452"/>
       </p:ext>
     </p:extLst>
   </p:cSld>
@@ -8350,7 +8309,13 @@
   <p:cSld>
     <p:spTree>
       <p:nvGrpSpPr>
-        <p:cNvPr id="1" name=""/>
+        <p:cNvPr id="1" name="">
+          <a:extLst>
+            <a:ext uri="{FF2B5EF4-FFF2-40B4-BE49-F238E27FC236}">
+              <a16:creationId xmlns:a16="http://schemas.microsoft.com/office/drawing/2014/main" id="{26B07A4C-5E73-A397-6346-E8394375C603}"/>
+            </a:ext>
+          </a:extLst>
+        </p:cNvPr>
         <p:cNvGrpSpPr/>
         <p:nvPr/>
       </p:nvGrpSpPr>
@@ -8362,162 +8327,360 @@
           <a:chExt cx="0" cy="0"/>
         </a:xfrm>
       </p:grpSpPr>
-      <p:sp>
-        <p:nvSpPr>
-          <p:cNvPr id="2" name="Title 1">
+      <mc:AlternateContent xmlns:mc="http://schemas.openxmlformats.org/markup-compatibility/2006">
+        <mc:Choice xmlns:p14="http://schemas.microsoft.com/office/powerpoint/2010/main" Requires="p14">
+          <p:contentPart p14:bwMode="auto" r:id="rId2">
+            <p14:nvContentPartPr>
+              <p14:cNvPr id="4" name="Ink 3">
+                <a:extLst>
+                  <a:ext uri="{FF2B5EF4-FFF2-40B4-BE49-F238E27FC236}">
+                    <a16:creationId xmlns:a16="http://schemas.microsoft.com/office/drawing/2014/main" id="{71CD115E-1D68-FE76-9124-EB2B94576375}"/>
+                  </a:ext>
+                </a:extLst>
+              </p14:cNvPr>
+              <p14:cNvContentPartPr/>
+              <p14:nvPr/>
+            </p14:nvContentPartPr>
+            <p14:xfrm>
+              <a:off x="207360" y="267120"/>
+              <a:ext cx="9317880" cy="3260520"/>
+            </p14:xfrm>
+          </p:contentPart>
+        </mc:Choice>
+        <mc:Fallback>
+          <p:pic>
+            <p:nvPicPr>
+              <p:cNvPr id="4" name="Ink 3">
+                <a:extLst>
+                  <a:ext uri="{FF2B5EF4-FFF2-40B4-BE49-F238E27FC236}">
+                    <a16:creationId xmlns:a16="http://schemas.microsoft.com/office/drawing/2014/main" id="{71CD115E-1D68-FE76-9124-EB2B94576375}"/>
+                  </a:ext>
+                </a:extLst>
+              </p:cNvPr>
+              <p:cNvPicPr/>
+              <p:nvPr/>
+            </p:nvPicPr>
+            <p:blipFill>
+              <a:blip r:embed="rId3"/>
+              <a:stretch>
+                <a:fillRect/>
+              </a:stretch>
+            </p:blipFill>
+            <p:spPr>
+              <a:xfrm>
+                <a:off x="198000" y="257760"/>
+                <a:ext cx="9336600" cy="3279240"/>
+              </a:xfrm>
+              <a:prstGeom prst="rect">
+                <a:avLst/>
+              </a:prstGeom>
+            </p:spPr>
+          </p:pic>
+        </mc:Fallback>
+      </mc:AlternateContent>
+      <p:sp>
+        <p:nvSpPr>
+          <p:cNvPr id="5" name="TextBox 4">
             <a:extLst>
               <a:ext uri="{FF2B5EF4-FFF2-40B4-BE49-F238E27FC236}">
-                <a16:creationId xmlns:a16="http://schemas.microsoft.com/office/drawing/2014/main" id="{2DF37E66-E01D-4267-703B-A39F643100C5}"/>
+                <a16:creationId xmlns:a16="http://schemas.microsoft.com/office/drawing/2014/main" id="{3546D354-06B8-6E51-648F-2EC6866C4372}"/>
               </a:ext>
             </a:extLst>
           </p:cNvPr>
-          <p:cNvSpPr>
-            <a:spLocks noGrp="1"/>
-          </p:cNvSpPr>
-          <p:nvPr>
-            <p:ph type="title"/>
-          </p:nvPr>
-        </p:nvSpPr>
-        <p:spPr/>
-        <p:txBody>
-          <a:bodyPr/>
-          <a:lstStyle/>
-          <a:p>
-            <a:r>
-              <a:rPr lang="en-US" dirty="0"/>
-              <a:t>General Notes</a:t>
-            </a:r>
-          </a:p>
-        </p:txBody>
-      </p:sp>
-      <p:sp>
-        <p:nvSpPr>
-          <p:cNvPr id="3" name="Content Placeholder 2">
-            <a:extLst>
-              <a:ext uri="{FF2B5EF4-FFF2-40B4-BE49-F238E27FC236}">
-                <a16:creationId xmlns:a16="http://schemas.microsoft.com/office/drawing/2014/main" id="{F67DDC37-6101-BD34-4CBD-910AA65D2FE8}"/>
-              </a:ext>
-            </a:extLst>
-          </p:cNvPr>
-          <p:cNvSpPr>
-            <a:spLocks noGrp="1"/>
-          </p:cNvSpPr>
-          <p:nvPr>
-            <p:ph idx="1"/>
-          </p:nvPr>
+          <p:cNvSpPr txBox="1"/>
+          <p:nvPr/>
         </p:nvSpPr>
         <p:spPr>
           <a:xfrm>
-            <a:off x="1451579" y="1853753"/>
-            <a:ext cx="9603275" cy="4199727"/>
+            <a:off x="207361" y="3675017"/>
+            <a:ext cx="4234010" cy="1754326"/>
           </a:xfrm>
+          <a:prstGeom prst="rect">
+            <a:avLst/>
+          </a:prstGeom>
+          <a:noFill/>
         </p:spPr>
         <p:txBody>
-          <a:bodyPr>
-            <a:normAutofit lnSpcReduction="10000"/>
+          <a:bodyPr wrap="square" rtlCol="0">
+            <a:spAutoFit/>
           </a:bodyPr>
           <a:lstStyle/>
           <a:p>
-            <a:r>
-              <a:rPr lang="en-US" dirty="0"/>
-              <a:t>Sklearn has gotten much better in the recent version in handling </a:t>
-            </a:r>
+            <a:pPr marL="285750" indent="-285750">
+              <a:buFont typeface="Arial" panose="020B0604020202020204" pitchFamily="34" charset="0"/>
+              <a:buChar char="•"/>
+            </a:pPr>
+            <a:r>
+              <a:rPr lang="en-US" dirty="0"/>
+              <a:t>Normal:</a:t>
+            </a:r>
+          </a:p>
+          <a:p>
+            <a:pPr marL="285750" indent="-285750">
+              <a:buFont typeface="Arial" panose="020B0604020202020204" pitchFamily="34" charset="0"/>
+              <a:buChar char="•"/>
+            </a:pPr>
+            <a:r>
+              <a:rPr lang="en-US" dirty="0"/>
+              <a:t>R is the loss, what the algo minimizes.</a:t>
+            </a:r>
+          </a:p>
+          <a:p>
+            <a:pPr marL="742950" lvl="1" indent="-285750">
+              <a:buFont typeface="Arial" panose="020B0604020202020204" pitchFamily="34" charset="0"/>
+              <a:buChar char="•"/>
+            </a:pPr>
+            <a:r>
+              <a:rPr lang="en-US" dirty="0"/>
+              <a:t>R is misclassification pre split.</a:t>
+            </a:r>
+          </a:p>
+          <a:p>
+            <a:pPr marL="742950" lvl="1" indent="-285750">
+              <a:buFont typeface="Arial" panose="020B0604020202020204" pitchFamily="34" charset="0"/>
+              <a:buChar char="•"/>
+            </a:pPr>
+            <a:r>
+              <a:rPr lang="en-US" dirty="0"/>
+              <a:t>R’ is misclassification post split.</a:t>
+            </a:r>
+          </a:p>
+          <a:p>
+            <a:pPr marL="285750" indent="-285750">
+              <a:buFont typeface="Arial" panose="020B0604020202020204" pitchFamily="34" charset="0"/>
+              <a:buChar char="•"/>
+            </a:pPr>
+            <a:r>
+              <a:rPr lang="en-US" dirty="0"/>
+              <a:t>If R’ &lt; R then tree splits. </a:t>
+            </a:r>
+          </a:p>
+          <a:p>
+            <a:pPr marL="742950" lvl="1" indent="-285750">
+              <a:buFont typeface="Arial" panose="020B0604020202020204" pitchFamily="34" charset="0"/>
+              <a:buChar char="•"/>
+            </a:pPr>
+            <a:r>
+              <a:rPr lang="en-US" dirty="0"/>
+              <a:t>Loss metric is improved. </a:t>
+            </a:r>
+          </a:p>
+        </p:txBody>
+      </p:sp>
+      <p:sp>
+        <p:nvSpPr>
+          <p:cNvPr id="7" name="TextBox 6">
+            <a:extLst>
+              <a:ext uri="{FF2B5EF4-FFF2-40B4-BE49-F238E27FC236}">
+                <a16:creationId xmlns:a16="http://schemas.microsoft.com/office/drawing/2014/main" id="{66AF18D8-9BC2-6F20-FCE6-C048396CDDCC}"/>
+              </a:ext>
+            </a:extLst>
+          </p:cNvPr>
+          <p:cNvSpPr txBox="1"/>
+          <p:nvPr/>
+        </p:nvSpPr>
+        <p:spPr>
+          <a:xfrm>
+            <a:off x="6096000" y="2917371"/>
+            <a:ext cx="5888639" cy="3139321"/>
+          </a:xfrm>
+          <a:prstGeom prst="rect">
+            <a:avLst/>
+          </a:prstGeom>
+          <a:noFill/>
+        </p:spPr>
+        <p:txBody>
+          <a:bodyPr wrap="square" rtlCol="0">
+            <a:spAutoFit/>
+          </a:bodyPr>
+          <a:lstStyle/>
+          <a:p>
+            <a:pPr marL="285750" indent="-285750">
+              <a:buFont typeface="Arial" panose="020B0604020202020204" pitchFamily="34" charset="0"/>
+              <a:buChar char="•"/>
+            </a:pPr>
+            <a:r>
+              <a:rPr lang="en-US" dirty="0"/>
+              <a:t>Pruned:</a:t>
+            </a:r>
+          </a:p>
+          <a:p>
+            <a:pPr marL="285750" indent="-285750">
+              <a:buFont typeface="Arial" panose="020B0604020202020204" pitchFamily="34" charset="0"/>
+              <a:buChar char="•"/>
+            </a:pPr>
             <a:r>
               <a:rPr lang="en-US" dirty="0" err="1"/>
-              <a:t>dataframes</a:t>
-            </a:r>
-            <a:r>
-              <a:rPr lang="en-US" dirty="0"/>
-              <a:t> natively. </a:t>
-            </a:r>
-          </a:p>
-          <a:p>
-            <a:r>
-              <a:rPr lang="en-US" dirty="0"/>
-              <a:t>Many/most of the examples have a step to convert to array before the model part. </a:t>
-            </a:r>
-          </a:p>
-          <a:p>
-            <a:pPr lvl="1"/>
-            <a:r>
-              <a:rPr lang="en-US" dirty="0"/>
-              <a:t>I.e. do prep stuff with data in </a:t>
+              <a:t>R+a</a:t>
+            </a:r>
+            <a:r>
+              <a:rPr lang="en-US" dirty="0"/>
+              <a:t>*T is the new loss. </a:t>
+            </a:r>
+          </a:p>
+          <a:p>
+            <a:pPr marL="742950" lvl="1" indent="-285750">
+              <a:buFont typeface="Arial" panose="020B0604020202020204" pitchFamily="34" charset="0"/>
+              <a:buChar char="•"/>
+            </a:pPr>
+            <a:r>
+              <a:rPr lang="en-US" dirty="0"/>
+              <a:t>R is still misclassification. </a:t>
+            </a:r>
+          </a:p>
+          <a:p>
+            <a:pPr marL="742950" lvl="1" indent="-285750">
+              <a:buFont typeface="Arial" panose="020B0604020202020204" pitchFamily="34" charset="0"/>
+              <a:buChar char="•"/>
+            </a:pPr>
+            <a:r>
+              <a:rPr lang="en-US" dirty="0"/>
+              <a:t>Alpha is a HP we set. </a:t>
+            </a:r>
+          </a:p>
+          <a:p>
+            <a:pPr marL="742950" lvl="1" indent="-285750">
+              <a:buFont typeface="Arial" panose="020B0604020202020204" pitchFamily="34" charset="0"/>
+              <a:buChar char="•"/>
+            </a:pPr>
+            <a:r>
+              <a:rPr lang="en-US" dirty="0"/>
+              <a:t>T is the number of term. nodes (size of tree). </a:t>
+            </a:r>
+          </a:p>
+          <a:p>
+            <a:pPr marL="285750" indent="-285750">
+              <a:buFont typeface="Arial" panose="020B0604020202020204" pitchFamily="34" charset="0"/>
+              <a:buChar char="•"/>
+            </a:pPr>
+            <a:r>
+              <a:rPr lang="en-US" dirty="0"/>
+              <a:t>If </a:t>
             </a:r>
             <a:r>
               <a:rPr lang="en-US" dirty="0" err="1"/>
-              <a:t>dataframe</a:t>
-            </a:r>
-            <a:r>
-              <a:rPr lang="en-US" dirty="0"/>
-              <a:t>, convert to array, feed to pipeline/model/</a:t>
+              <a:t>R’+a</a:t>
+            </a:r>
+            <a:r>
+              <a:rPr lang="en-US" dirty="0"/>
+              <a:t>*T &lt; </a:t>
             </a:r>
             <a:r>
               <a:rPr lang="en-US" dirty="0" err="1"/>
-              <a:t>gridsearch</a:t>
-            </a:r>
-            <a:r>
-              <a:rPr lang="en-US" dirty="0"/>
-              <a:t>. </a:t>
-            </a:r>
-          </a:p>
-          <a:p>
-            <a:pPr lvl="1"/>
-            <a:r>
-              <a:rPr lang="en-US" dirty="0"/>
-              <a:t>You can avoid this more easily now and sklearn will (more often) handle it ok. </a:t>
-            </a:r>
-          </a:p>
-          <a:p>
-            <a:r>
-              <a:rPr lang="en-US" dirty="0"/>
-              <a:t>I generally like the conversion step when learning, it’s a clear delineation. </a:t>
-            </a:r>
-          </a:p>
-          <a:p>
-            <a:pPr lvl="1"/>
-            <a:r>
-              <a:rPr lang="en-US" dirty="0"/>
-              <a:t>All the prep work is done on the </a:t>
-            </a:r>
-            <a:r>
-              <a:rPr lang="en-US" dirty="0" err="1"/>
-              <a:t>dataframe</a:t>
-            </a:r>
-            <a:r>
-              <a:rPr lang="en-US" dirty="0"/>
-              <a:t>, we make the </a:t>
-            </a:r>
-            <a:r>
-              <a:rPr lang="en-US"/>
-              <a:t>conversion when done. </a:t>
-            </a:r>
-            <a:endParaRPr lang="en-US" dirty="0"/>
-          </a:p>
-          <a:p>
-            <a:r>
-              <a:rPr lang="en-US" dirty="0"/>
-              <a:t>The array conversion doesn’t really change anything in functionality. </a:t>
-            </a:r>
-          </a:p>
-          <a:p>
-            <a:pPr lvl="1"/>
-            <a:r>
-              <a:rPr lang="en-US" dirty="0"/>
-              <a:t>The results are the same, and the process is only different in that one or two lines. </a:t>
-            </a:r>
-          </a:p>
-          <a:p>
-            <a:pPr lvl="1"/>
-            <a:r>
-              <a:rPr lang="en-US" dirty="0"/>
-              <a:t>The algorithm does a conversion internally and just obscures it from you. </a:t>
-            </a:r>
-          </a:p>
-          <a:p>
-            <a:pPr lvl="1"/>
-            <a:r>
-              <a:rPr lang="en-US" dirty="0"/>
-              <a:t>When we do neural networks we’ll need to do that conversion (often) again. </a:t>
+              <a:t>R+a</a:t>
+            </a:r>
+            <a:r>
+              <a:rPr lang="en-US" dirty="0"/>
+              <a:t>*T then tree splits. </a:t>
+            </a:r>
+          </a:p>
+          <a:p>
+            <a:pPr marL="742950" lvl="1" indent="-285750">
+              <a:buFont typeface="Arial" panose="020B0604020202020204" pitchFamily="34" charset="0"/>
+              <a:buChar char="•"/>
+            </a:pPr>
+            <a:r>
+              <a:rPr lang="en-US" dirty="0"/>
+              <a:t>Loss still needs to be improved, however…</a:t>
+            </a:r>
+          </a:p>
+          <a:p>
+            <a:pPr marL="742950" lvl="1" indent="-285750">
+              <a:buFont typeface="Arial" panose="020B0604020202020204" pitchFamily="34" charset="0"/>
+              <a:buChar char="•"/>
+            </a:pPr>
+            <a:r>
+              <a:rPr lang="en-US" dirty="0"/>
+              <a:t>Loss will improve if we reduce misclassifications. </a:t>
+            </a:r>
+          </a:p>
+          <a:p>
+            <a:pPr marL="742950" lvl="1" indent="-285750">
+              <a:buFont typeface="Arial" panose="020B0604020202020204" pitchFamily="34" charset="0"/>
+              <a:buChar char="•"/>
+            </a:pPr>
+            <a:r>
+              <a:rPr lang="en-US" dirty="0"/>
+              <a:t>Loss will get worse if we make tree bigger. </a:t>
+            </a:r>
+          </a:p>
+          <a:p>
+            <a:pPr marL="285750" indent="-285750">
+              <a:buFont typeface="Arial" panose="020B0604020202020204" pitchFamily="34" charset="0"/>
+              <a:buChar char="•"/>
+            </a:pPr>
+            <a:r>
+              <a:rPr lang="en-US" dirty="0"/>
+              <a:t>For a split to improve loss, the gain from acc must outweigh the penalty from growth. </a:t>
+            </a:r>
+          </a:p>
+        </p:txBody>
+      </p:sp>
+      <p:sp>
+        <p:nvSpPr>
+          <p:cNvPr id="8" name="TextBox 7">
+            <a:extLst>
+              <a:ext uri="{FF2B5EF4-FFF2-40B4-BE49-F238E27FC236}">
+                <a16:creationId xmlns:a16="http://schemas.microsoft.com/office/drawing/2014/main" id="{C5C1A3EE-6410-1425-45F2-011EB4821039}"/>
+              </a:ext>
+            </a:extLst>
+          </p:cNvPr>
+          <p:cNvSpPr txBox="1"/>
+          <p:nvPr/>
+        </p:nvSpPr>
+        <p:spPr>
+          <a:xfrm>
+            <a:off x="9525240" y="2228671"/>
+            <a:ext cx="3457303" cy="1200329"/>
+          </a:xfrm>
+          <a:prstGeom prst="rect">
+            <a:avLst/>
+          </a:prstGeom>
+          <a:noFill/>
+        </p:spPr>
+        <p:txBody>
+          <a:bodyPr wrap="square" rtlCol="0">
+            <a:spAutoFit/>
+          </a:bodyPr>
+          <a:lstStyle/>
+          <a:p>
+            <a:pPr marL="285750" indent="-285750">
+              <a:buFont typeface="Arial" panose="020B0604020202020204" pitchFamily="34" charset="0"/>
+              <a:buChar char="•"/>
+            </a:pPr>
+            <a:r>
+              <a:rPr lang="en-US" dirty="0"/>
+              <a:t>Loss has two sources:</a:t>
+            </a:r>
+          </a:p>
+          <a:p>
+            <a:pPr marL="742950" lvl="1" indent="-285750">
+              <a:buFont typeface="Arial" panose="020B0604020202020204" pitchFamily="34" charset="0"/>
+              <a:buChar char="•"/>
+            </a:pPr>
+            <a:r>
+              <a:rPr lang="en-US" dirty="0"/>
+              <a:t>Errors (unchanged). </a:t>
+            </a:r>
+          </a:p>
+          <a:p>
+            <a:pPr marL="742950" lvl="1" indent="-285750">
+              <a:buFont typeface="Arial" panose="020B0604020202020204" pitchFamily="34" charset="0"/>
+              <a:buChar char="•"/>
+            </a:pPr>
+            <a:r>
+              <a:rPr lang="en-US" dirty="0"/>
+              <a:t>Size of model (new). </a:t>
+            </a:r>
+          </a:p>
+          <a:p>
+            <a:pPr marL="285750" indent="-285750">
+              <a:buFont typeface="Arial" panose="020B0604020202020204" pitchFamily="34" charset="0"/>
+              <a:buChar char="•"/>
+            </a:pPr>
+            <a:r>
+              <a:rPr lang="en-US" dirty="0"/>
+              <a:t>Total loss is minimized. 	</a:t>
             </a:r>
           </a:p>
         </p:txBody>
@@ -8525,7 +8688,7 @@
     </p:spTree>
     <p:extLst>
       <p:ext uri="{BB962C8B-B14F-4D97-AF65-F5344CB8AC3E}">
-        <p14:creationId xmlns:p14="http://schemas.microsoft.com/office/powerpoint/2010/main" val="3356818674"/>
+        <p14:creationId xmlns:p14="http://schemas.microsoft.com/office/powerpoint/2010/main" val="4158311254"/>
       </p:ext>
     </p:extLst>
   </p:cSld>
@@ -8554,6 +8717,1231 @@
       </p:grpSpPr>
       <p:sp>
         <p:nvSpPr>
+          <p:cNvPr id="2" name="Rectangle 1">
+            <a:extLst>
+              <a:ext uri="{FF2B5EF4-FFF2-40B4-BE49-F238E27FC236}">
+                <a16:creationId xmlns:a16="http://schemas.microsoft.com/office/drawing/2014/main" id="{77876817-EA3C-641C-6E01-401E8015D953}"/>
+              </a:ext>
+            </a:extLst>
+          </p:cNvPr>
+          <p:cNvSpPr/>
+          <p:nvPr/>
+        </p:nvSpPr>
+        <p:spPr>
+          <a:xfrm>
+            <a:off x="1008404" y="538385"/>
+            <a:ext cx="1469876" cy="709301"/>
+          </a:xfrm>
+          <a:prstGeom prst="rect">
+            <a:avLst/>
+          </a:prstGeom>
+        </p:spPr>
+        <p:style>
+          <a:lnRef idx="2">
+            <a:schemeClr val="accent1">
+              <a:shade val="15000"/>
+            </a:schemeClr>
+          </a:lnRef>
+          <a:fillRef idx="1">
+            <a:schemeClr val="accent1"/>
+          </a:fillRef>
+          <a:effectRef idx="0">
+            <a:schemeClr val="accent1"/>
+          </a:effectRef>
+          <a:fontRef idx="minor">
+            <a:schemeClr val="lt1"/>
+          </a:fontRef>
+        </p:style>
+        <p:txBody>
+          <a:bodyPr rtlCol="0" anchor="ctr"/>
+          <a:lstStyle/>
+          <a:p>
+            <a:pPr algn="ctr"/>
+            <a:endParaRPr lang="en-US"/>
+          </a:p>
+        </p:txBody>
+      </p:sp>
+      <p:sp>
+        <p:nvSpPr>
+          <p:cNvPr id="3" name="Rectangle 2">
+            <a:extLst>
+              <a:ext uri="{FF2B5EF4-FFF2-40B4-BE49-F238E27FC236}">
+                <a16:creationId xmlns:a16="http://schemas.microsoft.com/office/drawing/2014/main" id="{BF75F805-26F4-631C-89DD-49EFEB6DF8D5}"/>
+              </a:ext>
+            </a:extLst>
+          </p:cNvPr>
+          <p:cNvSpPr/>
+          <p:nvPr/>
+        </p:nvSpPr>
+        <p:spPr>
+          <a:xfrm>
+            <a:off x="2237574" y="2005412"/>
+            <a:ext cx="1469876" cy="709301"/>
+          </a:xfrm>
+          <a:prstGeom prst="rect">
+            <a:avLst/>
+          </a:prstGeom>
+        </p:spPr>
+        <p:style>
+          <a:lnRef idx="2">
+            <a:schemeClr val="accent1">
+              <a:shade val="15000"/>
+            </a:schemeClr>
+          </a:lnRef>
+          <a:fillRef idx="1">
+            <a:schemeClr val="accent1"/>
+          </a:fillRef>
+          <a:effectRef idx="0">
+            <a:schemeClr val="accent1"/>
+          </a:effectRef>
+          <a:fontRef idx="minor">
+            <a:schemeClr val="lt1"/>
+          </a:fontRef>
+        </p:style>
+        <p:txBody>
+          <a:bodyPr rtlCol="0" anchor="ctr"/>
+          <a:lstStyle/>
+          <a:p>
+            <a:pPr algn="ctr"/>
+            <a:endParaRPr lang="en-US"/>
+          </a:p>
+        </p:txBody>
+      </p:sp>
+      <p:sp>
+        <p:nvSpPr>
+          <p:cNvPr id="4" name="Rectangle 3">
+            <a:extLst>
+              <a:ext uri="{FF2B5EF4-FFF2-40B4-BE49-F238E27FC236}">
+                <a16:creationId xmlns:a16="http://schemas.microsoft.com/office/drawing/2014/main" id="{C74A5086-971E-F67C-CD96-BED27E0D43F9}"/>
+              </a:ext>
+            </a:extLst>
+          </p:cNvPr>
+          <p:cNvSpPr/>
+          <p:nvPr/>
+        </p:nvSpPr>
+        <p:spPr>
+          <a:xfrm>
+            <a:off x="273466" y="2005413"/>
+            <a:ext cx="1469876" cy="709301"/>
+          </a:xfrm>
+          <a:prstGeom prst="rect">
+            <a:avLst/>
+          </a:prstGeom>
+        </p:spPr>
+        <p:style>
+          <a:lnRef idx="2">
+            <a:schemeClr val="accent1">
+              <a:shade val="15000"/>
+            </a:schemeClr>
+          </a:lnRef>
+          <a:fillRef idx="1">
+            <a:schemeClr val="accent1"/>
+          </a:fillRef>
+          <a:effectRef idx="0">
+            <a:schemeClr val="accent1"/>
+          </a:effectRef>
+          <a:fontRef idx="minor">
+            <a:schemeClr val="lt1"/>
+          </a:fontRef>
+        </p:style>
+        <p:txBody>
+          <a:bodyPr rtlCol="0" anchor="ctr"/>
+          <a:lstStyle/>
+          <a:p>
+            <a:pPr algn="ctr"/>
+            <a:endParaRPr lang="en-US"/>
+          </a:p>
+        </p:txBody>
+      </p:sp>
+      <p:sp>
+        <p:nvSpPr>
+          <p:cNvPr id="5" name="TextBox 4">
+            <a:extLst>
+              <a:ext uri="{FF2B5EF4-FFF2-40B4-BE49-F238E27FC236}">
+                <a16:creationId xmlns:a16="http://schemas.microsoft.com/office/drawing/2014/main" id="{290A9F83-7EB9-1E0A-F027-BC81FB10330F}"/>
+              </a:ext>
+            </a:extLst>
+          </p:cNvPr>
+          <p:cNvSpPr txBox="1"/>
+          <p:nvPr/>
+        </p:nvSpPr>
+        <p:spPr>
+          <a:xfrm>
+            <a:off x="3358497" y="452927"/>
+            <a:ext cx="2401368" cy="1200329"/>
+          </a:xfrm>
+          <a:prstGeom prst="rect">
+            <a:avLst/>
+          </a:prstGeom>
+          <a:noFill/>
+        </p:spPr>
+        <p:txBody>
+          <a:bodyPr wrap="square" rtlCol="0">
+            <a:spAutoFit/>
+          </a:bodyPr>
+          <a:lstStyle/>
+          <a:p>
+            <a:r>
+              <a:rPr lang="en-US" dirty="0"/>
+              <a:t>3 True, 4 False</a:t>
+            </a:r>
+            <a:br>
+              <a:rPr lang="en-US" dirty="0"/>
+            </a:br>
+            <a:r>
+              <a:rPr lang="en-US" dirty="0"/>
+              <a:t>Gini: .48</a:t>
+            </a:r>
+          </a:p>
+          <a:p>
+            <a:r>
+              <a:rPr lang="en-US" dirty="0"/>
+              <a:t>Size: .125 * 2 (1 leaf)</a:t>
+            </a:r>
+          </a:p>
+          <a:p>
+            <a:r>
+              <a:rPr lang="en-US" dirty="0"/>
+              <a:t>Loss: .71 + .125 = .835</a:t>
+            </a:r>
+          </a:p>
+        </p:txBody>
+      </p:sp>
+      <p:sp>
+        <p:nvSpPr>
+          <p:cNvPr id="6" name="TextBox 5">
+            <a:extLst>
+              <a:ext uri="{FF2B5EF4-FFF2-40B4-BE49-F238E27FC236}">
+                <a16:creationId xmlns:a16="http://schemas.microsoft.com/office/drawing/2014/main" id="{5575B8D8-3D11-8CE4-1B68-3228DD6BA06A}"/>
+              </a:ext>
+            </a:extLst>
+          </p:cNvPr>
+          <p:cNvSpPr txBox="1"/>
+          <p:nvPr/>
+        </p:nvSpPr>
+        <p:spPr>
+          <a:xfrm>
+            <a:off x="4408206" y="2005412"/>
+            <a:ext cx="2401368" cy="923330"/>
+          </a:xfrm>
+          <a:prstGeom prst="rect">
+            <a:avLst/>
+          </a:prstGeom>
+          <a:noFill/>
+        </p:spPr>
+        <p:txBody>
+          <a:bodyPr wrap="square" rtlCol="0">
+            <a:spAutoFit/>
+          </a:bodyPr>
+          <a:lstStyle/>
+          <a:p>
+            <a:r>
+              <a:rPr lang="en-US" dirty="0"/>
+              <a:t>Misclassification: .37 + 0 </a:t>
+            </a:r>
+          </a:p>
+          <a:p>
+            <a:r>
+              <a:rPr lang="en-US" dirty="0"/>
+              <a:t>Size: .125 * 2 (2 leaves)</a:t>
+            </a:r>
+          </a:p>
+          <a:p>
+            <a:r>
+              <a:rPr lang="en-US" dirty="0"/>
+              <a:t>Loss: .37 + .25 = .62</a:t>
+            </a:r>
+          </a:p>
+        </p:txBody>
+      </p:sp>
+      <p:sp>
+        <p:nvSpPr>
+          <p:cNvPr id="7" name="TextBox 6">
+            <a:extLst>
+              <a:ext uri="{FF2B5EF4-FFF2-40B4-BE49-F238E27FC236}">
+                <a16:creationId xmlns:a16="http://schemas.microsoft.com/office/drawing/2014/main" id="{3444D781-B00F-2F1D-22A3-5C96AC24B1DD}"/>
+              </a:ext>
+            </a:extLst>
+          </p:cNvPr>
+          <p:cNvSpPr txBox="1"/>
+          <p:nvPr/>
+        </p:nvSpPr>
+        <p:spPr>
+          <a:xfrm>
+            <a:off x="47000" y="2928742"/>
+            <a:ext cx="1626549" cy="369332"/>
+          </a:xfrm>
+          <a:prstGeom prst="rect">
+            <a:avLst/>
+          </a:prstGeom>
+          <a:noFill/>
+        </p:spPr>
+        <p:txBody>
+          <a:bodyPr wrap="square" rtlCol="0">
+            <a:spAutoFit/>
+          </a:bodyPr>
+          <a:lstStyle/>
+          <a:p>
+            <a:r>
+              <a:rPr lang="en-US" dirty="0"/>
+              <a:t>3 True, 1 False</a:t>
+            </a:r>
+          </a:p>
+        </p:txBody>
+      </p:sp>
+      <p:sp>
+        <p:nvSpPr>
+          <p:cNvPr id="8" name="TextBox 7">
+            <a:extLst>
+              <a:ext uri="{FF2B5EF4-FFF2-40B4-BE49-F238E27FC236}">
+                <a16:creationId xmlns:a16="http://schemas.microsoft.com/office/drawing/2014/main" id="{E1C3C610-BAA5-270C-B6BD-779BC0F7D671}"/>
+              </a:ext>
+            </a:extLst>
+          </p:cNvPr>
+          <p:cNvSpPr txBox="1"/>
+          <p:nvPr/>
+        </p:nvSpPr>
+        <p:spPr>
+          <a:xfrm>
+            <a:off x="2227603" y="2882203"/>
+            <a:ext cx="1626549" cy="369332"/>
+          </a:xfrm>
+          <a:prstGeom prst="rect">
+            <a:avLst/>
+          </a:prstGeom>
+          <a:noFill/>
+        </p:spPr>
+        <p:txBody>
+          <a:bodyPr wrap="square" rtlCol="0">
+            <a:spAutoFit/>
+          </a:bodyPr>
+          <a:lstStyle/>
+          <a:p>
+            <a:r>
+              <a:rPr lang="en-US" dirty="0"/>
+              <a:t>0 True, 3 False</a:t>
+            </a:r>
+          </a:p>
+        </p:txBody>
+      </p:sp>
+    </p:spTree>
+    <p:extLst>
+      <p:ext uri="{BB962C8B-B14F-4D97-AF65-F5344CB8AC3E}">
+        <p14:creationId xmlns:p14="http://schemas.microsoft.com/office/powerpoint/2010/main" val="3576249918"/>
+      </p:ext>
+    </p:extLst>
+  </p:cSld>
+  <p:clrMapOvr>
+    <a:masterClrMapping/>
+  </p:clrMapOvr>
+</p:sld>
+</file>
+
+<file path=ppt/slides/slide33.xml><?xml version="1.0" encoding="utf-8"?>
+<p:sld xmlns:a="http://schemas.openxmlformats.org/drawingml/2006/main" xmlns:r="http://schemas.openxmlformats.org/officeDocument/2006/relationships" xmlns:p="http://schemas.openxmlformats.org/presentationml/2006/main">
+  <p:cSld>
+    <p:bg>
+      <p:bgPr>
+        <a:gradFill rotWithShape="1">
+          <a:gsLst>
+            <a:gs pos="0">
+              <a:schemeClr val="bg2">
+                <a:tint val="94000"/>
+                <a:satMod val="80000"/>
+                <a:lumMod val="106000"/>
+              </a:schemeClr>
+            </a:gs>
+            <a:gs pos="100000">
+              <a:schemeClr val="bg2">
+                <a:shade val="80000"/>
+              </a:schemeClr>
+            </a:gs>
+          </a:gsLst>
+          <a:path path="circle">
+            <a:fillToRect l="43000" r="43000" b="100000"/>
+          </a:path>
+        </a:gradFill>
+        <a:effectLst/>
+      </p:bgPr>
+    </p:bg>
+    <p:spTree>
+      <p:nvGrpSpPr>
+        <p:cNvPr id="1" name=""/>
+        <p:cNvGrpSpPr/>
+        <p:nvPr/>
+      </p:nvGrpSpPr>
+      <p:grpSpPr>
+        <a:xfrm>
+          <a:off x="0" y="0"/>
+          <a:ext cx="0" cy="0"/>
+          <a:chOff x="0" y="0"/>
+          <a:chExt cx="0" cy="0"/>
+        </a:xfrm>
+      </p:grpSpPr>
+      <p:sp>
+        <p:nvSpPr>
+          <p:cNvPr id="2" name="Title 1">
+            <a:extLst>
+              <a:ext uri="{FF2B5EF4-FFF2-40B4-BE49-F238E27FC236}">
+                <a16:creationId xmlns:a16="http://schemas.microsoft.com/office/drawing/2014/main" id="{F83272B1-1C72-7FE0-9237-0E15D46E288C}"/>
+              </a:ext>
+            </a:extLst>
+          </p:cNvPr>
+          <p:cNvSpPr>
+            <a:spLocks noGrp="1"/>
+          </p:cNvSpPr>
+          <p:nvPr>
+            <p:ph type="title"/>
+          </p:nvPr>
+        </p:nvSpPr>
+        <p:spPr>
+          <a:xfrm>
+            <a:off x="1451579" y="804519"/>
+            <a:ext cx="9603275" cy="1049235"/>
+          </a:xfrm>
+        </p:spPr>
+        <p:txBody>
+          <a:bodyPr>
+            <a:normAutofit/>
+          </a:bodyPr>
+          <a:lstStyle/>
+          <a:p>
+            <a:r>
+              <a:rPr lang="en-US" dirty="0"/>
+              <a:t>Be More Alpha</a:t>
+            </a:r>
+          </a:p>
+        </p:txBody>
+      </p:sp>
+      <p:sp>
+        <p:nvSpPr>
+          <p:cNvPr id="3" name="Content Placeholder 2">
+            <a:extLst>
+              <a:ext uri="{FF2B5EF4-FFF2-40B4-BE49-F238E27FC236}">
+                <a16:creationId xmlns:a16="http://schemas.microsoft.com/office/drawing/2014/main" id="{DE80268F-9F8B-ADFA-92C1-6DE2CFA88B0E}"/>
+              </a:ext>
+            </a:extLst>
+          </p:cNvPr>
+          <p:cNvSpPr>
+            <a:spLocks noGrp="1"/>
+          </p:cNvSpPr>
+          <p:nvPr>
+            <p:ph idx="1"/>
+          </p:nvPr>
+        </p:nvSpPr>
+        <p:spPr>
+          <a:xfrm>
+            <a:off x="357352" y="1853753"/>
+            <a:ext cx="7693572" cy="4199727"/>
+          </a:xfrm>
+        </p:spPr>
+        <p:txBody>
+          <a:bodyPr>
+            <a:normAutofit/>
+          </a:bodyPr>
+          <a:lstStyle/>
+          <a:p>
+            <a:r>
+              <a:rPr lang="en-US" dirty="0"/>
+              <a:t>In the CCP equation R</a:t>
+            </a:r>
+            <a:r>
+              <a:rPr lang="el-GR" dirty="0"/>
+              <a:t>α(</a:t>
+            </a:r>
+            <a:r>
+              <a:rPr lang="en-US" dirty="0"/>
+              <a:t>T)=R(T)+</a:t>
+            </a:r>
+            <a:r>
+              <a:rPr lang="el-GR" dirty="0"/>
+              <a:t>α|</a:t>
+            </a:r>
+            <a:r>
+              <a:rPr lang="en-US" dirty="0"/>
+              <a:t>T| the alpha-t is a penalty. </a:t>
+            </a:r>
+          </a:p>
+          <a:p>
+            <a:pPr lvl="1"/>
+            <a:r>
+              <a:rPr lang="en-US" dirty="0"/>
+              <a:t>The larger the number of terminal nodes gets, the larger the penalty. </a:t>
+            </a:r>
+          </a:p>
+          <a:p>
+            <a:pPr lvl="1"/>
+            <a:r>
+              <a:rPr lang="en-US" dirty="0"/>
+              <a:t>The larger alpha gets, the larger the penalty. </a:t>
+            </a:r>
+          </a:p>
+          <a:p>
+            <a:r>
+              <a:rPr lang="en-US" dirty="0"/>
+              <a:t>Effectively removes things that have many terminal leaves. </a:t>
+            </a:r>
+          </a:p>
+          <a:p>
+            <a:pPr lvl="1"/>
+            <a:r>
+              <a:rPr lang="en-US" dirty="0"/>
+              <a:t>Larger trees will generate larger penalties in branches. </a:t>
+            </a:r>
+          </a:p>
+          <a:p>
+            <a:pPr lvl="1"/>
+            <a:r>
+              <a:rPr lang="en-US" dirty="0"/>
+              <a:t>Tends to limit overfitting, as it stops large branches from being developed. </a:t>
+            </a:r>
+          </a:p>
+          <a:p>
+            <a:r>
+              <a:rPr lang="en-US" dirty="0"/>
+              <a:t>Adding a penalty to “size” is a common strategy. </a:t>
+            </a:r>
+          </a:p>
+          <a:p>
+            <a:pPr lvl="1"/>
+            <a:r>
+              <a:rPr lang="en-US" dirty="0"/>
+              <a:t>If a split is going to happen, it needs to “overcome” the penalty incurred by increasing the number of terminal nodes ( |T| increases ). </a:t>
+            </a:r>
+          </a:p>
+          <a:p>
+            <a:pPr lvl="1"/>
+            <a:r>
+              <a:rPr lang="en-US" dirty="0"/>
+              <a:t>R(T) needs to decrease, or more accuracy, to overcome alpha-T increase.</a:t>
+            </a:r>
+          </a:p>
+        </p:txBody>
+      </p:sp>
+      <p:pic>
+        <p:nvPicPr>
+          <p:cNvPr id="2050" name="Picture 2" descr="Stream Chad music | Listen to songs, albums, playlists for free on  SoundCloud">
+            <a:extLst>
+              <a:ext uri="{FF2B5EF4-FFF2-40B4-BE49-F238E27FC236}">
+                <a16:creationId xmlns:a16="http://schemas.microsoft.com/office/drawing/2014/main" id="{53F075D9-6980-3E8E-1C91-D244837A2860}"/>
+              </a:ext>
+            </a:extLst>
+          </p:cNvPr>
+          <p:cNvPicPr>
+            <a:picLocks noChangeAspect="1" noChangeArrowheads="1"/>
+          </p:cNvPicPr>
+          <p:nvPr/>
+        </p:nvPicPr>
+        <p:blipFill>
+          <a:blip r:embed="rId2">
+            <a:extLst>
+              <a:ext uri="{28A0092B-C50C-407E-A947-70E740481C1C}">
+                <a14:useLocalDpi xmlns:a14="http://schemas.microsoft.com/office/drawing/2010/main" val="0"/>
+              </a:ext>
+            </a:extLst>
+          </a:blip>
+          <a:stretch>
+            <a:fillRect/>
+          </a:stretch>
+        </p:blipFill>
+        <p:spPr bwMode="auto">
+          <a:xfrm>
+            <a:off x="8050924" y="1952672"/>
+            <a:ext cx="3966851" cy="3966851"/>
+          </a:xfrm>
+          <a:prstGeom prst="rect">
+            <a:avLst/>
+          </a:prstGeom>
+          <a:noFill/>
+          <a:extLst>
+            <a:ext uri="{909E8E84-426E-40DD-AFC4-6F175D3DCCD1}">
+              <a14:hiddenFill xmlns:a14="http://schemas.microsoft.com/office/drawing/2010/main">
+                <a:solidFill>
+                  <a:srgbClr val="FFFFFF"/>
+                </a:solidFill>
+              </a14:hiddenFill>
+            </a:ext>
+          </a:extLst>
+        </p:spPr>
+      </p:pic>
+    </p:spTree>
+    <p:extLst>
+      <p:ext uri="{BB962C8B-B14F-4D97-AF65-F5344CB8AC3E}">
+        <p14:creationId xmlns:p14="http://schemas.microsoft.com/office/powerpoint/2010/main" val="1058985009"/>
+      </p:ext>
+    </p:extLst>
+  </p:cSld>
+  <p:clrMapOvr>
+    <a:masterClrMapping/>
+  </p:clrMapOvr>
+</p:sld>
+</file>
+
+<file path=ppt/slides/slide34.xml><?xml version="1.0" encoding="utf-8"?>
+<p:sld xmlns:a="http://schemas.openxmlformats.org/drawingml/2006/main" xmlns:r="http://schemas.openxmlformats.org/officeDocument/2006/relationships" xmlns:p="http://schemas.openxmlformats.org/presentationml/2006/main">
+  <p:cSld>
+    <p:spTree>
+      <p:nvGrpSpPr>
+        <p:cNvPr id="1" name=""/>
+        <p:cNvGrpSpPr/>
+        <p:nvPr/>
+      </p:nvGrpSpPr>
+      <p:grpSpPr>
+        <a:xfrm>
+          <a:off x="0" y="0"/>
+          <a:ext cx="0" cy="0"/>
+          <a:chOff x="0" y="0"/>
+          <a:chExt cx="0" cy="0"/>
+        </a:xfrm>
+      </p:grpSpPr>
+      <p:sp>
+        <p:nvSpPr>
+          <p:cNvPr id="2" name="Title 1">
+            <a:extLst>
+              <a:ext uri="{FF2B5EF4-FFF2-40B4-BE49-F238E27FC236}">
+                <a16:creationId xmlns:a16="http://schemas.microsoft.com/office/drawing/2014/main" id="{0253FB35-2231-F2D8-4B0B-09701A661304}"/>
+              </a:ext>
+            </a:extLst>
+          </p:cNvPr>
+          <p:cNvSpPr>
+            <a:spLocks noGrp="1"/>
+          </p:cNvSpPr>
+          <p:nvPr>
+            <p:ph type="title"/>
+          </p:nvPr>
+        </p:nvSpPr>
+        <p:spPr/>
+        <p:txBody>
+          <a:bodyPr/>
+          <a:lstStyle/>
+          <a:p>
+            <a:r>
+              <a:rPr lang="en-US" dirty="0"/>
+              <a:t>Keep it Regular(</a:t>
+            </a:r>
+            <a:r>
+              <a:rPr lang="en-US" dirty="0" err="1"/>
+              <a:t>ized</a:t>
+            </a:r>
+            <a:r>
+              <a:rPr lang="en-US" dirty="0"/>
+              <a:t>)</a:t>
+            </a:r>
+          </a:p>
+        </p:txBody>
+      </p:sp>
+      <p:sp>
+        <p:nvSpPr>
+          <p:cNvPr id="3" name="Content Placeholder 2">
+            <a:extLst>
+              <a:ext uri="{FF2B5EF4-FFF2-40B4-BE49-F238E27FC236}">
+                <a16:creationId xmlns:a16="http://schemas.microsoft.com/office/drawing/2014/main" id="{6FF46A87-B2D2-1378-2D6B-EC9B384DF06E}"/>
+              </a:ext>
+            </a:extLst>
+          </p:cNvPr>
+          <p:cNvSpPr>
+            <a:spLocks noGrp="1"/>
+          </p:cNvSpPr>
+          <p:nvPr>
+            <p:ph idx="1"/>
+          </p:nvPr>
+        </p:nvSpPr>
+        <p:spPr>
+          <a:xfrm>
+            <a:off x="1451579" y="2015732"/>
+            <a:ext cx="9603275" cy="3958348"/>
+          </a:xfrm>
+        </p:spPr>
+        <p:txBody>
+          <a:bodyPr/>
+          <a:lstStyle/>
+          <a:p>
+            <a:r>
+              <a:rPr lang="en-US" dirty="0"/>
+              <a:t>This type of constraint on growth, regularization, is quite common. </a:t>
+            </a:r>
+          </a:p>
+          <a:p>
+            <a:pPr lvl="1"/>
+            <a:r>
+              <a:rPr lang="en-US" dirty="0"/>
+              <a:t>Easy to implement – just change the loss function. </a:t>
+            </a:r>
+          </a:p>
+          <a:p>
+            <a:pPr lvl="1"/>
+            <a:r>
+              <a:rPr lang="en-US" dirty="0"/>
+              <a:t>Can work anywhere with loss (and a size metric). </a:t>
+            </a:r>
+          </a:p>
+          <a:p>
+            <a:pPr lvl="1"/>
+            <a:r>
+              <a:rPr lang="en-US" dirty="0"/>
+              <a:t>‘Automatic’ – growth can be limited throughout training*.</a:t>
+            </a:r>
+          </a:p>
+          <a:p>
+            <a:r>
+              <a:rPr lang="en-US" dirty="0"/>
+              <a:t>On the downside, we need to provide alpha as a hyperparameter. </a:t>
+            </a:r>
+          </a:p>
+          <a:p>
+            <a:r>
+              <a:rPr lang="en-US" dirty="0"/>
+              <a:t>Instead of targeting “most accurate model” we target “most accurate considering size”. </a:t>
+            </a:r>
+          </a:p>
+          <a:p>
+            <a:pPr lvl="1"/>
+            <a:r>
+              <a:rPr lang="en-US" dirty="0"/>
+              <a:t>Big trees have great accuracy, but the size will cause their loss to be large.</a:t>
+            </a:r>
+          </a:p>
+          <a:p>
+            <a:pPr lvl="1"/>
+            <a:r>
+              <a:rPr lang="en-US" dirty="0"/>
+              <a:t>If the tree can’t get big, it can’t overfit much. </a:t>
+            </a:r>
+          </a:p>
+        </p:txBody>
+      </p:sp>
+    </p:spTree>
+    <p:extLst>
+      <p:ext uri="{BB962C8B-B14F-4D97-AF65-F5344CB8AC3E}">
+        <p14:creationId xmlns:p14="http://schemas.microsoft.com/office/powerpoint/2010/main" val="1318359576"/>
+      </p:ext>
+    </p:extLst>
+  </p:cSld>
+  <p:clrMapOvr>
+    <a:masterClrMapping/>
+  </p:clrMapOvr>
+</p:sld>
+</file>
+
+<file path=ppt/slides/slide35.xml><?xml version="1.0" encoding="utf-8"?>
+<p:sld xmlns:a="http://schemas.openxmlformats.org/drawingml/2006/main" xmlns:r="http://schemas.openxmlformats.org/officeDocument/2006/relationships" xmlns:p="http://schemas.openxmlformats.org/presentationml/2006/main">
+  <p:cSld>
+    <p:spTree>
+      <p:nvGrpSpPr>
+        <p:cNvPr id="1" name=""/>
+        <p:cNvGrpSpPr/>
+        <p:nvPr/>
+      </p:nvGrpSpPr>
+      <p:grpSpPr>
+        <a:xfrm>
+          <a:off x="0" y="0"/>
+          <a:ext cx="0" cy="0"/>
+          <a:chOff x="0" y="0"/>
+          <a:chExt cx="0" cy="0"/>
+        </a:xfrm>
+      </p:grpSpPr>
+      <p:sp>
+        <p:nvSpPr>
+          <p:cNvPr id="2" name="Title 1">
+            <a:extLst>
+              <a:ext uri="{FF2B5EF4-FFF2-40B4-BE49-F238E27FC236}">
+                <a16:creationId xmlns:a16="http://schemas.microsoft.com/office/drawing/2014/main" id="{8FC6E27A-7A16-2BB7-84CA-2A46F279A2B1}"/>
+              </a:ext>
+            </a:extLst>
+          </p:cNvPr>
+          <p:cNvSpPr>
+            <a:spLocks noGrp="1"/>
+          </p:cNvSpPr>
+          <p:nvPr>
+            <p:ph type="title"/>
+          </p:nvPr>
+        </p:nvSpPr>
+        <p:spPr/>
+        <p:txBody>
+          <a:bodyPr/>
+          <a:lstStyle/>
+          <a:p>
+            <a:r>
+              <a:rPr lang="en-US" dirty="0"/>
+              <a:t>Use some Trees</a:t>
+            </a:r>
+          </a:p>
+        </p:txBody>
+      </p:sp>
+      <p:sp>
+        <p:nvSpPr>
+          <p:cNvPr id="3" name="Content Placeholder 2">
+            <a:extLst>
+              <a:ext uri="{FF2B5EF4-FFF2-40B4-BE49-F238E27FC236}">
+                <a16:creationId xmlns:a16="http://schemas.microsoft.com/office/drawing/2014/main" id="{440B18D2-4522-6750-133C-560FB6822F19}"/>
+              </a:ext>
+            </a:extLst>
+          </p:cNvPr>
+          <p:cNvSpPr>
+            <a:spLocks noGrp="1"/>
+          </p:cNvSpPr>
+          <p:nvPr>
+            <p:ph idx="1"/>
+          </p:nvPr>
+        </p:nvSpPr>
+        <p:spPr>
+          <a:xfrm>
+            <a:off x="1451579" y="1853754"/>
+            <a:ext cx="9603275" cy="4199727"/>
+          </a:xfrm>
+        </p:spPr>
+        <p:txBody>
+          <a:bodyPr/>
+          <a:lstStyle/>
+          <a:p>
+            <a:r>
+              <a:rPr lang="en-US" dirty="0"/>
+              <a:t>Trees are one of the most approachable model types to understand:</a:t>
+            </a:r>
+          </a:p>
+          <a:p>
+            <a:pPr lvl="1"/>
+            <a:r>
+              <a:rPr lang="en-US" dirty="0"/>
+              <a:t>We can visualize the entire process and walk through decisions in English. </a:t>
+            </a:r>
+          </a:p>
+          <a:p>
+            <a:r>
+              <a:rPr lang="en-US" dirty="0"/>
+              <a:t>Trees tend to be greedy, so we need ways to limit the overfitting. </a:t>
+            </a:r>
+          </a:p>
+          <a:p>
+            <a:pPr lvl="1"/>
+            <a:r>
+              <a:rPr lang="en-US" dirty="0"/>
+              <a:t>Tuning the settings of hyperparameters and regularization. </a:t>
+            </a:r>
+          </a:p>
+          <a:p>
+            <a:pPr lvl="1"/>
+            <a:r>
+              <a:rPr lang="en-US" dirty="0"/>
+              <a:t>Tree creation algorithms seek purity – each node is uniform. </a:t>
+            </a:r>
+          </a:p>
+          <a:p>
+            <a:r>
+              <a:rPr lang="en-US" dirty="0"/>
+              <a:t>Trees do the same thing as regression, but in a totally different mathematical way. </a:t>
+            </a:r>
+          </a:p>
+          <a:p>
+            <a:pPr lvl="1"/>
+            <a:r>
+              <a:rPr lang="en-US" dirty="0"/>
+              <a:t>Linear models assume a linear relationship, trees are non-parametric. </a:t>
+            </a:r>
+          </a:p>
+          <a:p>
+            <a:pPr lvl="1"/>
+            <a:r>
+              <a:rPr lang="en-US" dirty="0"/>
+              <a:t>Different data may work better with one or the other (or some other type). </a:t>
+            </a:r>
+          </a:p>
+          <a:p>
+            <a:r>
+              <a:rPr lang="en-US" dirty="0"/>
+              <a:t>Many of the best non neural network models use some trees in </a:t>
+            </a:r>
+            <a:r>
+              <a:rPr lang="en-US"/>
+              <a:t>different ways… </a:t>
+            </a:r>
+            <a:endParaRPr lang="en-US" dirty="0"/>
+          </a:p>
+        </p:txBody>
+      </p:sp>
+    </p:spTree>
+    <p:extLst>
+      <p:ext uri="{BB962C8B-B14F-4D97-AF65-F5344CB8AC3E}">
+        <p14:creationId xmlns:p14="http://schemas.microsoft.com/office/powerpoint/2010/main" val="1193789722"/>
+      </p:ext>
+    </p:extLst>
+  </p:cSld>
+  <p:clrMapOvr>
+    <a:masterClrMapping/>
+  </p:clrMapOvr>
+</p:sld>
+</file>
+
+<file path=ppt/slides/slide36.xml><?xml version="1.0" encoding="utf-8"?>
+<p:sld xmlns:a="http://schemas.openxmlformats.org/drawingml/2006/main" xmlns:r="http://schemas.openxmlformats.org/officeDocument/2006/relationships" xmlns:p="http://schemas.openxmlformats.org/presentationml/2006/main">
+  <p:cSld>
+    <p:spTree>
+      <p:nvGrpSpPr>
+        <p:cNvPr id="1" name=""/>
+        <p:cNvGrpSpPr/>
+        <p:nvPr/>
+      </p:nvGrpSpPr>
+      <p:grpSpPr>
+        <a:xfrm>
+          <a:off x="0" y="0"/>
+          <a:ext cx="0" cy="0"/>
+          <a:chOff x="0" y="0"/>
+          <a:chExt cx="0" cy="0"/>
+        </a:xfrm>
+      </p:grpSpPr>
+      <p:sp>
+        <p:nvSpPr>
+          <p:cNvPr id="2" name="Title 1">
+            <a:extLst>
+              <a:ext uri="{FF2B5EF4-FFF2-40B4-BE49-F238E27FC236}">
+                <a16:creationId xmlns:a16="http://schemas.microsoft.com/office/drawing/2014/main" id="{2DF37E66-E01D-4267-703B-A39F643100C5}"/>
+              </a:ext>
+            </a:extLst>
+          </p:cNvPr>
+          <p:cNvSpPr>
+            <a:spLocks noGrp="1"/>
+          </p:cNvSpPr>
+          <p:nvPr>
+            <p:ph type="title"/>
+          </p:nvPr>
+        </p:nvSpPr>
+        <p:spPr/>
+        <p:txBody>
+          <a:bodyPr/>
+          <a:lstStyle/>
+          <a:p>
+            <a:r>
+              <a:rPr lang="en-US" dirty="0"/>
+              <a:t>General Notes</a:t>
+            </a:r>
+          </a:p>
+        </p:txBody>
+      </p:sp>
+      <p:sp>
+        <p:nvSpPr>
+          <p:cNvPr id="3" name="Content Placeholder 2">
+            <a:extLst>
+              <a:ext uri="{FF2B5EF4-FFF2-40B4-BE49-F238E27FC236}">
+                <a16:creationId xmlns:a16="http://schemas.microsoft.com/office/drawing/2014/main" id="{F67DDC37-6101-BD34-4CBD-910AA65D2FE8}"/>
+              </a:ext>
+            </a:extLst>
+          </p:cNvPr>
+          <p:cNvSpPr>
+            <a:spLocks noGrp="1"/>
+          </p:cNvSpPr>
+          <p:nvPr>
+            <p:ph idx="1"/>
+          </p:nvPr>
+        </p:nvSpPr>
+        <p:spPr>
+          <a:xfrm>
+            <a:off x="1451579" y="1853753"/>
+            <a:ext cx="9603275" cy="4199727"/>
+          </a:xfrm>
+        </p:spPr>
+        <p:txBody>
+          <a:bodyPr>
+            <a:normAutofit lnSpcReduction="10000"/>
+          </a:bodyPr>
+          <a:lstStyle/>
+          <a:p>
+            <a:r>
+              <a:rPr lang="en-US" dirty="0"/>
+              <a:t>Sklearn has gotten much better in the recent version in handling </a:t>
+            </a:r>
+            <a:r>
+              <a:rPr lang="en-US" dirty="0" err="1"/>
+              <a:t>dataframes</a:t>
+            </a:r>
+            <a:r>
+              <a:rPr lang="en-US" dirty="0"/>
+              <a:t> natively. </a:t>
+            </a:r>
+          </a:p>
+          <a:p>
+            <a:r>
+              <a:rPr lang="en-US" dirty="0"/>
+              <a:t>Many/most of the examples have a step to convert to array before the model part. </a:t>
+            </a:r>
+          </a:p>
+          <a:p>
+            <a:pPr lvl="1"/>
+            <a:r>
+              <a:rPr lang="en-US" dirty="0"/>
+              <a:t>I.e. do prep stuff with data in </a:t>
+            </a:r>
+            <a:r>
+              <a:rPr lang="en-US" dirty="0" err="1"/>
+              <a:t>dataframe</a:t>
+            </a:r>
+            <a:r>
+              <a:rPr lang="en-US" dirty="0"/>
+              <a:t>, convert to array, feed to pipeline/model/</a:t>
+            </a:r>
+            <a:r>
+              <a:rPr lang="en-US" dirty="0" err="1"/>
+              <a:t>gridsearch</a:t>
+            </a:r>
+            <a:r>
+              <a:rPr lang="en-US" dirty="0"/>
+              <a:t>. </a:t>
+            </a:r>
+          </a:p>
+          <a:p>
+            <a:pPr lvl="1"/>
+            <a:r>
+              <a:rPr lang="en-US" dirty="0"/>
+              <a:t>You can avoid this more easily now and sklearn will (more often) handle it ok. </a:t>
+            </a:r>
+          </a:p>
+          <a:p>
+            <a:r>
+              <a:rPr lang="en-US" dirty="0"/>
+              <a:t>I generally like the conversion step when learning, it’s a clear delineation. </a:t>
+            </a:r>
+          </a:p>
+          <a:p>
+            <a:pPr lvl="1"/>
+            <a:r>
+              <a:rPr lang="en-US" dirty="0"/>
+              <a:t>All the prep work is done on the </a:t>
+            </a:r>
+            <a:r>
+              <a:rPr lang="en-US" dirty="0" err="1"/>
+              <a:t>dataframe</a:t>
+            </a:r>
+            <a:r>
+              <a:rPr lang="en-US" dirty="0"/>
+              <a:t>, we make the </a:t>
+            </a:r>
+            <a:r>
+              <a:rPr lang="en-US"/>
+              <a:t>conversion when done. </a:t>
+            </a:r>
+            <a:endParaRPr lang="en-US" dirty="0"/>
+          </a:p>
+          <a:p>
+            <a:r>
+              <a:rPr lang="en-US" dirty="0"/>
+              <a:t>The array conversion doesn’t really change anything in functionality. </a:t>
+            </a:r>
+          </a:p>
+          <a:p>
+            <a:pPr lvl="1"/>
+            <a:r>
+              <a:rPr lang="en-US" dirty="0"/>
+              <a:t>The results are the same, and the process is only different in that one or two lines. </a:t>
+            </a:r>
+          </a:p>
+          <a:p>
+            <a:pPr lvl="1"/>
+            <a:r>
+              <a:rPr lang="en-US" dirty="0"/>
+              <a:t>The algorithm does a conversion internally and just obscures it from you. </a:t>
+            </a:r>
+          </a:p>
+          <a:p>
+            <a:pPr lvl="1"/>
+            <a:r>
+              <a:rPr lang="en-US" dirty="0"/>
+              <a:t>When we do neural networks we’ll need to do that conversion (often) again. </a:t>
+            </a:r>
+          </a:p>
+        </p:txBody>
+      </p:sp>
+    </p:spTree>
+    <p:extLst>
+      <p:ext uri="{BB962C8B-B14F-4D97-AF65-F5344CB8AC3E}">
+        <p14:creationId xmlns:p14="http://schemas.microsoft.com/office/powerpoint/2010/main" val="3356818674"/>
+      </p:ext>
+    </p:extLst>
+  </p:cSld>
+  <p:clrMapOvr>
+    <a:masterClrMapping/>
+  </p:clrMapOvr>
+</p:sld>
+</file>
+
+<file path=ppt/slides/slide37.xml><?xml version="1.0" encoding="utf-8"?>
+<p:sld xmlns:a="http://schemas.openxmlformats.org/drawingml/2006/main" xmlns:r="http://schemas.openxmlformats.org/officeDocument/2006/relationships" xmlns:p="http://schemas.openxmlformats.org/presentationml/2006/main">
+  <p:cSld>
+    <p:spTree>
+      <p:nvGrpSpPr>
+        <p:cNvPr id="1" name=""/>
+        <p:cNvGrpSpPr/>
+        <p:nvPr/>
+      </p:nvGrpSpPr>
+      <p:grpSpPr>
+        <a:xfrm>
+          <a:off x="0" y="0"/>
+          <a:ext cx="0" cy="0"/>
+          <a:chOff x="0" y="0"/>
+          <a:chExt cx="0" cy="0"/>
+        </a:xfrm>
+      </p:grpSpPr>
+      <p:sp>
+        <p:nvSpPr>
+          <p:cNvPr id="2" name="Title 1">
+            <a:extLst>
+              <a:ext uri="{FF2B5EF4-FFF2-40B4-BE49-F238E27FC236}">
+                <a16:creationId xmlns:a16="http://schemas.microsoft.com/office/drawing/2014/main" id="{ADF5543F-0968-FE07-82A7-0E925D73C4F6}"/>
+              </a:ext>
+            </a:extLst>
+          </p:cNvPr>
+          <p:cNvSpPr>
+            <a:spLocks noGrp="1"/>
+          </p:cNvSpPr>
+          <p:nvPr>
+            <p:ph type="title"/>
+          </p:nvPr>
+        </p:nvSpPr>
+        <p:spPr/>
+        <p:txBody>
+          <a:bodyPr/>
+          <a:lstStyle/>
+          <a:p>
+            <a:r>
+              <a:rPr lang="en-US" dirty="0"/>
+              <a:t>Start the Semester off with a </a:t>
+            </a:r>
+            <a:r>
+              <a:rPr lang="en-US" dirty="0" err="1"/>
+              <a:t>BanG</a:t>
+            </a:r>
+            <a:r>
+              <a:rPr lang="en-US" dirty="0"/>
+              <a:t>!</a:t>
+            </a:r>
+          </a:p>
+        </p:txBody>
+      </p:sp>
+      <p:sp>
+        <p:nvSpPr>
+          <p:cNvPr id="3" name="Content Placeholder 2">
+            <a:extLst>
+              <a:ext uri="{FF2B5EF4-FFF2-40B4-BE49-F238E27FC236}">
+                <a16:creationId xmlns:a16="http://schemas.microsoft.com/office/drawing/2014/main" id="{2B8DDB9D-4E68-9C95-31AC-CB3B3168E99E}"/>
+              </a:ext>
+            </a:extLst>
+          </p:cNvPr>
+          <p:cNvSpPr>
+            <a:spLocks noGrp="1"/>
+          </p:cNvSpPr>
+          <p:nvPr>
+            <p:ph idx="1"/>
+          </p:nvPr>
+        </p:nvSpPr>
+        <p:spPr>
+          <a:xfrm>
+            <a:off x="1451579" y="1853754"/>
+            <a:ext cx="9863192" cy="4199727"/>
+          </a:xfrm>
+        </p:spPr>
+        <p:txBody>
+          <a:bodyPr/>
+          <a:lstStyle/>
+          <a:p>
+            <a:r>
+              <a:rPr lang="en-US" dirty="0"/>
+              <a:t>Review:</a:t>
+            </a:r>
+          </a:p>
+          <a:p>
+            <a:pPr lvl="1"/>
+            <a:r>
+              <a:rPr lang="en-US" dirty="0"/>
+              <a:t>Statistics, particularly for EDA. Sklearn basics. Error and model quality. </a:t>
+            </a:r>
+          </a:p>
+          <a:p>
+            <a:r>
+              <a:rPr lang="en-US" dirty="0"/>
+              <a:t>Today:</a:t>
+            </a:r>
+          </a:p>
+          <a:p>
+            <a:pPr lvl="1"/>
+            <a:r>
+              <a:rPr lang="en-US" dirty="0"/>
+              <a:t>Tree theory. </a:t>
+            </a:r>
+          </a:p>
+          <a:p>
+            <a:pPr lvl="1"/>
+            <a:r>
+              <a:rPr lang="en-US" dirty="0"/>
+              <a:t>Underfitting, hyperparameters, regularization basics. </a:t>
+            </a:r>
+          </a:p>
+          <a:p>
+            <a:r>
+              <a:rPr lang="en-US" dirty="0"/>
+              <a:t>Next week:</a:t>
+            </a:r>
+          </a:p>
+          <a:p>
+            <a:pPr lvl="1"/>
+            <a:r>
+              <a:rPr lang="en-US" dirty="0"/>
+              <a:t>Really useful pipeline tools – column transformers, imputation. </a:t>
+            </a:r>
+          </a:p>
+          <a:p>
+            <a:pPr lvl="1"/>
+            <a:r>
+              <a:rPr lang="en-US" dirty="0"/>
+              <a:t>More pipeline – simple custom transformers for project purposes. </a:t>
+            </a:r>
+          </a:p>
+          <a:p>
+            <a:pPr lvl="1"/>
+            <a:r>
+              <a:rPr lang="en-US" dirty="0"/>
+              <a:t>Using trees in a more ‘realistic’ scenario – the </a:t>
+            </a:r>
+            <a:r>
+              <a:rPr lang="en-US" dirty="0" err="1"/>
+              <a:t>c.t.</a:t>
+            </a:r>
+            <a:r>
+              <a:rPr lang="en-US" dirty="0"/>
+              <a:t> and imputation allow us to handle most data.</a:t>
+            </a:r>
+          </a:p>
+        </p:txBody>
+      </p:sp>
+    </p:spTree>
+    <p:extLst>
+      <p:ext uri="{BB962C8B-B14F-4D97-AF65-F5344CB8AC3E}">
+        <p14:creationId xmlns:p14="http://schemas.microsoft.com/office/powerpoint/2010/main" val="248652208"/>
+      </p:ext>
+    </p:extLst>
+  </p:cSld>
+  <p:clrMapOvr>
+    <a:masterClrMapping/>
+  </p:clrMapOvr>
+</p:sld>
+</file>
+
+<file path=ppt/slides/slide38.xml><?xml version="1.0" encoding="utf-8"?>
+<p:sld xmlns:a="http://schemas.openxmlformats.org/drawingml/2006/main" xmlns:r="http://schemas.openxmlformats.org/officeDocument/2006/relationships" xmlns:p="http://schemas.openxmlformats.org/presentationml/2006/main" show="0">
+  <p:cSld>
+    <p:spTree>
+      <p:nvGrpSpPr>
+        <p:cNvPr id="1" name=""/>
+        <p:cNvGrpSpPr/>
+        <p:nvPr/>
+      </p:nvGrpSpPr>
+      <p:grpSpPr>
+        <a:xfrm>
+          <a:off x="0" y="0"/>
+          <a:ext cx="0" cy="0"/>
+          <a:chOff x="0" y="0"/>
+          <a:chExt cx="0" cy="0"/>
+        </a:xfrm>
+      </p:grpSpPr>
+      <p:sp>
+        <p:nvSpPr>
           <p:cNvPr id="2" name="Title 1">
             <a:extLst>
               <a:ext uri="{FF2B5EF4-FFF2-40B4-BE49-F238E27FC236}">
@@ -8618,7 +10006,7 @@
 </p:sld>
 </file>
 
-<file path=ppt/slides/slide33.xml><?xml version="1.0" encoding="utf-8"?>
+<file path=ppt/slides/slide39.xml><?xml version="1.0" encoding="utf-8"?>
 <p:sld xmlns:a="http://schemas.openxmlformats.org/drawingml/2006/main" xmlns:r="http://schemas.openxmlformats.org/officeDocument/2006/relationships" xmlns:p="http://schemas.openxmlformats.org/presentationml/2006/main" show="0">
   <p:cSld>
     <p:spTree>
@@ -8902,7 +10290,147 @@
 </p:sld>
 </file>
 
-<file path=ppt/slides/slide34.xml><?xml version="1.0" encoding="utf-8"?>
+<file path=ppt/slides/slide4.xml><?xml version="1.0" encoding="utf-8"?>
+<p:sld xmlns:a="http://schemas.openxmlformats.org/drawingml/2006/main" xmlns:r="http://schemas.openxmlformats.org/officeDocument/2006/relationships" xmlns:p="http://schemas.openxmlformats.org/presentationml/2006/main">
+  <p:cSld>
+    <p:spTree>
+      <p:nvGrpSpPr>
+        <p:cNvPr id="1" name=""/>
+        <p:cNvGrpSpPr/>
+        <p:nvPr/>
+      </p:nvGrpSpPr>
+      <p:grpSpPr>
+        <a:xfrm>
+          <a:off x="0" y="0"/>
+          <a:ext cx="0" cy="0"/>
+          <a:chOff x="0" y="0"/>
+          <a:chExt cx="0" cy="0"/>
+        </a:xfrm>
+      </p:grpSpPr>
+      <p:sp>
+        <p:nvSpPr>
+          <p:cNvPr id="2" name="Title 1">
+            <a:extLst>
+              <a:ext uri="{FF2B5EF4-FFF2-40B4-BE49-F238E27FC236}">
+                <a16:creationId xmlns:a16="http://schemas.microsoft.com/office/drawing/2014/main" id="{1AEE3EA7-D515-FDCE-7C0E-48FBAD5E501A}"/>
+              </a:ext>
+            </a:extLst>
+          </p:cNvPr>
+          <p:cNvSpPr>
+            <a:spLocks noGrp="1"/>
+          </p:cNvSpPr>
+          <p:nvPr>
+            <p:ph type="title"/>
+          </p:nvPr>
+        </p:nvSpPr>
+        <p:spPr/>
+        <p:txBody>
+          <a:bodyPr/>
+          <a:lstStyle/>
+          <a:p>
+            <a:r>
+              <a:rPr lang="en-US" dirty="0"/>
+              <a:t>See the Forest for the Trees</a:t>
+            </a:r>
+          </a:p>
+        </p:txBody>
+      </p:sp>
+      <p:sp>
+        <p:nvSpPr>
+          <p:cNvPr id="3" name="Content Placeholder 2">
+            <a:extLst>
+              <a:ext uri="{FF2B5EF4-FFF2-40B4-BE49-F238E27FC236}">
+                <a16:creationId xmlns:a16="http://schemas.microsoft.com/office/drawing/2014/main" id="{4852676E-3457-5371-3C96-708BE3A70B9B}"/>
+              </a:ext>
+            </a:extLst>
+          </p:cNvPr>
+          <p:cNvSpPr>
+            <a:spLocks noGrp="1"/>
+          </p:cNvSpPr>
+          <p:nvPr>
+            <p:ph idx="1"/>
+          </p:nvPr>
+        </p:nvSpPr>
+        <p:spPr>
+          <a:xfrm>
+            <a:off x="1451579" y="2015732"/>
+            <a:ext cx="9603275" cy="3901592"/>
+          </a:xfrm>
+        </p:spPr>
+        <p:txBody>
+          <a:bodyPr/>
+          <a:lstStyle/>
+          <a:p>
+            <a:r>
+              <a:rPr lang="en-US" dirty="0"/>
+              <a:t>A tree is a fundamentally different type of model from a regression based one. </a:t>
+            </a:r>
+          </a:p>
+          <a:p>
+            <a:pPr lvl="1"/>
+            <a:r>
+              <a:rPr lang="en-US" dirty="0"/>
+              <a:t>There’s no equation like y=</a:t>
+            </a:r>
+            <a:r>
+              <a:rPr lang="en-US" dirty="0" err="1"/>
+              <a:t>mx+b</a:t>
+            </a:r>
+            <a:r>
+              <a:rPr lang="en-US" dirty="0"/>
+              <a:t> to make a prediction. </a:t>
+            </a:r>
+          </a:p>
+          <a:p>
+            <a:pPr lvl="1"/>
+            <a:r>
+              <a:rPr lang="en-US" dirty="0"/>
+              <a:t>There’s no linear relationship, as seen in that equation. </a:t>
+            </a:r>
+          </a:p>
+          <a:p>
+            <a:pPr lvl="1"/>
+            <a:r>
+              <a:rPr lang="en-US" dirty="0"/>
+              <a:t>The process of creating the model is quite different from gradient descent. </a:t>
+            </a:r>
+          </a:p>
+          <a:p>
+            <a:r>
+              <a:rPr lang="en-US" dirty="0"/>
+              <a:t>The end result is interchangeable. </a:t>
+            </a:r>
+          </a:p>
+          <a:p>
+            <a:pPr lvl="1"/>
+            <a:r>
+              <a:rPr lang="en-US" dirty="0"/>
+              <a:t>All models predict Target given Features. </a:t>
+            </a:r>
+          </a:p>
+          <a:p>
+            <a:pPr lvl="1"/>
+            <a:r>
+              <a:rPr lang="en-US" dirty="0"/>
+              <a:t>The only thing that changes is how it learns to do so. </a:t>
+            </a:r>
+          </a:p>
+        </p:txBody>
+      </p:sp>
+    </p:spTree>
+    <p:extLst>
+      <p:ext uri="{BB962C8B-B14F-4D97-AF65-F5344CB8AC3E}">
+        <p14:creationId xmlns:p14="http://schemas.microsoft.com/office/powerpoint/2010/main" val="336625429"/>
+      </p:ext>
+    </p:extLst>
+  </p:cSld>
+  <p:clrMapOvr>
+    <a:masterClrMapping/>
+  </p:clrMapOvr>
+</p:sld>
+</file>
+
+<file path=ppt/slides/slide40.xml><?xml version="1.0" encoding="utf-8"?>
 <p:sld xmlns:a="http://schemas.openxmlformats.org/drawingml/2006/main" xmlns:r="http://schemas.openxmlformats.org/officeDocument/2006/relationships" xmlns:p="http://schemas.openxmlformats.org/presentationml/2006/main" show="0">
   <p:cSld>
     <p:spTree>
@@ -9057,7 +10585,7 @@
 </p:sld>
 </file>
 
-<file path=ppt/slides/slide35.xml><?xml version="1.0" encoding="utf-8"?>
+<file path=ppt/slides/slide41.xml><?xml version="1.0" encoding="utf-8"?>
 <p:sld xmlns:a="http://schemas.openxmlformats.org/drawingml/2006/main" xmlns:r="http://schemas.openxmlformats.org/officeDocument/2006/relationships" xmlns:p="http://schemas.openxmlformats.org/presentationml/2006/main" show="0">
   <p:cSld>
     <p:spTree>
@@ -9283,7 +10811,7 @@
 </p:sld>
 </file>
 
-<file path=ppt/slides/slide36.xml><?xml version="1.0" encoding="utf-8"?>
+<file path=ppt/slides/slide42.xml><?xml version="1.0" encoding="utf-8"?>
 <p:sld xmlns:a="http://schemas.openxmlformats.org/drawingml/2006/main" xmlns:r="http://schemas.openxmlformats.org/officeDocument/2006/relationships" xmlns:p="http://schemas.openxmlformats.org/presentationml/2006/main" show="0">
   <p:cSld>
     <p:spTree>
@@ -9539,146 +11067,6 @@
     <p:extLst>
       <p:ext uri="{BB962C8B-B14F-4D97-AF65-F5344CB8AC3E}">
         <p14:creationId xmlns:p14="http://schemas.microsoft.com/office/powerpoint/2010/main" val="3273009776"/>
-      </p:ext>
-    </p:extLst>
-  </p:cSld>
-  <p:clrMapOvr>
-    <a:masterClrMapping/>
-  </p:clrMapOvr>
-</p:sld>
-</file>
-
-<file path=ppt/slides/slide4.xml><?xml version="1.0" encoding="utf-8"?>
-<p:sld xmlns:a="http://schemas.openxmlformats.org/drawingml/2006/main" xmlns:r="http://schemas.openxmlformats.org/officeDocument/2006/relationships" xmlns:p="http://schemas.openxmlformats.org/presentationml/2006/main">
-  <p:cSld>
-    <p:spTree>
-      <p:nvGrpSpPr>
-        <p:cNvPr id="1" name=""/>
-        <p:cNvGrpSpPr/>
-        <p:nvPr/>
-      </p:nvGrpSpPr>
-      <p:grpSpPr>
-        <a:xfrm>
-          <a:off x="0" y="0"/>
-          <a:ext cx="0" cy="0"/>
-          <a:chOff x="0" y="0"/>
-          <a:chExt cx="0" cy="0"/>
-        </a:xfrm>
-      </p:grpSpPr>
-      <p:sp>
-        <p:nvSpPr>
-          <p:cNvPr id="2" name="Title 1">
-            <a:extLst>
-              <a:ext uri="{FF2B5EF4-FFF2-40B4-BE49-F238E27FC236}">
-                <a16:creationId xmlns:a16="http://schemas.microsoft.com/office/drawing/2014/main" id="{1AEE3EA7-D515-FDCE-7C0E-48FBAD5E501A}"/>
-              </a:ext>
-            </a:extLst>
-          </p:cNvPr>
-          <p:cNvSpPr>
-            <a:spLocks noGrp="1"/>
-          </p:cNvSpPr>
-          <p:nvPr>
-            <p:ph type="title"/>
-          </p:nvPr>
-        </p:nvSpPr>
-        <p:spPr/>
-        <p:txBody>
-          <a:bodyPr/>
-          <a:lstStyle/>
-          <a:p>
-            <a:r>
-              <a:rPr lang="en-US" dirty="0"/>
-              <a:t>See the Forest for the Trees</a:t>
-            </a:r>
-          </a:p>
-        </p:txBody>
-      </p:sp>
-      <p:sp>
-        <p:nvSpPr>
-          <p:cNvPr id="3" name="Content Placeholder 2">
-            <a:extLst>
-              <a:ext uri="{FF2B5EF4-FFF2-40B4-BE49-F238E27FC236}">
-                <a16:creationId xmlns:a16="http://schemas.microsoft.com/office/drawing/2014/main" id="{4852676E-3457-5371-3C96-708BE3A70B9B}"/>
-              </a:ext>
-            </a:extLst>
-          </p:cNvPr>
-          <p:cNvSpPr>
-            <a:spLocks noGrp="1"/>
-          </p:cNvSpPr>
-          <p:nvPr>
-            <p:ph idx="1"/>
-          </p:nvPr>
-        </p:nvSpPr>
-        <p:spPr>
-          <a:xfrm>
-            <a:off x="1451579" y="2015732"/>
-            <a:ext cx="9603275" cy="3901592"/>
-          </a:xfrm>
-        </p:spPr>
-        <p:txBody>
-          <a:bodyPr/>
-          <a:lstStyle/>
-          <a:p>
-            <a:r>
-              <a:rPr lang="en-US" dirty="0"/>
-              <a:t>A tree is a fundamentally different type of model from a regression based one. </a:t>
-            </a:r>
-          </a:p>
-          <a:p>
-            <a:pPr lvl="1"/>
-            <a:r>
-              <a:rPr lang="en-US" dirty="0"/>
-              <a:t>There’s no equation like y=</a:t>
-            </a:r>
-            <a:r>
-              <a:rPr lang="en-US" dirty="0" err="1"/>
-              <a:t>mx+b</a:t>
-            </a:r>
-            <a:r>
-              <a:rPr lang="en-US" dirty="0"/>
-              <a:t> to make a prediction. </a:t>
-            </a:r>
-          </a:p>
-          <a:p>
-            <a:pPr lvl="1"/>
-            <a:r>
-              <a:rPr lang="en-US" dirty="0"/>
-              <a:t>There’s no linear relationship, as seen in that equation. </a:t>
-            </a:r>
-          </a:p>
-          <a:p>
-            <a:pPr lvl="1"/>
-            <a:r>
-              <a:rPr lang="en-US" dirty="0"/>
-              <a:t>The process of creating the model is quite different from gradient descent. </a:t>
-            </a:r>
-          </a:p>
-          <a:p>
-            <a:r>
-              <a:rPr lang="en-US" dirty="0"/>
-              <a:t>The end result is interchangeable. </a:t>
-            </a:r>
-          </a:p>
-          <a:p>
-            <a:pPr lvl="1"/>
-            <a:r>
-              <a:rPr lang="en-US" dirty="0"/>
-              <a:t>All models predict Target given Features. </a:t>
-            </a:r>
-          </a:p>
-          <a:p>
-            <a:pPr lvl="1"/>
-            <a:r>
-              <a:rPr lang="en-US" dirty="0"/>
-              <a:t>The only thing that changes is how it learns to do so. </a:t>
-            </a:r>
-          </a:p>
-        </p:txBody>
-      </p:sp>
-    </p:spTree>
-    <p:extLst>
-      <p:ext uri="{BB962C8B-B14F-4D97-AF65-F5344CB8AC3E}">
-        <p14:creationId xmlns:p14="http://schemas.microsoft.com/office/powerpoint/2010/main" val="336625429"/>
       </p:ext>
     </p:extLst>
   </p:cSld>

</xml_diff>